<commit_message>
Data processing and security slides
</commit_message>
<xml_diff>
--- a/Slideshow template.pptx
+++ b/Slideshow template.pptx
@@ -75,7 +75,7 @@
         <p:txBody>
           <a:bodyPr/>
           <a:p>
-            <a:fld id="{9EB82405-3199-4468-BD3D-669EE9501BB2}" type="slidenum">
+            <a:fld id="{0891FA53-6FA1-4558-AF64-DFC20A398278}" type="slidenum">
               <a:t>&lt;#&gt;</a:t>
             </a:fld>
           </a:p>
@@ -263,7 +263,7 @@
         <p:txBody>
           <a:bodyPr/>
           <a:p>
-            <a:fld id="{62768776-F962-4F1C-8818-890D5544D487}" type="slidenum">
+            <a:fld id="{42B46EAE-7F43-408F-A182-4E8203E5C831}" type="slidenum">
               <a:t>&lt;#&gt;</a:t>
             </a:fld>
           </a:p>
@@ -519,7 +519,7 @@
         <p:txBody>
           <a:bodyPr/>
           <a:p>
-            <a:fld id="{F25E49CD-F8BF-4A89-94FF-7FB4617A4149}" type="slidenum">
+            <a:fld id="{DF94EA34-72D0-4293-A3CB-BED7871DA3FA}" type="slidenum">
               <a:t>&lt;#&gt;</a:t>
             </a:fld>
           </a:p>
@@ -843,7 +843,7 @@
         <p:txBody>
           <a:bodyPr/>
           <a:p>
-            <a:fld id="{24A18188-2939-4ACC-BE17-DAE3EACC0BA9}" type="slidenum">
+            <a:fld id="{7A2E0632-996F-4B1B-855B-66A7FB5DD822}" type="slidenum">
               <a:t>&lt;#&gt;</a:t>
             </a:fld>
           </a:p>
@@ -926,7 +926,7 @@
         <p:txBody>
           <a:bodyPr/>
           <a:p>
-            <a:fld id="{5F087CBA-2149-4920-A49A-57F2ADBE03AE}" type="slidenum">
+            <a:fld id="{35744489-BC3A-4D50-AC21-A4C99D41F271}" type="slidenum">
               <a:t>&lt;#&gt;</a:t>
             </a:fld>
           </a:p>
@@ -1083,7 +1083,7 @@
         <p:txBody>
           <a:bodyPr/>
           <a:p>
-            <a:fld id="{906558E8-D04F-4005-9C0D-B2FA5EBBE70D}" type="slidenum">
+            <a:fld id="{C1A8EC4F-1EE5-451B-9B7D-B5C05A6C39C3}" type="slidenum">
               <a:t>&lt;#&gt;</a:t>
             </a:fld>
           </a:p>
@@ -1237,7 +1237,7 @@
         <p:txBody>
           <a:bodyPr/>
           <a:p>
-            <a:fld id="{52095F90-88CD-46C2-9CF5-B7A4B9E16579}" type="slidenum">
+            <a:fld id="{82D83F0C-C894-4BA4-A2C9-D2D3583E1DE9}" type="slidenum">
               <a:t>&lt;#&gt;</a:t>
             </a:fld>
           </a:p>
@@ -1425,7 +1425,7 @@
         <p:txBody>
           <a:bodyPr/>
           <a:p>
-            <a:fld id="{0EC63B70-9552-4FE6-8A30-DEAE274043D0}" type="slidenum">
+            <a:fld id="{C6FF13F1-09EB-4BD1-B304-507C35C82BC3}" type="slidenum">
               <a:t>&lt;#&gt;</a:t>
             </a:fld>
           </a:p>
@@ -1545,7 +1545,7 @@
         <p:txBody>
           <a:bodyPr/>
           <a:p>
-            <a:fld id="{C2981ABE-6C62-4F1A-BFD0-0EC5031371E1}" type="slidenum">
+            <a:fld id="{AED330E8-29C7-45EC-8732-A5ED47F62112}" type="slidenum">
               <a:t>&lt;#&gt;</a:t>
             </a:fld>
           </a:p>
@@ -1665,7 +1665,7 @@
         <p:txBody>
           <a:bodyPr/>
           <a:p>
-            <a:fld id="{45196D11-D370-479A-827C-BCD17C3AAC46}" type="slidenum">
+            <a:fld id="{A5CC8CF0-BE7C-48C0-A888-16EF5EC9E9B3}" type="slidenum">
               <a:t>&lt;#&gt;</a:t>
             </a:fld>
           </a:p>
@@ -1887,7 +1887,7 @@
         <p:txBody>
           <a:bodyPr/>
           <a:p>
-            <a:fld id="{B071A1F6-1027-410A-B012-39FADD45069D}" type="slidenum">
+            <a:fld id="{74E12D94-3DC6-4908-A272-49A273BF02F3}" type="slidenum">
               <a:t>&lt;#&gt;</a:t>
             </a:fld>
           </a:p>
@@ -2044,7 +2044,7 @@
         <p:txBody>
           <a:bodyPr/>
           <a:p>
-            <a:fld id="{16935C09-1047-4F79-B51A-3206344CCB93}" type="slidenum">
+            <a:fld id="{0D781A0F-7615-4DDB-A8CB-A30D2AC0A298}" type="slidenum">
               <a:t>&lt;#&gt;</a:t>
             </a:fld>
           </a:p>
@@ -2266,7 +2266,7 @@
         <p:txBody>
           <a:bodyPr/>
           <a:p>
-            <a:fld id="{FBD229B5-5641-40B9-885B-3E467E35F673}" type="slidenum">
+            <a:fld id="{DA716B4B-F8D8-4B87-8EDD-9CCA7F7CB453}" type="slidenum">
               <a:t>&lt;#&gt;</a:t>
             </a:fld>
           </a:p>
@@ -2488,7 +2488,7 @@
         <p:txBody>
           <a:bodyPr/>
           <a:p>
-            <a:fld id="{6D2259E1-E74F-4C0F-BF87-B9E8A2264CEA}" type="slidenum">
+            <a:fld id="{775A9034-A0C3-4146-BECC-83C569C61C65}" type="slidenum">
               <a:t>&lt;#&gt;</a:t>
             </a:fld>
           </a:p>
@@ -2676,7 +2676,7 @@
         <p:txBody>
           <a:bodyPr/>
           <a:p>
-            <a:fld id="{7790B6D5-8593-4E3B-846A-5343873A6113}" type="slidenum">
+            <a:fld id="{5F1B68DC-74E0-46C3-8D61-FC448BA22DB1}" type="slidenum">
               <a:t>&lt;#&gt;</a:t>
             </a:fld>
           </a:p>
@@ -2932,7 +2932,7 @@
         <p:txBody>
           <a:bodyPr/>
           <a:p>
-            <a:fld id="{BC82F6CB-01AD-415D-9A6A-032F3648BA40}" type="slidenum">
+            <a:fld id="{9EA9CD83-24EF-46DA-8466-8A08002EB2DF}" type="slidenum">
               <a:t>&lt;#&gt;</a:t>
             </a:fld>
           </a:p>
@@ -3256,7 +3256,7 @@
         <p:txBody>
           <a:bodyPr/>
           <a:p>
-            <a:fld id="{8A197DA1-5E9D-429A-B5DD-156C547A891C}" type="slidenum">
+            <a:fld id="{0AEE485D-F2FE-4458-A572-9EBBC6EC2CF2}" type="slidenum">
               <a:t>&lt;#&gt;</a:t>
             </a:fld>
           </a:p>
@@ -3339,7 +3339,7 @@
         <p:txBody>
           <a:bodyPr/>
           <a:p>
-            <a:fld id="{E37035A3-37E3-475B-837C-009F9EC65C05}" type="slidenum">
+            <a:fld id="{8D0F5BA6-C461-4306-9D55-3D8A208542A1}" type="slidenum">
               <a:t>&lt;#&gt;</a:t>
             </a:fld>
           </a:p>
@@ -3496,7 +3496,7 @@
         <p:txBody>
           <a:bodyPr/>
           <a:p>
-            <a:fld id="{15ED3F37-33C9-4F04-B6B4-6C9001185FDB}" type="slidenum">
+            <a:fld id="{397AA6EB-CBD5-4001-BDE0-011643735A98}" type="slidenum">
               <a:t>&lt;#&gt;</a:t>
             </a:fld>
           </a:p>
@@ -3650,7 +3650,7 @@
         <p:txBody>
           <a:bodyPr/>
           <a:p>
-            <a:fld id="{78EF8DD9-E453-483B-83EB-760983C44E75}" type="slidenum">
+            <a:fld id="{F4E068C7-7C85-45BB-989F-9A4D8298A77B}" type="slidenum">
               <a:t>&lt;#&gt;</a:t>
             </a:fld>
           </a:p>
@@ -3838,7 +3838,7 @@
         <p:txBody>
           <a:bodyPr/>
           <a:p>
-            <a:fld id="{D8AB79F3-F02B-42A8-880A-DBBD1E3E2AA9}" type="slidenum">
+            <a:fld id="{13BFBE98-EDAB-48D0-9889-7C06A4AFA7B3}" type="slidenum">
               <a:t>&lt;#&gt;</a:t>
             </a:fld>
           </a:p>
@@ -3958,7 +3958,7 @@
         <p:txBody>
           <a:bodyPr/>
           <a:p>
-            <a:fld id="{0210C36B-7558-4541-A50C-A7EB4A284294}" type="slidenum">
+            <a:fld id="{BB7FA050-65F8-4AB5-A132-C847317C898E}" type="slidenum">
               <a:t>&lt;#&gt;</a:t>
             </a:fld>
           </a:p>
@@ -4112,7 +4112,7 @@
         <p:txBody>
           <a:bodyPr/>
           <a:p>
-            <a:fld id="{2A1895DF-793D-417D-A8B6-2DF80479A871}" type="slidenum">
+            <a:fld id="{C4ABD1AC-89A3-4B62-8BD8-27D5817EE4D1}" type="slidenum">
               <a:t>&lt;#&gt;</a:t>
             </a:fld>
           </a:p>
@@ -4232,7 +4232,7 @@
         <p:txBody>
           <a:bodyPr/>
           <a:p>
-            <a:fld id="{CACF4980-A890-4F4B-BA45-6ACBD71902F8}" type="slidenum">
+            <a:fld id="{6DAA2FE3-06FA-423D-9B06-9EFA9E85BA57}" type="slidenum">
               <a:t>&lt;#&gt;</a:t>
             </a:fld>
           </a:p>
@@ -4454,7 +4454,7 @@
         <p:txBody>
           <a:bodyPr/>
           <a:p>
-            <a:fld id="{76CE28B6-D4E8-41B3-8589-2422F6B6D9E4}" type="slidenum">
+            <a:fld id="{EC38685E-629F-448A-8DBD-2B083FE75F3F}" type="slidenum">
               <a:t>&lt;#&gt;</a:t>
             </a:fld>
           </a:p>
@@ -4676,7 +4676,7 @@
         <p:txBody>
           <a:bodyPr/>
           <a:p>
-            <a:fld id="{E5F73E6E-58FC-466C-912F-612ECF07E793}" type="slidenum">
+            <a:fld id="{9BC842E5-A4F2-4FF0-B63F-D135CEACABC1}" type="slidenum">
               <a:t>&lt;#&gt;</a:t>
             </a:fld>
           </a:p>
@@ -4898,7 +4898,7 @@
         <p:txBody>
           <a:bodyPr/>
           <a:p>
-            <a:fld id="{A0BC7876-D9E8-4DE3-87B2-2B0D285C64A2}" type="slidenum">
+            <a:fld id="{A2AEFAF9-3D45-41CE-83C8-AC600C451470}" type="slidenum">
               <a:t>&lt;#&gt;</a:t>
             </a:fld>
           </a:p>
@@ -5086,7 +5086,7 @@
         <p:txBody>
           <a:bodyPr/>
           <a:p>
-            <a:fld id="{B2968D35-3625-42D9-A11C-2C60777F65F7}" type="slidenum">
+            <a:fld id="{DD5E46AD-663A-4526-A8F7-C7EA1FF86228}" type="slidenum">
               <a:t>&lt;#&gt;</a:t>
             </a:fld>
           </a:p>
@@ -5342,7 +5342,7 @@
         <p:txBody>
           <a:bodyPr/>
           <a:p>
-            <a:fld id="{D61DEECF-4954-4C96-96A3-9C10C3A23444}" type="slidenum">
+            <a:fld id="{0A8409AE-E2E7-4227-A760-67F451477399}" type="slidenum">
               <a:t>&lt;#&gt;</a:t>
             </a:fld>
           </a:p>
@@ -5666,7 +5666,7 @@
         <p:txBody>
           <a:bodyPr/>
           <a:p>
-            <a:fld id="{54147FAF-BB0F-41CB-B461-E3228424DD4F}" type="slidenum">
+            <a:fld id="{2DDD0DED-C4A4-4850-B26D-E26F7D9261E3}" type="slidenum">
               <a:t>&lt;#&gt;</a:t>
             </a:fld>
           </a:p>
@@ -5749,7 +5749,7 @@
         <p:txBody>
           <a:bodyPr/>
           <a:p>
-            <a:fld id="{BC8D13D4-797E-4EB1-8AAF-CD8E6DE63002}" type="slidenum">
+            <a:fld id="{67764DCD-7CE5-4F85-AD7B-A0C55AC1A95D}" type="slidenum">
               <a:t>&lt;#&gt;</a:t>
             </a:fld>
           </a:p>
@@ -5906,7 +5906,7 @@
         <p:txBody>
           <a:bodyPr/>
           <a:p>
-            <a:fld id="{216F0A6C-AC14-4602-BC8E-148AE9FB43E4}" type="slidenum">
+            <a:fld id="{B5E0BEC1-B010-49B8-A579-2A46391AD40C}" type="slidenum">
               <a:t>&lt;#&gt;</a:t>
             </a:fld>
           </a:p>
@@ -6060,7 +6060,7 @@
         <p:txBody>
           <a:bodyPr/>
           <a:p>
-            <a:fld id="{20595309-BAA4-4E0E-BC63-1DF803E40065}" type="slidenum">
+            <a:fld id="{4D52B144-00E8-43F2-8D01-9EFB6CA136E7}" type="slidenum">
               <a:t>&lt;#&gt;</a:t>
             </a:fld>
           </a:p>
@@ -6248,7 +6248,7 @@
         <p:txBody>
           <a:bodyPr/>
           <a:p>
-            <a:fld id="{EA24313B-759A-4326-B7A7-ABD4BB87B702}" type="slidenum">
+            <a:fld id="{369BA249-C4E8-45A0-9565-E33ADFE528A0}" type="slidenum">
               <a:t>&lt;#&gt;</a:t>
             </a:fld>
           </a:p>
@@ -6436,7 +6436,7 @@
         <p:txBody>
           <a:bodyPr/>
           <a:p>
-            <a:fld id="{F4952E26-F213-4E5E-A6DB-FD26ABECA738}" type="slidenum">
+            <a:fld id="{75B3D577-4507-47FB-999C-78F0CF12A280}" type="slidenum">
               <a:t>&lt;#&gt;</a:t>
             </a:fld>
           </a:p>
@@ -6556,7 +6556,7 @@
         <p:txBody>
           <a:bodyPr/>
           <a:p>
-            <a:fld id="{8043D620-2C54-43CC-8BF1-97E97A1F51B3}" type="slidenum">
+            <a:fld id="{037ED0E5-63D7-47F3-9BDC-BF1E094ADED9}" type="slidenum">
               <a:t>&lt;#&gt;</a:t>
             </a:fld>
           </a:p>
@@ -6676,7 +6676,7 @@
         <p:txBody>
           <a:bodyPr/>
           <a:p>
-            <a:fld id="{85A8A460-70CE-472D-ACC6-DCB78625768F}" type="slidenum">
+            <a:fld id="{260D3E29-2208-4031-9515-09634122125B}" type="slidenum">
               <a:t>&lt;#&gt;</a:t>
             </a:fld>
           </a:p>
@@ -6898,7 +6898,7 @@
         <p:txBody>
           <a:bodyPr/>
           <a:p>
-            <a:fld id="{8DBBD59F-23E8-489F-ABBB-6A5A080F8455}" type="slidenum">
+            <a:fld id="{05DB2390-C8BB-4B36-B576-6E6461A8DDD9}" type="slidenum">
               <a:t>&lt;#&gt;</a:t>
             </a:fld>
           </a:p>
@@ -7120,7 +7120,7 @@
         <p:txBody>
           <a:bodyPr/>
           <a:p>
-            <a:fld id="{7CA512EB-9C02-4FDA-98C1-03AEEBB9B0CF}" type="slidenum">
+            <a:fld id="{9834DC7B-9356-4EA5-A4BF-1FA047DD078A}" type="slidenum">
               <a:t>&lt;#&gt;</a:t>
             </a:fld>
           </a:p>
@@ -7342,7 +7342,7 @@
         <p:txBody>
           <a:bodyPr/>
           <a:p>
-            <a:fld id="{22D27B10-3BF5-46FB-A5C3-07A6FCC40F45}" type="slidenum">
+            <a:fld id="{15488012-2D05-4BC3-BCD8-8232B0C86989}" type="slidenum">
               <a:t>&lt;#&gt;</a:t>
             </a:fld>
           </a:p>
@@ -7530,7 +7530,7 @@
         <p:txBody>
           <a:bodyPr/>
           <a:p>
-            <a:fld id="{662F20E4-4AC6-46D6-8043-FB770EBB94BD}" type="slidenum">
+            <a:fld id="{755B6DD4-AD54-4203-A47B-E000A26E0AD7}" type="slidenum">
               <a:t>&lt;#&gt;</a:t>
             </a:fld>
           </a:p>
@@ -7786,7 +7786,7 @@
         <p:txBody>
           <a:bodyPr/>
           <a:p>
-            <a:fld id="{47861810-17AC-42D7-AEC5-D3436AA34893}" type="slidenum">
+            <a:fld id="{3791D590-F26A-4951-8B55-3168DA6CF5E3}" type="slidenum">
               <a:t>&lt;#&gt;</a:t>
             </a:fld>
           </a:p>
@@ -8110,7 +8110,7 @@
         <p:txBody>
           <a:bodyPr/>
           <a:p>
-            <a:fld id="{9C44D1D8-173B-4FA8-BA91-81451D519F4C}" type="slidenum">
+            <a:fld id="{FC750431-1C9A-4421-B4E3-C26FF9F497C2}" type="slidenum">
               <a:t>&lt;#&gt;</a:t>
             </a:fld>
           </a:p>
@@ -8230,7 +8230,7 @@
         <p:txBody>
           <a:bodyPr/>
           <a:p>
-            <a:fld id="{5B021989-1039-41A2-8328-F99FE8A441C5}" type="slidenum">
+            <a:fld id="{49A19BD8-3566-4C64-B516-56670905B043}" type="slidenum">
               <a:t>&lt;#&gt;</a:t>
             </a:fld>
           </a:p>
@@ -8350,7 +8350,7 @@
         <p:txBody>
           <a:bodyPr/>
           <a:p>
-            <a:fld id="{9A2C7C35-83AA-4FC9-A0A6-2099B505CBA1}" type="slidenum">
+            <a:fld id="{47926F95-49B1-4CE8-B893-06CAB3D9F31D}" type="slidenum">
               <a:t>&lt;#&gt;</a:t>
             </a:fld>
           </a:p>
@@ -8572,7 +8572,7 @@
         <p:txBody>
           <a:bodyPr/>
           <a:p>
-            <a:fld id="{539EF7F6-85BE-4093-B893-9B295101D9FC}" type="slidenum">
+            <a:fld id="{E08B15E2-ABD1-43F4-A671-ACC04BB41259}" type="slidenum">
               <a:t>&lt;#&gt;</a:t>
             </a:fld>
           </a:p>
@@ -8794,7 +8794,7 @@
         <p:txBody>
           <a:bodyPr/>
           <a:p>
-            <a:fld id="{EB88FAF1-A40E-4F7B-AF82-DF12805489D1}" type="slidenum">
+            <a:fld id="{C63441CA-075A-4537-9825-BA2A91A86DE2}" type="slidenum">
               <a:t>&lt;#&gt;</a:t>
             </a:fld>
           </a:p>
@@ -9016,7 +9016,7 @@
         <p:txBody>
           <a:bodyPr/>
           <a:p>
-            <a:fld id="{2DAC9FAD-2668-417B-955C-225C27D27547}" type="slidenum">
+            <a:fld id="{90253DA0-52A7-404C-A2E1-2B95CE7B72E9}" type="slidenum">
               <a:t>&lt;#&gt;</a:t>
             </a:fld>
           </a:p>
@@ -9085,7 +9085,7 @@
         <p:spPr>
           <a:xfrm>
             <a:off x="4038480" y="6356520"/>
-            <a:ext cx="4111920" cy="362160"/>
+            <a:ext cx="4111560" cy="361800"/>
           </a:xfrm>
           <a:prstGeom prst="rect">
             <a:avLst/>
@@ -9142,7 +9142,7 @@
         <p:spPr>
           <a:xfrm>
             <a:off x="8610480" y="6356520"/>
-            <a:ext cx="2740320" cy="362160"/>
+            <a:ext cx="2739960" cy="361800"/>
           </a:xfrm>
           <a:prstGeom prst="rect">
             <a:avLst/>
@@ -9177,7 +9177,7 @@
               </a:lnSpc>
               <a:buNone/>
             </a:pPr>
-            <a:fld id="{57432328-DCEF-4C99-9D94-420F38954414}" type="slidenum">
+            <a:fld id="{F2C14FD0-C269-42E2-9CAF-A3EC520AA41D}" type="slidenum">
               <a:rPr b="0" lang="en-GB" sz="1200" spc="-1" strike="noStrike">
                 <a:solidFill>
                   <a:srgbClr val="8b8b8b"/>
@@ -9205,7 +9205,7 @@
         <p:spPr>
           <a:xfrm>
             <a:off x="838080" y="6356520"/>
-            <a:ext cx="2740320" cy="362160"/>
+            <a:ext cx="2739960" cy="361800"/>
           </a:xfrm>
           <a:prstGeom prst="rect">
             <a:avLst/>
@@ -9522,7 +9522,7 @@
         <p:spPr>
           <a:xfrm>
             <a:off x="4038480" y="6356520"/>
-            <a:ext cx="4111920" cy="362160"/>
+            <a:ext cx="4111560" cy="361800"/>
           </a:xfrm>
           <a:prstGeom prst="rect">
             <a:avLst/>
@@ -9579,7 +9579,7 @@
         <p:spPr>
           <a:xfrm>
             <a:off x="8610480" y="6356520"/>
-            <a:ext cx="2740320" cy="362160"/>
+            <a:ext cx="2739960" cy="361800"/>
           </a:xfrm>
           <a:prstGeom prst="rect">
             <a:avLst/>
@@ -9614,7 +9614,7 @@
               </a:lnSpc>
               <a:buNone/>
             </a:pPr>
-            <a:fld id="{744022F6-C0C5-47AA-B14B-D67995D45B9B}" type="slidenum">
+            <a:fld id="{58C8FA7E-AAEC-4009-A6B6-0AFAC29F494B}" type="slidenum">
               <a:rPr b="0" lang="en-GB" sz="1200" spc="-1" strike="noStrike">
                 <a:solidFill>
                   <a:srgbClr val="8b8b8b"/>
@@ -9642,7 +9642,7 @@
         <p:spPr>
           <a:xfrm>
             <a:off x="838080" y="6356520"/>
-            <a:ext cx="2740320" cy="362160"/>
+            <a:ext cx="2739960" cy="361800"/>
           </a:xfrm>
           <a:prstGeom prst="rect">
             <a:avLst/>
@@ -9959,7 +9959,7 @@
         <p:spPr>
           <a:xfrm>
             <a:off x="4038480" y="6356520"/>
-            <a:ext cx="4111920" cy="362160"/>
+            <a:ext cx="4111560" cy="361800"/>
           </a:xfrm>
           <a:prstGeom prst="rect">
             <a:avLst/>
@@ -10016,7 +10016,7 @@
         <p:spPr>
           <a:xfrm>
             <a:off x="8610480" y="6356520"/>
-            <a:ext cx="2740320" cy="362160"/>
+            <a:ext cx="2739960" cy="361800"/>
           </a:xfrm>
           <a:prstGeom prst="rect">
             <a:avLst/>
@@ -10051,7 +10051,7 @@
               </a:lnSpc>
               <a:buNone/>
             </a:pPr>
-            <a:fld id="{017A91BE-AFDA-46B1-B110-0522A70576E8}" type="slidenum">
+            <a:fld id="{83D80796-4873-4074-93E2-E413AE95B49B}" type="slidenum">
               <a:rPr b="0" lang="en-GB" sz="1200" spc="-1" strike="noStrike">
                 <a:solidFill>
                   <a:srgbClr val="8b8b8b"/>
@@ -10079,7 +10079,7 @@
         <p:spPr>
           <a:xfrm>
             <a:off x="838080" y="6356520"/>
-            <a:ext cx="2740320" cy="362160"/>
+            <a:ext cx="2739960" cy="361800"/>
           </a:xfrm>
           <a:prstGeom prst="rect">
             <a:avLst/>
@@ -10396,7 +10396,7 @@
         <p:spPr>
           <a:xfrm>
             <a:off x="4038480" y="6356520"/>
-            <a:ext cx="4111920" cy="362160"/>
+            <a:ext cx="4111560" cy="361800"/>
           </a:xfrm>
           <a:prstGeom prst="rect">
             <a:avLst/>
@@ -10453,7 +10453,7 @@
         <p:spPr>
           <a:xfrm>
             <a:off x="8610480" y="6356520"/>
-            <a:ext cx="2740320" cy="362160"/>
+            <a:ext cx="2739960" cy="361800"/>
           </a:xfrm>
           <a:prstGeom prst="rect">
             <a:avLst/>
@@ -10488,7 +10488,7 @@
               </a:lnSpc>
               <a:buNone/>
             </a:pPr>
-            <a:fld id="{A87F6114-809F-4494-B242-935C4F5C755F}" type="slidenum">
+            <a:fld id="{B985146C-7557-4888-95F4-EA171F1DD509}" type="slidenum">
               <a:rPr b="0" lang="en-GB" sz="1200" spc="-1" strike="noStrike">
                 <a:solidFill>
                   <a:srgbClr val="8b8b8b"/>
@@ -10516,7 +10516,7 @@
         <p:spPr>
           <a:xfrm>
             <a:off x="838080" y="6356520"/>
-            <a:ext cx="2740320" cy="362160"/>
+            <a:ext cx="2739960" cy="361800"/>
           </a:xfrm>
           <a:prstGeom prst="rect">
             <a:avLst/>
@@ -10826,7 +10826,7 @@
         <p:spPr>
           <a:xfrm>
             <a:off x="838080" y="365040"/>
-            <a:ext cx="10512720" cy="1322640"/>
+            <a:ext cx="10512360" cy="1322280"/>
           </a:xfrm>
           <a:prstGeom prst="rect">
             <a:avLst/>
@@ -10875,7 +10875,7 @@
         <p:spPr>
           <a:xfrm>
             <a:off x="838080" y="1825560"/>
-            <a:ext cx="10512720" cy="4348440"/>
+            <a:ext cx="10512360" cy="4348080"/>
           </a:xfrm>
           <a:prstGeom prst="rect">
             <a:avLst/>
@@ -11096,7 +11096,7 @@
         <p:spPr>
           <a:xfrm>
             <a:off x="609480" y="273600"/>
-            <a:ext cx="10971720" cy="1144080"/>
+            <a:ext cx="10971360" cy="1143720"/>
           </a:xfrm>
           <a:prstGeom prst="rect">
             <a:avLst/>
@@ -11138,7 +11138,7 @@
         <p:spPr>
           <a:xfrm>
             <a:off x="360000" y="1440000"/>
-            <a:ext cx="11519280" cy="2393280"/>
+            <a:ext cx="11518920" cy="3960000"/>
           </a:xfrm>
           <a:prstGeom prst="rect">
             <a:avLst/>
@@ -11247,7 +11247,28 @@
                 <a:latin typeface="Arial"/>
                 <a:ea typeface="DejaVu Sans"/>
               </a:rPr>
-              <a:t>Sensitive data will only be stored as encrypted data.</a:t>
+              <a:t>Sensitive data, such as medication information, will only be stored as encrypted data.</a:t>
+            </a:r>
+            <a:endParaRPr b="0" lang="en-IE" sz="1800" spc="-1" strike="noStrike">
+              <a:latin typeface="Arial"/>
+            </a:endParaRPr>
+          </a:p>
+          <a:p>
+            <a:pPr>
+              <a:lnSpc>
+                <a:spcPct val="100000"/>
+              </a:lnSpc>
+              <a:buNone/>
+            </a:pPr>
+            <a:r>
+              <a:rPr b="0" lang="en-IE" sz="1800" spc="-1" strike="noStrike">
+                <a:solidFill>
+                  <a:srgbClr val="000000"/>
+                </a:solidFill>
+                <a:latin typeface="Arial"/>
+                <a:ea typeface="DejaVu Sans"/>
+              </a:rPr>
+              <a:t>End to end encryption will be used to ensure only the user as access to sensitive data in a decrypted form.</a:t>
             </a:r>
             <a:endParaRPr b="0" lang="en-IE" sz="1800" spc="-1" strike="noStrike">
               <a:latin typeface="Arial"/>
@@ -11289,7 +11310,7 @@
                 <a:latin typeface="Arial"/>
                 <a:ea typeface="DejaVu Sans"/>
               </a:rPr>
-              <a:t>Only the next number of times to take medication and which specific box it is stored in will be stored locally.</a:t>
+              <a:t>Only times to take medication and which specific box it is stored in will be stored locally.</a:t>
             </a:r>
             <a:endParaRPr b="0" lang="en-IE" sz="1800" spc="-1" strike="noStrike">
               <a:latin typeface="Arial"/>
@@ -11310,7 +11331,7 @@
                 <a:latin typeface="Arial"/>
                 <a:ea typeface="DejaVu Sans"/>
               </a:rPr>
-              <a:t>If sensor data is required to be stored locally due to an inability to communicate with the server, it will be wipe after the connection is reestablished and the updates are applied.</a:t>
+              <a:t>If sensor data is required to be stored locally due to an inability to communicate with the server, it will be wiped after the connection is reestablished and the updates are applied.</a:t>
             </a:r>
             <a:endParaRPr b="0" lang="en-IE" sz="1800" spc="-1" strike="noStrike">
               <a:latin typeface="Arial"/>
@@ -11361,7 +11382,7 @@
         <p:spPr>
           <a:xfrm>
             <a:off x="609480" y="273600"/>
-            <a:ext cx="10970280" cy="1142640"/>
+            <a:ext cx="10969920" cy="1142280"/>
           </a:xfrm>
           <a:prstGeom prst="rect">
             <a:avLst/>
@@ -11403,7 +11424,7 @@
         <p:spPr>
           <a:xfrm>
             <a:off x="1080000" y="1800000"/>
-            <a:ext cx="10257840" cy="4137840"/>
+            <a:ext cx="10257480" cy="4137480"/>
           </a:xfrm>
           <a:prstGeom prst="rect">
             <a:avLst/>
@@ -11521,7 +11542,7 @@
         <p:spPr>
           <a:xfrm>
             <a:off x="838080" y="365040"/>
-            <a:ext cx="10512720" cy="1322640"/>
+            <a:ext cx="10512360" cy="1322280"/>
           </a:xfrm>
           <a:prstGeom prst="rect">
             <a:avLst/>
@@ -11570,7 +11591,7 @@
         <p:spPr>
           <a:xfrm>
             <a:off x="838080" y="1825560"/>
-            <a:ext cx="10512720" cy="4348440"/>
+            <a:ext cx="10512360" cy="4348080"/>
           </a:xfrm>
           <a:prstGeom prst="rect">
             <a:avLst/>
@@ -11751,7 +11772,7 @@
         <p:spPr>
           <a:xfrm>
             <a:off x="609480" y="273600"/>
-            <a:ext cx="10970280" cy="1142640"/>
+            <a:ext cx="10969920" cy="1142280"/>
           </a:xfrm>
           <a:prstGeom prst="rect">
             <a:avLst/>
@@ -11793,7 +11814,7 @@
         <p:spPr>
           <a:xfrm>
             <a:off x="900000" y="1800000"/>
-            <a:ext cx="10797840" cy="2647800"/>
+            <a:ext cx="10797480" cy="2647440"/>
           </a:xfrm>
           <a:prstGeom prst="rect">
             <a:avLst/>
@@ -12140,7 +12161,7 @@
         <p:spPr>
           <a:xfrm>
             <a:off x="7560000" y="1416240"/>
-            <a:ext cx="4021920" cy="2858400"/>
+            <a:ext cx="4021560" cy="2858040"/>
           </a:xfrm>
           <a:prstGeom prst="rect">
             <a:avLst/>
@@ -12193,7 +12214,7 @@
         <p:spPr>
           <a:xfrm>
             <a:off x="609480" y="273600"/>
-            <a:ext cx="10970280" cy="1142640"/>
+            <a:ext cx="10969920" cy="1142280"/>
           </a:xfrm>
           <a:prstGeom prst="rect">
             <a:avLst/>
@@ -12235,7 +12256,7 @@
         <p:spPr>
           <a:xfrm>
             <a:off x="540000" y="1620000"/>
-            <a:ext cx="11158200" cy="1880280"/>
+            <a:ext cx="11157840" cy="1879920"/>
           </a:xfrm>
           <a:prstGeom prst="rect">
             <a:avLst/>
@@ -12633,7 +12654,7 @@
         <p:spPr>
           <a:xfrm>
             <a:off x="838080" y="365040"/>
-            <a:ext cx="10512720" cy="1322640"/>
+            <a:ext cx="10512360" cy="1322280"/>
           </a:xfrm>
           <a:prstGeom prst="rect">
             <a:avLst/>
@@ -12682,7 +12703,7 @@
         <p:spPr>
           <a:xfrm>
             <a:off x="838080" y="1825560"/>
-            <a:ext cx="10512720" cy="4348440"/>
+            <a:ext cx="10512360" cy="4348080"/>
           </a:xfrm>
           <a:prstGeom prst="rect">
             <a:avLst/>
@@ -12849,7 +12870,7 @@
         <p:spPr>
           <a:xfrm>
             <a:off x="609480" y="273600"/>
-            <a:ext cx="10971000" cy="1143360"/>
+            <a:ext cx="10970640" cy="1143000"/>
           </a:xfrm>
           <a:prstGeom prst="rect">
             <a:avLst/>
@@ -12891,7 +12912,7 @@
         <p:spPr>
           <a:xfrm>
             <a:off x="720000" y="1620000"/>
-            <a:ext cx="11158560" cy="856800"/>
+            <a:ext cx="11158200" cy="856440"/>
           </a:xfrm>
           <a:prstGeom prst="rect">
             <a:avLst/>
@@ -12947,7 +12968,7 @@
                 <a:latin typeface="Arial"/>
                 <a:ea typeface="DejaVu Sans"/>
               </a:rPr>
-              <a:t>Medication data will be processed remotely on a server hosted by AWS.</a:t>
+              <a:t>Notifications and medication history will be process on the AWS server.</a:t>
             </a:r>
             <a:endParaRPr b="0" lang="en-IE" sz="1800" spc="-1" strike="noStrike">
               <a:latin typeface="Arial"/>
@@ -12968,7 +12989,7 @@
                 <a:latin typeface="Arial"/>
                 <a:ea typeface="DejaVu Sans"/>
               </a:rPr>
-              <a:t>Notifications will be sent to the users’ devices by AWS.</a:t>
+              <a:t>Notifications will be sent to the users’ devices by AWS server.</a:t>
             </a:r>
             <a:endParaRPr b="0" lang="en-IE" sz="1800" spc="-1" strike="noStrike">
               <a:latin typeface="Arial"/>
@@ -12989,7 +13010,7 @@
                 <a:latin typeface="Arial"/>
                 <a:ea typeface="DejaVu Sans"/>
               </a:rPr>
-              <a:t>Medication data will be entered and updated on a web or mobile client before being sent to AWS server.</a:t>
+              <a:t>Medication data will be edited on the web client before being sent to AWS server.</a:t>
             </a:r>
             <a:endParaRPr b="0" lang="en-IE" sz="1800" spc="-1" strike="noStrike">
               <a:latin typeface="Arial"/>
@@ -13115,7 +13136,7 @@
         <p:spPr>
           <a:xfrm>
             <a:off x="838080" y="365040"/>
-            <a:ext cx="10512720" cy="1322640"/>
+            <a:ext cx="10512360" cy="1322280"/>
           </a:xfrm>
           <a:prstGeom prst="rect">
             <a:avLst/>
@@ -13164,7 +13185,7 @@
         <p:spPr>
           <a:xfrm>
             <a:off x="838080" y="1825560"/>
-            <a:ext cx="10512720" cy="4348440"/>
+            <a:ext cx="10512360" cy="4348080"/>
           </a:xfrm>
           <a:prstGeom prst="rect">
             <a:avLst/>
@@ -13277,7 +13298,7 @@
         <p:spPr>
           <a:xfrm>
             <a:off x="838080" y="365040"/>
-            <a:ext cx="10512720" cy="1322640"/>
+            <a:ext cx="10512360" cy="1322280"/>
           </a:xfrm>
           <a:prstGeom prst="rect">
             <a:avLst/>
@@ -13326,7 +13347,7 @@
         <p:spPr>
           <a:xfrm>
             <a:off x="838080" y="1825560"/>
-            <a:ext cx="10512720" cy="4348440"/>
+            <a:ext cx="10512360" cy="4348080"/>
           </a:xfrm>
           <a:prstGeom prst="rect">
             <a:avLst/>

</xml_diff>

<commit_message>
Changed micro switch info
</commit_message>
<xml_diff>
--- a/Slideshow template.pptx
+++ b/Slideshow template.pptx
@@ -6,15 +6,14 @@
     <p:sldMasterId id="2147483661" r:id="rId3"/>
     <p:sldMasterId id="2147483674" r:id="rId4"/>
     <p:sldMasterId id="2147483687" r:id="rId5"/>
-    <p:sldMasterId id="2147483700" r:id="rId6"/>
   </p:sldMasterIdLst>
   <p:sldIdLst>
-    <p:sldId id="256" r:id="rId7"/>
-    <p:sldId id="257" r:id="rId8"/>
-    <p:sldId id="258" r:id="rId9"/>
-    <p:sldId id="259" r:id="rId10"/>
-    <p:sldId id="260" r:id="rId11"/>
-    <p:sldId id="261" r:id="rId12"/>
+    <p:sldId id="256" r:id="rId6"/>
+    <p:sldId id="257" r:id="rId7"/>
+    <p:sldId id="258" r:id="rId8"/>
+    <p:sldId id="259" r:id="rId9"/>
+    <p:sldId id="260" r:id="rId10"/>
+    <p:sldId id="261" r:id="rId11"/>
   </p:sldIdLst>
   <p:sldSz cx="12192000" cy="6858000"/>
   <p:notesSz cx="7559675" cy="10691813"/>
@@ -72,7 +71,7 @@
         <p:txBody>
           <a:bodyPr/>
           <a:p>
-            <a:fld id="{2D4E9CC8-4605-441E-B520-D8643A365F2D}" type="slidenum">
+            <a:fld id="{2CB93991-8103-45BB-9C33-C65B46A732CB}" type="slidenum">
               <a:t>&lt;#&gt;</a:t>
             </a:fld>
           </a:p>
@@ -260,7 +259,7 @@
         <p:txBody>
           <a:bodyPr/>
           <a:p>
-            <a:fld id="{B5AB0A38-843E-4955-95F6-2D9ED9EBF353}" type="slidenum">
+            <a:fld id="{70F74648-21DE-4BC5-945D-424E8C6B5A46}" type="slidenum">
               <a:t>&lt;#&gt;</a:t>
             </a:fld>
           </a:p>
@@ -516,7 +515,7 @@
         <p:txBody>
           <a:bodyPr/>
           <a:p>
-            <a:fld id="{3EB8763A-4B49-4E34-BB28-25A19CAC0EEF}" type="slidenum">
+            <a:fld id="{E96A0865-3694-467D-A55F-A04876A830CC}" type="slidenum">
               <a:t>&lt;#&gt;</a:t>
             </a:fld>
           </a:p>
@@ -840,7 +839,7 @@
         <p:txBody>
           <a:bodyPr/>
           <a:p>
-            <a:fld id="{C3880E71-681E-4D35-9DDF-92EDFCE24F2F}" type="slidenum">
+            <a:fld id="{4382D00B-1C90-4D61-B532-CDA8FB91D37E}" type="slidenum">
               <a:t>&lt;#&gt;</a:t>
             </a:fld>
           </a:p>
@@ -923,7 +922,7 @@
         <p:txBody>
           <a:bodyPr/>
           <a:p>
-            <a:fld id="{A8CB51B4-5DAB-4030-A682-E7D96DA12054}" type="slidenum">
+            <a:fld id="{8646B1C0-29AF-4B73-8C37-A2D6DAA041F1}" type="slidenum">
               <a:t>&lt;#&gt;</a:t>
             </a:fld>
           </a:p>
@@ -1080,7 +1079,7 @@
         <p:txBody>
           <a:bodyPr/>
           <a:p>
-            <a:fld id="{FE7CE054-554C-4EB0-B87A-5B5F776B3AB9}" type="slidenum">
+            <a:fld id="{1C8FF72A-B342-4387-8906-005883569B75}" type="slidenum">
               <a:t>&lt;#&gt;</a:t>
             </a:fld>
           </a:p>
@@ -1234,7 +1233,7 @@
         <p:txBody>
           <a:bodyPr/>
           <a:p>
-            <a:fld id="{E05291B9-A138-45AA-A1FA-142CF2F8DE0A}" type="slidenum">
+            <a:fld id="{D9D6D3FA-A324-4742-8B97-06723841D28D}" type="slidenum">
               <a:t>&lt;#&gt;</a:t>
             </a:fld>
           </a:p>
@@ -1422,7 +1421,7 @@
         <p:txBody>
           <a:bodyPr/>
           <a:p>
-            <a:fld id="{13D0F09F-D1F7-4E1F-8055-199EC6BA0C45}" type="slidenum">
+            <a:fld id="{57861A4E-C201-4CD0-A11E-C6F518219E11}" type="slidenum">
               <a:t>&lt;#&gt;</a:t>
             </a:fld>
           </a:p>
@@ -1542,7 +1541,7 @@
         <p:txBody>
           <a:bodyPr/>
           <a:p>
-            <a:fld id="{64B50A20-C81D-4BC6-A002-5C1EF59E302D}" type="slidenum">
+            <a:fld id="{C2840BEF-BD8D-458B-BDD7-0F573117FFE5}" type="slidenum">
               <a:t>&lt;#&gt;</a:t>
             </a:fld>
           </a:p>
@@ -1662,7 +1661,7 @@
         <p:txBody>
           <a:bodyPr/>
           <a:p>
-            <a:fld id="{56D49EA3-5608-4717-B8B8-DCC68B1373B0}" type="slidenum">
+            <a:fld id="{D42EEC06-4681-4C79-860C-260341E2D213}" type="slidenum">
               <a:t>&lt;#&gt;</a:t>
             </a:fld>
           </a:p>
@@ -1884,7 +1883,7 @@
         <p:txBody>
           <a:bodyPr/>
           <a:p>
-            <a:fld id="{C5A00EF4-0B1C-4046-83FD-53D18BFE48AB}" type="slidenum">
+            <a:fld id="{B2994421-C647-4024-99D8-5142F150BF58}" type="slidenum">
               <a:t>&lt;#&gt;</a:t>
             </a:fld>
           </a:p>
@@ -2041,7 +2040,7 @@
         <p:txBody>
           <a:bodyPr/>
           <a:p>
-            <a:fld id="{A4A7DA95-7888-4EC4-8554-EA01B829B985}" type="slidenum">
+            <a:fld id="{C79C4566-707E-479F-90A9-88A214B4BEEA}" type="slidenum">
               <a:t>&lt;#&gt;</a:t>
             </a:fld>
           </a:p>
@@ -2263,7 +2262,7 @@
         <p:txBody>
           <a:bodyPr/>
           <a:p>
-            <a:fld id="{2661E73C-7C59-4FB6-8D9F-265D70000B32}" type="slidenum">
+            <a:fld id="{AF7E91FF-FA6A-4D60-9C84-D3A844F0C4FE}" type="slidenum">
               <a:t>&lt;#&gt;</a:t>
             </a:fld>
           </a:p>
@@ -2485,7 +2484,7 @@
         <p:txBody>
           <a:bodyPr/>
           <a:p>
-            <a:fld id="{3A700A76-5005-44E0-B129-7747C3088752}" type="slidenum">
+            <a:fld id="{1A856060-CFBA-445C-8196-90F29538595E}" type="slidenum">
               <a:t>&lt;#&gt;</a:t>
             </a:fld>
           </a:p>
@@ -2673,7 +2672,7 @@
         <p:txBody>
           <a:bodyPr/>
           <a:p>
-            <a:fld id="{F86EE706-DA35-4119-9EB9-23AA89F1C74D}" type="slidenum">
+            <a:fld id="{EE9721A7-B638-443E-988B-4F8C4162AF9B}" type="slidenum">
               <a:t>&lt;#&gt;</a:t>
             </a:fld>
           </a:p>
@@ -2929,7 +2928,7 @@
         <p:txBody>
           <a:bodyPr/>
           <a:p>
-            <a:fld id="{D197F0DC-B1BB-4DF7-B262-9BCB4347E14C}" type="slidenum">
+            <a:fld id="{72F48204-198C-4CD8-8FBA-724FA4F77520}" type="slidenum">
               <a:t>&lt;#&gt;</a:t>
             </a:fld>
           </a:p>
@@ -3253,7 +3252,7 @@
         <p:txBody>
           <a:bodyPr/>
           <a:p>
-            <a:fld id="{70102285-C686-470A-BBAE-CC3770235687}" type="slidenum">
+            <a:fld id="{61B6D331-ACCF-4DB8-9DE9-44550B2304C6}" type="slidenum">
               <a:t>&lt;#&gt;</a:t>
             </a:fld>
           </a:p>
@@ -3336,7 +3335,7 @@
         <p:txBody>
           <a:bodyPr/>
           <a:p>
-            <a:fld id="{79566C53-9C5D-49D4-A35B-0F618CAA46E3}" type="slidenum">
+            <a:fld id="{F3C9D029-C62F-4A8F-A973-3BACF21597E3}" type="slidenum">
               <a:t>&lt;#&gt;</a:t>
             </a:fld>
           </a:p>
@@ -3493,7 +3492,7 @@
         <p:txBody>
           <a:bodyPr/>
           <a:p>
-            <a:fld id="{1CF6950D-6580-468E-AA30-FA05A7D932A3}" type="slidenum">
+            <a:fld id="{5CAB6F17-AEF3-42C9-BC40-26BE32689306}" type="slidenum">
               <a:t>&lt;#&gt;</a:t>
             </a:fld>
           </a:p>
@@ -3647,7 +3646,7 @@
         <p:txBody>
           <a:bodyPr/>
           <a:p>
-            <a:fld id="{A882FD80-45AD-4981-AE4A-759C5D06AA72}" type="slidenum">
+            <a:fld id="{8618AB83-5F47-4E08-A5B6-AB8C8ED326E5}" type="slidenum">
               <a:t>&lt;#&gt;</a:t>
             </a:fld>
           </a:p>
@@ -3835,7 +3834,7 @@
         <p:txBody>
           <a:bodyPr/>
           <a:p>
-            <a:fld id="{C4DA7A97-083B-4D8F-9C17-7BFC1A58663B}" type="slidenum">
+            <a:fld id="{7FF5BE94-440D-4369-B8D7-253CF2A18039}" type="slidenum">
               <a:t>&lt;#&gt;</a:t>
             </a:fld>
           </a:p>
@@ -3955,7 +3954,7 @@
         <p:txBody>
           <a:bodyPr/>
           <a:p>
-            <a:fld id="{271B586A-0956-467B-8A5E-FFB0C7A6A54C}" type="slidenum">
+            <a:fld id="{D6FB78DB-F006-4CED-8138-9EEBFAD29F0E}" type="slidenum">
               <a:t>&lt;#&gt;</a:t>
             </a:fld>
           </a:p>
@@ -4109,7 +4108,7 @@
         <p:txBody>
           <a:bodyPr/>
           <a:p>
-            <a:fld id="{EA0B19CA-A71F-4C24-B412-B41FA335F4A9}" type="slidenum">
+            <a:fld id="{654185C2-5B71-4A43-A519-E5232081980B}" type="slidenum">
               <a:t>&lt;#&gt;</a:t>
             </a:fld>
           </a:p>
@@ -4229,7 +4228,7 @@
         <p:txBody>
           <a:bodyPr/>
           <a:p>
-            <a:fld id="{7DB2FA1F-6533-4704-B5AE-262CA2C148DD}" type="slidenum">
+            <a:fld id="{FADAE761-D931-4CA8-BA75-D69BDC27911E}" type="slidenum">
               <a:t>&lt;#&gt;</a:t>
             </a:fld>
           </a:p>
@@ -4451,7 +4450,7 @@
         <p:txBody>
           <a:bodyPr/>
           <a:p>
-            <a:fld id="{703E25DD-2CA2-4999-8232-71489EC5545F}" type="slidenum">
+            <a:fld id="{1B29A35F-98C3-4541-9EDE-F5DA58F3A501}" type="slidenum">
               <a:t>&lt;#&gt;</a:t>
             </a:fld>
           </a:p>
@@ -4673,7 +4672,7 @@
         <p:txBody>
           <a:bodyPr/>
           <a:p>
-            <a:fld id="{B1DDA595-1F02-490B-B905-61ECFFB80AF6}" type="slidenum">
+            <a:fld id="{09814735-7288-4D62-A2C1-D7623DAFFFEC}" type="slidenum">
               <a:t>&lt;#&gt;</a:t>
             </a:fld>
           </a:p>
@@ -4895,7 +4894,7 @@
         <p:txBody>
           <a:bodyPr/>
           <a:p>
-            <a:fld id="{5539B2F1-63DF-4310-A12C-F74378977C0D}" type="slidenum">
+            <a:fld id="{AC6050D2-E478-48F3-949A-5C6A8B688050}" type="slidenum">
               <a:t>&lt;#&gt;</a:t>
             </a:fld>
           </a:p>
@@ -5083,7 +5082,7 @@
         <p:txBody>
           <a:bodyPr/>
           <a:p>
-            <a:fld id="{2670BCA3-08CC-4D1F-B675-D884E3B14929}" type="slidenum">
+            <a:fld id="{ED32D5D7-DFB2-4F85-AA5F-CCAE35921C53}" type="slidenum">
               <a:t>&lt;#&gt;</a:t>
             </a:fld>
           </a:p>
@@ -5339,7 +5338,7 @@
         <p:txBody>
           <a:bodyPr/>
           <a:p>
-            <a:fld id="{056FE1C7-D97A-41A8-A9B2-F02F6E5D638B}" type="slidenum">
+            <a:fld id="{E81F3385-3602-4B01-A9B1-F608EB2C9730}" type="slidenum">
               <a:t>&lt;#&gt;</a:t>
             </a:fld>
           </a:p>
@@ -5663,7 +5662,7 @@
         <p:txBody>
           <a:bodyPr/>
           <a:p>
-            <a:fld id="{367FD722-3B53-4B1C-B331-C862D9BC4A11}" type="slidenum">
+            <a:fld id="{A33E7D17-83C7-49A2-A176-AA1F1514FE3C}" type="slidenum">
               <a:t>&lt;#&gt;</a:t>
             </a:fld>
           </a:p>
@@ -5746,7 +5745,7 @@
         <p:txBody>
           <a:bodyPr/>
           <a:p>
-            <a:fld id="{56E70B8E-0141-4FED-AB1B-D89C3A5EC3E1}" type="slidenum">
+            <a:fld id="{DD196854-C4DF-4F0E-8A46-D995B1382063}" type="slidenum">
               <a:t>&lt;#&gt;</a:t>
             </a:fld>
           </a:p>
@@ -5903,7 +5902,7 @@
         <p:txBody>
           <a:bodyPr/>
           <a:p>
-            <a:fld id="{4A0CBF87-8320-475C-B56A-5CA98392E570}" type="slidenum">
+            <a:fld id="{41D7D8FE-D71B-44D6-BCCD-95872E026517}" type="slidenum">
               <a:t>&lt;#&gt;</a:t>
             </a:fld>
           </a:p>
@@ -6057,7 +6056,7 @@
         <p:txBody>
           <a:bodyPr/>
           <a:p>
-            <a:fld id="{18AA1015-1D41-4B0C-9CD3-71576E71ACE2}" type="slidenum">
+            <a:fld id="{2EDEDF05-FECF-429D-A124-2FC750E969DF}" type="slidenum">
               <a:t>&lt;#&gt;</a:t>
             </a:fld>
           </a:p>
@@ -6245,7 +6244,7 @@
         <p:txBody>
           <a:bodyPr/>
           <a:p>
-            <a:fld id="{1A19F2A4-E1E3-460A-9B43-2F590F071325}" type="slidenum">
+            <a:fld id="{98508261-A8EE-4BE6-ADF5-A16AEACFA237}" type="slidenum">
               <a:t>&lt;#&gt;</a:t>
             </a:fld>
           </a:p>
@@ -6433,7 +6432,7 @@
         <p:txBody>
           <a:bodyPr/>
           <a:p>
-            <a:fld id="{39DC5AF1-5917-40D3-A7EE-F00DF25E85F4}" type="slidenum">
+            <a:fld id="{0C7B9D34-BA0D-4A61-B19A-00A6C5016E0F}" type="slidenum">
               <a:t>&lt;#&gt;</a:t>
             </a:fld>
           </a:p>
@@ -6553,7 +6552,7 @@
         <p:txBody>
           <a:bodyPr/>
           <a:p>
-            <a:fld id="{350C9657-E31B-4441-BBE2-B7E5E511760D}" type="slidenum">
+            <a:fld id="{58B3A7EE-839B-40D5-A33A-A139DB35B953}" type="slidenum">
               <a:t>&lt;#&gt;</a:t>
             </a:fld>
           </a:p>
@@ -6673,7 +6672,7 @@
         <p:txBody>
           <a:bodyPr/>
           <a:p>
-            <a:fld id="{47110877-DE3E-41B3-89B7-1CBEE443FDB0}" type="slidenum">
+            <a:fld id="{74221E92-A6AB-4335-935A-7FF8FDCE0DEC}" type="slidenum">
               <a:t>&lt;#&gt;</a:t>
             </a:fld>
           </a:p>
@@ -6895,7 +6894,7 @@
         <p:txBody>
           <a:bodyPr/>
           <a:p>
-            <a:fld id="{64977504-C6CD-49BD-A026-DCD91371468F}" type="slidenum">
+            <a:fld id="{1505D9ED-47C6-43D4-A054-1D0F6065BFF1}" type="slidenum">
               <a:t>&lt;#&gt;</a:t>
             </a:fld>
           </a:p>
@@ -7117,7 +7116,7 @@
         <p:txBody>
           <a:bodyPr/>
           <a:p>
-            <a:fld id="{579A52BF-1CB3-4E03-ABE2-5622C43A76F3}" type="slidenum">
+            <a:fld id="{94855B97-198E-467E-8117-5C64ED197DF3}" type="slidenum">
               <a:t>&lt;#&gt;</a:t>
             </a:fld>
           </a:p>
@@ -7339,7 +7338,7 @@
         <p:txBody>
           <a:bodyPr/>
           <a:p>
-            <a:fld id="{EEA4F3B3-9A75-4F3A-AF32-CA9054B89F46}" type="slidenum">
+            <a:fld id="{E5EB0567-6341-4172-B396-717DA0BA002B}" type="slidenum">
               <a:t>&lt;#&gt;</a:t>
             </a:fld>
           </a:p>
@@ -7527,7 +7526,7 @@
         <p:txBody>
           <a:bodyPr/>
           <a:p>
-            <a:fld id="{E127A851-B7B6-4192-9E61-C518F94350DD}" type="slidenum">
+            <a:fld id="{EDAEF4EB-0CEF-459B-B0E7-6E6DDBA6CEF7}" type="slidenum">
               <a:t>&lt;#&gt;</a:t>
             </a:fld>
           </a:p>
@@ -7783,7 +7782,7 @@
         <p:txBody>
           <a:bodyPr/>
           <a:p>
-            <a:fld id="{AA603B97-79AE-42B0-876F-1358044112A8}" type="slidenum">
+            <a:fld id="{E90C0065-F79A-4B66-B00F-824CDAB7C5B0}" type="slidenum">
               <a:t>&lt;#&gt;</a:t>
             </a:fld>
           </a:p>
@@ -8107,7 +8106,7 @@
         <p:txBody>
           <a:bodyPr/>
           <a:p>
-            <a:fld id="{7270D429-ABE3-4A44-9BC1-6D0CF01ACF96}" type="slidenum">
+            <a:fld id="{FE52C7AC-86CB-41D7-A7A7-C60D1127FA85}" type="slidenum">
               <a:t>&lt;#&gt;</a:t>
             </a:fld>
           </a:p>
@@ -8121,89 +8120,6 @@
           </p:cNvSpPr>
           <p:nvPr>
             <p:ph type="dt" idx="12"/>
-          </p:nvPr>
-        </p:nvSpPr>
-        <p:spPr/>
-        <p:txBody>
-          <a:bodyPr/>
-          <a:p>
-            <a:r>
-              <a:rPr lang="en-IE"/>
-              <a:t/>
-            </a:r>
-          </a:p>
-        </p:txBody>
-      </p:sp>
-    </p:spTree>
-  </p:cSld>
-</p:sldLayout>
-</file>
-
-<file path=ppt/slideLayouts/slideLayout49.xml><?xml version="1.0" encoding="utf-8"?>
-<p:sldLayout xmlns:a="http://schemas.openxmlformats.org/drawingml/2006/main" xmlns:p="http://schemas.openxmlformats.org/presentationml/2006/main" xmlns:r="http://schemas.openxmlformats.org/officeDocument/2006/relationships" xmlns:p14="http://schemas.microsoft.com/office/powerpoint/2010/main" xmlns:p15="http://schemas.microsoft.com/office/powerpoint/2012/main" xmlns:mc="http://schemas.openxmlformats.org/markup-compatibility/2006" type="blank" preserve="1">
-  <p:cSld name="Blank Slide">
-    <p:spTree>
-      <p:nvGrpSpPr>
-        <p:cNvPr id="1" name=""/>
-        <p:cNvGrpSpPr/>
-        <p:nvPr/>
-      </p:nvGrpSpPr>
-      <p:grpSpPr>
-        <a:xfrm>
-          <a:off x="0" y="0"/>
-          <a:ext cx="0" cy="0"/>
-          <a:chOff x="0" y="0"/>
-          <a:chExt cx="0" cy="0"/>
-        </a:xfrm>
-      </p:grpSpPr>
-      <p:sp>
-        <p:nvSpPr>
-          <p:cNvPr id="2" name="PlaceHolder 1"/>
-          <p:cNvSpPr>
-            <a:spLocks noGrp="1"/>
-          </p:cNvSpPr>
-          <p:nvPr>
-            <p:ph type="ftr" idx="13"/>
-          </p:nvPr>
-        </p:nvSpPr>
-        <p:spPr/>
-        <p:txBody>
-          <a:bodyPr/>
-          <a:p>
-            <a:r>
-              <a:t>Footer</a:t>
-            </a:r>
-          </a:p>
-        </p:txBody>
-      </p:sp>
-      <p:sp>
-        <p:nvSpPr>
-          <p:cNvPr id="3" name="PlaceHolder 2"/>
-          <p:cNvSpPr>
-            <a:spLocks noGrp="1"/>
-          </p:cNvSpPr>
-          <p:nvPr>
-            <p:ph type="sldNum" idx="14"/>
-          </p:nvPr>
-        </p:nvSpPr>
-        <p:spPr/>
-        <p:txBody>
-          <a:bodyPr/>
-          <a:p>
-            <a:fld id="{D91BF520-0E4F-4098-8622-15D091A7F705}" type="slidenum">
-              <a:t>&lt;#&gt;</a:t>
-            </a:fld>
-          </a:p>
-        </p:txBody>
-      </p:sp>
-      <p:sp>
-        <p:nvSpPr>
-          <p:cNvPr id="4" name="PlaceHolder 3"/>
-          <p:cNvSpPr>
-            <a:spLocks noGrp="1"/>
-          </p:cNvSpPr>
-          <p:nvPr>
-            <p:ph type="dt" idx="15"/>
           </p:nvPr>
         </p:nvSpPr>
         <p:spPr/>
@@ -8310,7 +8226,7 @@
         <p:txBody>
           <a:bodyPr/>
           <a:p>
-            <a:fld id="{4F6FC5C9-A442-4B54-9DFC-8CE8D4F027F4}" type="slidenum">
+            <a:fld id="{2DE7318E-BEC9-49B0-94DE-7C1C29C661B0}" type="slidenum">
               <a:t>&lt;#&gt;</a:t>
             </a:fld>
           </a:p>
@@ -8324,1855 +8240,6 @@
           </p:cNvSpPr>
           <p:nvPr>
             <p:ph type="dt" idx="3"/>
-          </p:nvPr>
-        </p:nvSpPr>
-        <p:spPr/>
-        <p:txBody>
-          <a:bodyPr/>
-          <a:p>
-            <a:r>
-              <a:rPr lang="en-IE"/>
-              <a:t/>
-            </a:r>
-          </a:p>
-        </p:txBody>
-      </p:sp>
-    </p:spTree>
-  </p:cSld>
-</p:sldLayout>
-</file>
-
-<file path=ppt/slideLayouts/slideLayout50.xml><?xml version="1.0" encoding="utf-8"?>
-<p:sldLayout xmlns:a="http://schemas.openxmlformats.org/drawingml/2006/main" xmlns:p="http://schemas.openxmlformats.org/presentationml/2006/main" xmlns:r="http://schemas.openxmlformats.org/officeDocument/2006/relationships" xmlns:p14="http://schemas.microsoft.com/office/powerpoint/2010/main" xmlns:p15="http://schemas.microsoft.com/office/powerpoint/2012/main" xmlns:mc="http://schemas.openxmlformats.org/markup-compatibility/2006" type="tx" preserve="1">
-  <p:cSld name="Title Slide">
-    <p:spTree>
-      <p:nvGrpSpPr>
-        <p:cNvPr id="1" name=""/>
-        <p:cNvGrpSpPr/>
-        <p:nvPr/>
-      </p:nvGrpSpPr>
-      <p:grpSpPr>
-        <a:xfrm>
-          <a:off x="0" y="0"/>
-          <a:ext cx="0" cy="0"/>
-          <a:chOff x="0" y="0"/>
-          <a:chExt cx="0" cy="0"/>
-        </a:xfrm>
-      </p:grpSpPr>
-      <p:sp>
-        <p:nvSpPr>
-          <p:cNvPr id="169" name="PlaceHolder 1"/>
-          <p:cNvSpPr>
-            <a:spLocks noGrp="1"/>
-          </p:cNvSpPr>
-          <p:nvPr>
-            <p:ph type="title"/>
-          </p:nvPr>
-        </p:nvSpPr>
-        <p:spPr>
-          <a:xfrm>
-            <a:off x="609480" y="273600"/>
-            <a:ext cx="10972440" cy="1144800"/>
-          </a:xfrm>
-          <a:prstGeom prst="rect">
-            <a:avLst/>
-          </a:prstGeom>
-          <a:noFill/>
-          <a:ln w="0">
-            <a:noFill/>
-          </a:ln>
-        </p:spPr>
-        <p:txBody>
-          <a:bodyPr lIns="0" rIns="0" tIns="0" bIns="0" anchor="ctr">
-            <a:noAutofit/>
-          </a:bodyPr>
-          <a:p>
-            <a:pPr algn="ctr">
-              <a:buNone/>
-            </a:pPr>
-            <a:endParaRPr b="0" lang="en-IE" sz="4400" spc="-1" strike="noStrike">
-              <a:latin typeface="Arial"/>
-            </a:endParaRPr>
-          </a:p>
-        </p:txBody>
-      </p:sp>
-      <p:sp>
-        <p:nvSpPr>
-          <p:cNvPr id="170" name="PlaceHolder 2"/>
-          <p:cNvSpPr>
-            <a:spLocks noGrp="1"/>
-          </p:cNvSpPr>
-          <p:nvPr>
-            <p:ph type="subTitle"/>
-          </p:nvPr>
-        </p:nvSpPr>
-        <p:spPr>
-          <a:xfrm>
-            <a:off x="609480" y="1604520"/>
-            <a:ext cx="10972440" cy="3977280"/>
-          </a:xfrm>
-          <a:prstGeom prst="rect">
-            <a:avLst/>
-          </a:prstGeom>
-          <a:noFill/>
-          <a:ln w="0">
-            <a:noFill/>
-          </a:ln>
-        </p:spPr>
-        <p:txBody>
-          <a:bodyPr lIns="0" rIns="0" tIns="0" bIns="0" anchor="ctr">
-            <a:noAutofit/>
-          </a:bodyPr>
-          <a:p>
-            <a:pPr algn="ctr">
-              <a:buNone/>
-            </a:pPr>
-            <a:endParaRPr b="0" lang="en-IE" sz="3200" spc="-1" strike="noStrike">
-              <a:latin typeface="Arial"/>
-            </a:endParaRPr>
-          </a:p>
-        </p:txBody>
-      </p:sp>
-      <p:sp>
-        <p:nvSpPr>
-          <p:cNvPr id="4" name="PlaceHolder 3"/>
-          <p:cNvSpPr>
-            <a:spLocks noGrp="1"/>
-          </p:cNvSpPr>
-          <p:nvPr>
-            <p:ph type="ftr" idx="13"/>
-          </p:nvPr>
-        </p:nvSpPr>
-        <p:spPr/>
-        <p:txBody>
-          <a:bodyPr/>
-          <a:p>
-            <a:r>
-              <a:t>Footer</a:t>
-            </a:r>
-          </a:p>
-        </p:txBody>
-      </p:sp>
-      <p:sp>
-        <p:nvSpPr>
-          <p:cNvPr id="5" name="PlaceHolder 4"/>
-          <p:cNvSpPr>
-            <a:spLocks noGrp="1"/>
-          </p:cNvSpPr>
-          <p:nvPr>
-            <p:ph type="sldNum" idx="14"/>
-          </p:nvPr>
-        </p:nvSpPr>
-        <p:spPr/>
-        <p:txBody>
-          <a:bodyPr/>
-          <a:p>
-            <a:fld id="{AE3DBA56-23D6-45CC-A2F6-B59726B075FA}" type="slidenum">
-              <a:t>&lt;#&gt;</a:t>
-            </a:fld>
-          </a:p>
-        </p:txBody>
-      </p:sp>
-      <p:sp>
-        <p:nvSpPr>
-          <p:cNvPr id="6" name="PlaceHolder 5"/>
-          <p:cNvSpPr>
-            <a:spLocks noGrp="1"/>
-          </p:cNvSpPr>
-          <p:nvPr>
-            <p:ph type="dt" idx="15"/>
-          </p:nvPr>
-        </p:nvSpPr>
-        <p:spPr/>
-        <p:txBody>
-          <a:bodyPr/>
-          <a:p>
-            <a:r>
-              <a:rPr lang="en-IE"/>
-              <a:t/>
-            </a:r>
-          </a:p>
-        </p:txBody>
-      </p:sp>
-    </p:spTree>
-  </p:cSld>
-</p:sldLayout>
-</file>
-
-<file path=ppt/slideLayouts/slideLayout51.xml><?xml version="1.0" encoding="utf-8"?>
-<p:sldLayout xmlns:a="http://schemas.openxmlformats.org/drawingml/2006/main" xmlns:p="http://schemas.openxmlformats.org/presentationml/2006/main" xmlns:r="http://schemas.openxmlformats.org/officeDocument/2006/relationships" xmlns:p14="http://schemas.microsoft.com/office/powerpoint/2010/main" xmlns:p15="http://schemas.microsoft.com/office/powerpoint/2012/main" xmlns:mc="http://schemas.openxmlformats.org/markup-compatibility/2006" type="obj" preserve="1">
-  <p:cSld name="Title, Content">
-    <p:spTree>
-      <p:nvGrpSpPr>
-        <p:cNvPr id="1" name=""/>
-        <p:cNvGrpSpPr/>
-        <p:nvPr/>
-      </p:nvGrpSpPr>
-      <p:grpSpPr>
-        <a:xfrm>
-          <a:off x="0" y="0"/>
-          <a:ext cx="0" cy="0"/>
-          <a:chOff x="0" y="0"/>
-          <a:chExt cx="0" cy="0"/>
-        </a:xfrm>
-      </p:grpSpPr>
-      <p:sp>
-        <p:nvSpPr>
-          <p:cNvPr id="171" name="PlaceHolder 1"/>
-          <p:cNvSpPr>
-            <a:spLocks noGrp="1"/>
-          </p:cNvSpPr>
-          <p:nvPr>
-            <p:ph type="title"/>
-          </p:nvPr>
-        </p:nvSpPr>
-        <p:spPr>
-          <a:xfrm>
-            <a:off x="609480" y="273600"/>
-            <a:ext cx="10972440" cy="1144800"/>
-          </a:xfrm>
-          <a:prstGeom prst="rect">
-            <a:avLst/>
-          </a:prstGeom>
-          <a:noFill/>
-          <a:ln w="0">
-            <a:noFill/>
-          </a:ln>
-        </p:spPr>
-        <p:txBody>
-          <a:bodyPr lIns="0" rIns="0" tIns="0" bIns="0" anchor="ctr">
-            <a:noAutofit/>
-          </a:bodyPr>
-          <a:p>
-            <a:pPr algn="ctr">
-              <a:buNone/>
-            </a:pPr>
-            <a:endParaRPr b="0" lang="en-IE" sz="4400" spc="-1" strike="noStrike">
-              <a:latin typeface="Arial"/>
-            </a:endParaRPr>
-          </a:p>
-        </p:txBody>
-      </p:sp>
-      <p:sp>
-        <p:nvSpPr>
-          <p:cNvPr id="172" name="PlaceHolder 2"/>
-          <p:cNvSpPr>
-            <a:spLocks noGrp="1"/>
-          </p:cNvSpPr>
-          <p:nvPr>
-            <p:ph/>
-          </p:nvPr>
-        </p:nvSpPr>
-        <p:spPr>
-          <a:xfrm>
-            <a:off x="609480" y="1604520"/>
-            <a:ext cx="10972440" cy="3977280"/>
-          </a:xfrm>
-          <a:prstGeom prst="rect">
-            <a:avLst/>
-          </a:prstGeom>
-          <a:noFill/>
-          <a:ln w="0">
-            <a:noFill/>
-          </a:ln>
-        </p:spPr>
-        <p:txBody>
-          <a:bodyPr lIns="0" rIns="0" tIns="0" bIns="0" anchor="t">
-            <a:normAutofit/>
-          </a:bodyPr>
-          <a:p>
-            <a:endParaRPr b="0" lang="en-IE" sz="3200" spc="-1" strike="noStrike">
-              <a:latin typeface="Arial"/>
-            </a:endParaRPr>
-          </a:p>
-        </p:txBody>
-      </p:sp>
-      <p:sp>
-        <p:nvSpPr>
-          <p:cNvPr id="4" name="PlaceHolder 3"/>
-          <p:cNvSpPr>
-            <a:spLocks noGrp="1"/>
-          </p:cNvSpPr>
-          <p:nvPr>
-            <p:ph type="ftr" idx="13"/>
-          </p:nvPr>
-        </p:nvSpPr>
-        <p:spPr/>
-        <p:txBody>
-          <a:bodyPr/>
-          <a:p>
-            <a:r>
-              <a:t>Footer</a:t>
-            </a:r>
-          </a:p>
-        </p:txBody>
-      </p:sp>
-      <p:sp>
-        <p:nvSpPr>
-          <p:cNvPr id="5" name="PlaceHolder 4"/>
-          <p:cNvSpPr>
-            <a:spLocks noGrp="1"/>
-          </p:cNvSpPr>
-          <p:nvPr>
-            <p:ph type="sldNum" idx="14"/>
-          </p:nvPr>
-        </p:nvSpPr>
-        <p:spPr/>
-        <p:txBody>
-          <a:bodyPr/>
-          <a:p>
-            <a:fld id="{3B936D4E-3A87-43E2-8D7D-304F964CAE8B}" type="slidenum">
-              <a:t>&lt;#&gt;</a:t>
-            </a:fld>
-          </a:p>
-        </p:txBody>
-      </p:sp>
-      <p:sp>
-        <p:nvSpPr>
-          <p:cNvPr id="6" name="PlaceHolder 5"/>
-          <p:cNvSpPr>
-            <a:spLocks noGrp="1"/>
-          </p:cNvSpPr>
-          <p:nvPr>
-            <p:ph type="dt" idx="15"/>
-          </p:nvPr>
-        </p:nvSpPr>
-        <p:spPr/>
-        <p:txBody>
-          <a:bodyPr/>
-          <a:p>
-            <a:r>
-              <a:rPr lang="en-IE"/>
-              <a:t/>
-            </a:r>
-          </a:p>
-        </p:txBody>
-      </p:sp>
-    </p:spTree>
-  </p:cSld>
-</p:sldLayout>
-</file>
-
-<file path=ppt/slideLayouts/slideLayout52.xml><?xml version="1.0" encoding="utf-8"?>
-<p:sldLayout xmlns:a="http://schemas.openxmlformats.org/drawingml/2006/main" xmlns:p="http://schemas.openxmlformats.org/presentationml/2006/main" xmlns:r="http://schemas.openxmlformats.org/officeDocument/2006/relationships" xmlns:p14="http://schemas.microsoft.com/office/powerpoint/2010/main" xmlns:p15="http://schemas.microsoft.com/office/powerpoint/2012/main" xmlns:mc="http://schemas.openxmlformats.org/markup-compatibility/2006" type="twoObj" preserve="1">
-  <p:cSld name="Title, 2 Content">
-    <p:spTree>
-      <p:nvGrpSpPr>
-        <p:cNvPr id="1" name=""/>
-        <p:cNvGrpSpPr/>
-        <p:nvPr/>
-      </p:nvGrpSpPr>
-      <p:grpSpPr>
-        <a:xfrm>
-          <a:off x="0" y="0"/>
-          <a:ext cx="0" cy="0"/>
-          <a:chOff x="0" y="0"/>
-          <a:chExt cx="0" cy="0"/>
-        </a:xfrm>
-      </p:grpSpPr>
-      <p:sp>
-        <p:nvSpPr>
-          <p:cNvPr id="173" name="PlaceHolder 1"/>
-          <p:cNvSpPr>
-            <a:spLocks noGrp="1"/>
-          </p:cNvSpPr>
-          <p:nvPr>
-            <p:ph type="title"/>
-          </p:nvPr>
-        </p:nvSpPr>
-        <p:spPr>
-          <a:xfrm>
-            <a:off x="609480" y="273600"/>
-            <a:ext cx="10972440" cy="1144800"/>
-          </a:xfrm>
-          <a:prstGeom prst="rect">
-            <a:avLst/>
-          </a:prstGeom>
-          <a:noFill/>
-          <a:ln w="0">
-            <a:noFill/>
-          </a:ln>
-        </p:spPr>
-        <p:txBody>
-          <a:bodyPr lIns="0" rIns="0" tIns="0" bIns="0" anchor="ctr">
-            <a:noAutofit/>
-          </a:bodyPr>
-          <a:p>
-            <a:pPr algn="ctr">
-              <a:buNone/>
-            </a:pPr>
-            <a:endParaRPr b="0" lang="en-IE" sz="4400" spc="-1" strike="noStrike">
-              <a:latin typeface="Arial"/>
-            </a:endParaRPr>
-          </a:p>
-        </p:txBody>
-      </p:sp>
-      <p:sp>
-        <p:nvSpPr>
-          <p:cNvPr id="174" name="PlaceHolder 2"/>
-          <p:cNvSpPr>
-            <a:spLocks noGrp="1"/>
-          </p:cNvSpPr>
-          <p:nvPr>
-            <p:ph/>
-          </p:nvPr>
-        </p:nvSpPr>
-        <p:spPr>
-          <a:xfrm>
-            <a:off x="609480" y="1604520"/>
-            <a:ext cx="5354280" cy="3977280"/>
-          </a:xfrm>
-          <a:prstGeom prst="rect">
-            <a:avLst/>
-          </a:prstGeom>
-          <a:noFill/>
-          <a:ln w="0">
-            <a:noFill/>
-          </a:ln>
-        </p:spPr>
-        <p:txBody>
-          <a:bodyPr lIns="0" rIns="0" tIns="0" bIns="0" anchor="t">
-            <a:normAutofit/>
-          </a:bodyPr>
-          <a:p>
-            <a:endParaRPr b="0" lang="en-IE" sz="3200" spc="-1" strike="noStrike">
-              <a:latin typeface="Arial"/>
-            </a:endParaRPr>
-          </a:p>
-        </p:txBody>
-      </p:sp>
-      <p:sp>
-        <p:nvSpPr>
-          <p:cNvPr id="175" name="PlaceHolder 3"/>
-          <p:cNvSpPr>
-            <a:spLocks noGrp="1"/>
-          </p:cNvSpPr>
-          <p:nvPr>
-            <p:ph/>
-          </p:nvPr>
-        </p:nvSpPr>
-        <p:spPr>
-          <a:xfrm>
-            <a:off x="6231960" y="1604520"/>
-            <a:ext cx="5354280" cy="3977280"/>
-          </a:xfrm>
-          <a:prstGeom prst="rect">
-            <a:avLst/>
-          </a:prstGeom>
-          <a:noFill/>
-          <a:ln w="0">
-            <a:noFill/>
-          </a:ln>
-        </p:spPr>
-        <p:txBody>
-          <a:bodyPr lIns="0" rIns="0" tIns="0" bIns="0" anchor="t">
-            <a:normAutofit/>
-          </a:bodyPr>
-          <a:p>
-            <a:endParaRPr b="0" lang="en-IE" sz="3200" spc="-1" strike="noStrike">
-              <a:latin typeface="Arial"/>
-            </a:endParaRPr>
-          </a:p>
-        </p:txBody>
-      </p:sp>
-      <p:sp>
-        <p:nvSpPr>
-          <p:cNvPr id="5" name="PlaceHolder 4"/>
-          <p:cNvSpPr>
-            <a:spLocks noGrp="1"/>
-          </p:cNvSpPr>
-          <p:nvPr>
-            <p:ph type="ftr" idx="13"/>
-          </p:nvPr>
-        </p:nvSpPr>
-        <p:spPr/>
-        <p:txBody>
-          <a:bodyPr/>
-          <a:p>
-            <a:r>
-              <a:t>Footer</a:t>
-            </a:r>
-          </a:p>
-        </p:txBody>
-      </p:sp>
-      <p:sp>
-        <p:nvSpPr>
-          <p:cNvPr id="6" name="PlaceHolder 5"/>
-          <p:cNvSpPr>
-            <a:spLocks noGrp="1"/>
-          </p:cNvSpPr>
-          <p:nvPr>
-            <p:ph type="sldNum" idx="14"/>
-          </p:nvPr>
-        </p:nvSpPr>
-        <p:spPr/>
-        <p:txBody>
-          <a:bodyPr/>
-          <a:p>
-            <a:fld id="{63173588-CA29-4AD8-AA2B-7C585F085FA9}" type="slidenum">
-              <a:t>&lt;#&gt;</a:t>
-            </a:fld>
-          </a:p>
-        </p:txBody>
-      </p:sp>
-      <p:sp>
-        <p:nvSpPr>
-          <p:cNvPr id="7" name="PlaceHolder 6"/>
-          <p:cNvSpPr>
-            <a:spLocks noGrp="1"/>
-          </p:cNvSpPr>
-          <p:nvPr>
-            <p:ph type="dt" idx="15"/>
-          </p:nvPr>
-        </p:nvSpPr>
-        <p:spPr/>
-        <p:txBody>
-          <a:bodyPr/>
-          <a:p>
-            <a:r>
-              <a:rPr lang="en-IE"/>
-              <a:t/>
-            </a:r>
-          </a:p>
-        </p:txBody>
-      </p:sp>
-    </p:spTree>
-  </p:cSld>
-</p:sldLayout>
-</file>
-
-<file path=ppt/slideLayouts/slideLayout53.xml><?xml version="1.0" encoding="utf-8"?>
-<p:sldLayout xmlns:a="http://schemas.openxmlformats.org/drawingml/2006/main" xmlns:p="http://schemas.openxmlformats.org/presentationml/2006/main" xmlns:r="http://schemas.openxmlformats.org/officeDocument/2006/relationships" xmlns:p14="http://schemas.microsoft.com/office/powerpoint/2010/main" xmlns:p15="http://schemas.microsoft.com/office/powerpoint/2012/main" xmlns:mc="http://schemas.openxmlformats.org/markup-compatibility/2006" type="titleOnly" preserve="1">
-  <p:cSld name="Title Only">
-    <p:spTree>
-      <p:nvGrpSpPr>
-        <p:cNvPr id="1" name=""/>
-        <p:cNvGrpSpPr/>
-        <p:nvPr/>
-      </p:nvGrpSpPr>
-      <p:grpSpPr>
-        <a:xfrm>
-          <a:off x="0" y="0"/>
-          <a:ext cx="0" cy="0"/>
-          <a:chOff x="0" y="0"/>
-          <a:chExt cx="0" cy="0"/>
-        </a:xfrm>
-      </p:grpSpPr>
-      <p:sp>
-        <p:nvSpPr>
-          <p:cNvPr id="176" name="PlaceHolder 1"/>
-          <p:cNvSpPr>
-            <a:spLocks noGrp="1"/>
-          </p:cNvSpPr>
-          <p:nvPr>
-            <p:ph type="title"/>
-          </p:nvPr>
-        </p:nvSpPr>
-        <p:spPr>
-          <a:xfrm>
-            <a:off x="609480" y="273600"/>
-            <a:ext cx="10972440" cy="1144800"/>
-          </a:xfrm>
-          <a:prstGeom prst="rect">
-            <a:avLst/>
-          </a:prstGeom>
-          <a:noFill/>
-          <a:ln w="0">
-            <a:noFill/>
-          </a:ln>
-        </p:spPr>
-        <p:txBody>
-          <a:bodyPr lIns="0" rIns="0" tIns="0" bIns="0" anchor="ctr">
-            <a:noAutofit/>
-          </a:bodyPr>
-          <a:p>
-            <a:pPr algn="ctr">
-              <a:buNone/>
-            </a:pPr>
-            <a:endParaRPr b="0" lang="en-IE" sz="4400" spc="-1" strike="noStrike">
-              <a:latin typeface="Arial"/>
-            </a:endParaRPr>
-          </a:p>
-        </p:txBody>
-      </p:sp>
-      <p:sp>
-        <p:nvSpPr>
-          <p:cNvPr id="3" name="PlaceHolder 2"/>
-          <p:cNvSpPr>
-            <a:spLocks noGrp="1"/>
-          </p:cNvSpPr>
-          <p:nvPr>
-            <p:ph type="ftr" idx="13"/>
-          </p:nvPr>
-        </p:nvSpPr>
-        <p:spPr/>
-        <p:txBody>
-          <a:bodyPr/>
-          <a:p>
-            <a:r>
-              <a:t>Footer</a:t>
-            </a:r>
-          </a:p>
-        </p:txBody>
-      </p:sp>
-      <p:sp>
-        <p:nvSpPr>
-          <p:cNvPr id="4" name="PlaceHolder 3"/>
-          <p:cNvSpPr>
-            <a:spLocks noGrp="1"/>
-          </p:cNvSpPr>
-          <p:nvPr>
-            <p:ph type="sldNum" idx="14"/>
-          </p:nvPr>
-        </p:nvSpPr>
-        <p:spPr/>
-        <p:txBody>
-          <a:bodyPr/>
-          <a:p>
-            <a:fld id="{54749C02-36D1-4656-B722-C7A5A1E830D9}" type="slidenum">
-              <a:t>&lt;#&gt;</a:t>
-            </a:fld>
-          </a:p>
-        </p:txBody>
-      </p:sp>
-      <p:sp>
-        <p:nvSpPr>
-          <p:cNvPr id="5" name="PlaceHolder 4"/>
-          <p:cNvSpPr>
-            <a:spLocks noGrp="1"/>
-          </p:cNvSpPr>
-          <p:nvPr>
-            <p:ph type="dt" idx="15"/>
-          </p:nvPr>
-        </p:nvSpPr>
-        <p:spPr/>
-        <p:txBody>
-          <a:bodyPr/>
-          <a:p>
-            <a:r>
-              <a:rPr lang="en-IE"/>
-              <a:t/>
-            </a:r>
-          </a:p>
-        </p:txBody>
-      </p:sp>
-    </p:spTree>
-  </p:cSld>
-</p:sldLayout>
-</file>
-
-<file path=ppt/slideLayouts/slideLayout54.xml><?xml version="1.0" encoding="utf-8"?>
-<p:sldLayout xmlns:a="http://schemas.openxmlformats.org/drawingml/2006/main" xmlns:p="http://schemas.openxmlformats.org/presentationml/2006/main" xmlns:r="http://schemas.openxmlformats.org/officeDocument/2006/relationships" xmlns:p14="http://schemas.microsoft.com/office/powerpoint/2010/main" xmlns:p15="http://schemas.microsoft.com/office/powerpoint/2012/main" xmlns:mc="http://schemas.openxmlformats.org/markup-compatibility/2006" type="objOnly" preserve="1">
-  <p:cSld name="Centered Text">
-    <p:spTree>
-      <p:nvGrpSpPr>
-        <p:cNvPr id="1" name=""/>
-        <p:cNvGrpSpPr/>
-        <p:nvPr/>
-      </p:nvGrpSpPr>
-      <p:grpSpPr>
-        <a:xfrm>
-          <a:off x="0" y="0"/>
-          <a:ext cx="0" cy="0"/>
-          <a:chOff x="0" y="0"/>
-          <a:chExt cx="0" cy="0"/>
-        </a:xfrm>
-      </p:grpSpPr>
-      <p:sp>
-        <p:nvSpPr>
-          <p:cNvPr id="177" name="PlaceHolder 1"/>
-          <p:cNvSpPr>
-            <a:spLocks noGrp="1"/>
-          </p:cNvSpPr>
-          <p:nvPr>
-            <p:ph type="subTitle"/>
-          </p:nvPr>
-        </p:nvSpPr>
-        <p:spPr>
-          <a:xfrm>
-            <a:off x="609480" y="273600"/>
-            <a:ext cx="10972440" cy="5307840"/>
-          </a:xfrm>
-          <a:prstGeom prst="rect">
-            <a:avLst/>
-          </a:prstGeom>
-          <a:noFill/>
-          <a:ln w="0">
-            <a:noFill/>
-          </a:ln>
-        </p:spPr>
-        <p:txBody>
-          <a:bodyPr lIns="0" rIns="0" tIns="0" bIns="0" anchor="ctr">
-            <a:noAutofit/>
-          </a:bodyPr>
-          <a:p>
-            <a:pPr algn="ctr">
-              <a:buNone/>
-            </a:pPr>
-            <a:endParaRPr b="0" lang="en-IE" sz="3200" spc="-1" strike="noStrike">
-              <a:latin typeface="Arial"/>
-            </a:endParaRPr>
-          </a:p>
-        </p:txBody>
-      </p:sp>
-      <p:sp>
-        <p:nvSpPr>
-          <p:cNvPr id="3" name="PlaceHolder 2"/>
-          <p:cNvSpPr>
-            <a:spLocks noGrp="1"/>
-          </p:cNvSpPr>
-          <p:nvPr>
-            <p:ph type="ftr" idx="13"/>
-          </p:nvPr>
-        </p:nvSpPr>
-        <p:spPr/>
-        <p:txBody>
-          <a:bodyPr/>
-          <a:p>
-            <a:r>
-              <a:t>Footer</a:t>
-            </a:r>
-          </a:p>
-        </p:txBody>
-      </p:sp>
-      <p:sp>
-        <p:nvSpPr>
-          <p:cNvPr id="4" name="PlaceHolder 3"/>
-          <p:cNvSpPr>
-            <a:spLocks noGrp="1"/>
-          </p:cNvSpPr>
-          <p:nvPr>
-            <p:ph type="sldNum" idx="14"/>
-          </p:nvPr>
-        </p:nvSpPr>
-        <p:spPr/>
-        <p:txBody>
-          <a:bodyPr/>
-          <a:p>
-            <a:fld id="{DE9F04D0-D0EA-47A9-94D8-1B1F64642597}" type="slidenum">
-              <a:t>&lt;#&gt;</a:t>
-            </a:fld>
-          </a:p>
-        </p:txBody>
-      </p:sp>
-      <p:sp>
-        <p:nvSpPr>
-          <p:cNvPr id="5" name="PlaceHolder 4"/>
-          <p:cNvSpPr>
-            <a:spLocks noGrp="1"/>
-          </p:cNvSpPr>
-          <p:nvPr>
-            <p:ph type="dt" idx="15"/>
-          </p:nvPr>
-        </p:nvSpPr>
-        <p:spPr/>
-        <p:txBody>
-          <a:bodyPr/>
-          <a:p>
-            <a:r>
-              <a:rPr lang="en-IE"/>
-              <a:t/>
-            </a:r>
-          </a:p>
-        </p:txBody>
-      </p:sp>
-    </p:spTree>
-  </p:cSld>
-</p:sldLayout>
-</file>
-
-<file path=ppt/slideLayouts/slideLayout55.xml><?xml version="1.0" encoding="utf-8"?>
-<p:sldLayout xmlns:a="http://schemas.openxmlformats.org/drawingml/2006/main" xmlns:p="http://schemas.openxmlformats.org/presentationml/2006/main" xmlns:r="http://schemas.openxmlformats.org/officeDocument/2006/relationships" xmlns:p14="http://schemas.microsoft.com/office/powerpoint/2010/main" xmlns:p15="http://schemas.microsoft.com/office/powerpoint/2012/main" xmlns:mc="http://schemas.openxmlformats.org/markup-compatibility/2006" type="twoObjAndObj" preserve="1">
-  <p:cSld name="Title, 2 Content and Content">
-    <p:spTree>
-      <p:nvGrpSpPr>
-        <p:cNvPr id="1" name=""/>
-        <p:cNvGrpSpPr/>
-        <p:nvPr/>
-      </p:nvGrpSpPr>
-      <p:grpSpPr>
-        <a:xfrm>
-          <a:off x="0" y="0"/>
-          <a:ext cx="0" cy="0"/>
-          <a:chOff x="0" y="0"/>
-          <a:chExt cx="0" cy="0"/>
-        </a:xfrm>
-      </p:grpSpPr>
-      <p:sp>
-        <p:nvSpPr>
-          <p:cNvPr id="178" name="PlaceHolder 1"/>
-          <p:cNvSpPr>
-            <a:spLocks noGrp="1"/>
-          </p:cNvSpPr>
-          <p:nvPr>
-            <p:ph type="title"/>
-          </p:nvPr>
-        </p:nvSpPr>
-        <p:spPr>
-          <a:xfrm>
-            <a:off x="609480" y="273600"/>
-            <a:ext cx="10972440" cy="1144800"/>
-          </a:xfrm>
-          <a:prstGeom prst="rect">
-            <a:avLst/>
-          </a:prstGeom>
-          <a:noFill/>
-          <a:ln w="0">
-            <a:noFill/>
-          </a:ln>
-        </p:spPr>
-        <p:txBody>
-          <a:bodyPr lIns="0" rIns="0" tIns="0" bIns="0" anchor="ctr">
-            <a:noAutofit/>
-          </a:bodyPr>
-          <a:p>
-            <a:pPr algn="ctr">
-              <a:buNone/>
-            </a:pPr>
-            <a:endParaRPr b="0" lang="en-IE" sz="4400" spc="-1" strike="noStrike">
-              <a:latin typeface="Arial"/>
-            </a:endParaRPr>
-          </a:p>
-        </p:txBody>
-      </p:sp>
-      <p:sp>
-        <p:nvSpPr>
-          <p:cNvPr id="179" name="PlaceHolder 2"/>
-          <p:cNvSpPr>
-            <a:spLocks noGrp="1"/>
-          </p:cNvSpPr>
-          <p:nvPr>
-            <p:ph/>
-          </p:nvPr>
-        </p:nvSpPr>
-        <p:spPr>
-          <a:xfrm>
-            <a:off x="609480" y="1604520"/>
-            <a:ext cx="5354280" cy="1896840"/>
-          </a:xfrm>
-          <a:prstGeom prst="rect">
-            <a:avLst/>
-          </a:prstGeom>
-          <a:noFill/>
-          <a:ln w="0">
-            <a:noFill/>
-          </a:ln>
-        </p:spPr>
-        <p:txBody>
-          <a:bodyPr lIns="0" rIns="0" tIns="0" bIns="0" anchor="t">
-            <a:normAutofit/>
-          </a:bodyPr>
-          <a:p>
-            <a:endParaRPr b="0" lang="en-IE" sz="3200" spc="-1" strike="noStrike">
-              <a:latin typeface="Arial"/>
-            </a:endParaRPr>
-          </a:p>
-        </p:txBody>
-      </p:sp>
-      <p:sp>
-        <p:nvSpPr>
-          <p:cNvPr id="180" name="PlaceHolder 3"/>
-          <p:cNvSpPr>
-            <a:spLocks noGrp="1"/>
-          </p:cNvSpPr>
-          <p:nvPr>
-            <p:ph/>
-          </p:nvPr>
-        </p:nvSpPr>
-        <p:spPr>
-          <a:xfrm>
-            <a:off x="6231960" y="1604520"/>
-            <a:ext cx="5354280" cy="3977280"/>
-          </a:xfrm>
-          <a:prstGeom prst="rect">
-            <a:avLst/>
-          </a:prstGeom>
-          <a:noFill/>
-          <a:ln w="0">
-            <a:noFill/>
-          </a:ln>
-        </p:spPr>
-        <p:txBody>
-          <a:bodyPr lIns="0" rIns="0" tIns="0" bIns="0" anchor="t">
-            <a:normAutofit/>
-          </a:bodyPr>
-          <a:p>
-            <a:endParaRPr b="0" lang="en-IE" sz="3200" spc="-1" strike="noStrike">
-              <a:latin typeface="Arial"/>
-            </a:endParaRPr>
-          </a:p>
-        </p:txBody>
-      </p:sp>
-      <p:sp>
-        <p:nvSpPr>
-          <p:cNvPr id="181" name="PlaceHolder 4"/>
-          <p:cNvSpPr>
-            <a:spLocks noGrp="1"/>
-          </p:cNvSpPr>
-          <p:nvPr>
-            <p:ph/>
-          </p:nvPr>
-        </p:nvSpPr>
-        <p:spPr>
-          <a:xfrm>
-            <a:off x="609480" y="3682080"/>
-            <a:ext cx="5354280" cy="1896840"/>
-          </a:xfrm>
-          <a:prstGeom prst="rect">
-            <a:avLst/>
-          </a:prstGeom>
-          <a:noFill/>
-          <a:ln w="0">
-            <a:noFill/>
-          </a:ln>
-        </p:spPr>
-        <p:txBody>
-          <a:bodyPr lIns="0" rIns="0" tIns="0" bIns="0" anchor="t">
-            <a:normAutofit/>
-          </a:bodyPr>
-          <a:p>
-            <a:endParaRPr b="0" lang="en-IE" sz="3200" spc="-1" strike="noStrike">
-              <a:latin typeface="Arial"/>
-            </a:endParaRPr>
-          </a:p>
-        </p:txBody>
-      </p:sp>
-      <p:sp>
-        <p:nvSpPr>
-          <p:cNvPr id="6" name="PlaceHolder 5"/>
-          <p:cNvSpPr>
-            <a:spLocks noGrp="1"/>
-          </p:cNvSpPr>
-          <p:nvPr>
-            <p:ph type="ftr" idx="13"/>
-          </p:nvPr>
-        </p:nvSpPr>
-        <p:spPr/>
-        <p:txBody>
-          <a:bodyPr/>
-          <a:p>
-            <a:r>
-              <a:t>Footer</a:t>
-            </a:r>
-          </a:p>
-        </p:txBody>
-      </p:sp>
-      <p:sp>
-        <p:nvSpPr>
-          <p:cNvPr id="7" name="PlaceHolder 6"/>
-          <p:cNvSpPr>
-            <a:spLocks noGrp="1"/>
-          </p:cNvSpPr>
-          <p:nvPr>
-            <p:ph type="sldNum" idx="14"/>
-          </p:nvPr>
-        </p:nvSpPr>
-        <p:spPr/>
-        <p:txBody>
-          <a:bodyPr/>
-          <a:p>
-            <a:fld id="{9380CF07-BB38-479F-A173-11DDA57F3C1C}" type="slidenum">
-              <a:t>&lt;#&gt;</a:t>
-            </a:fld>
-          </a:p>
-        </p:txBody>
-      </p:sp>
-      <p:sp>
-        <p:nvSpPr>
-          <p:cNvPr id="8" name="PlaceHolder 7"/>
-          <p:cNvSpPr>
-            <a:spLocks noGrp="1"/>
-          </p:cNvSpPr>
-          <p:nvPr>
-            <p:ph type="dt" idx="15"/>
-          </p:nvPr>
-        </p:nvSpPr>
-        <p:spPr/>
-        <p:txBody>
-          <a:bodyPr/>
-          <a:p>
-            <a:r>
-              <a:rPr lang="en-IE"/>
-              <a:t/>
-            </a:r>
-          </a:p>
-        </p:txBody>
-      </p:sp>
-    </p:spTree>
-  </p:cSld>
-</p:sldLayout>
-</file>
-
-<file path=ppt/slideLayouts/slideLayout56.xml><?xml version="1.0" encoding="utf-8"?>
-<p:sldLayout xmlns:a="http://schemas.openxmlformats.org/drawingml/2006/main" xmlns:p="http://schemas.openxmlformats.org/presentationml/2006/main" xmlns:r="http://schemas.openxmlformats.org/officeDocument/2006/relationships" xmlns:p14="http://schemas.microsoft.com/office/powerpoint/2010/main" xmlns:p15="http://schemas.microsoft.com/office/powerpoint/2012/main" xmlns:mc="http://schemas.openxmlformats.org/markup-compatibility/2006" type="objAndTwoObj" preserve="1">
-  <p:cSld name="Title Content and 2 Content">
-    <p:spTree>
-      <p:nvGrpSpPr>
-        <p:cNvPr id="1" name=""/>
-        <p:cNvGrpSpPr/>
-        <p:nvPr/>
-      </p:nvGrpSpPr>
-      <p:grpSpPr>
-        <a:xfrm>
-          <a:off x="0" y="0"/>
-          <a:ext cx="0" cy="0"/>
-          <a:chOff x="0" y="0"/>
-          <a:chExt cx="0" cy="0"/>
-        </a:xfrm>
-      </p:grpSpPr>
-      <p:sp>
-        <p:nvSpPr>
-          <p:cNvPr id="182" name="PlaceHolder 1"/>
-          <p:cNvSpPr>
-            <a:spLocks noGrp="1"/>
-          </p:cNvSpPr>
-          <p:nvPr>
-            <p:ph type="title"/>
-          </p:nvPr>
-        </p:nvSpPr>
-        <p:spPr>
-          <a:xfrm>
-            <a:off x="609480" y="273600"/>
-            <a:ext cx="10972440" cy="1144800"/>
-          </a:xfrm>
-          <a:prstGeom prst="rect">
-            <a:avLst/>
-          </a:prstGeom>
-          <a:noFill/>
-          <a:ln w="0">
-            <a:noFill/>
-          </a:ln>
-        </p:spPr>
-        <p:txBody>
-          <a:bodyPr lIns="0" rIns="0" tIns="0" bIns="0" anchor="ctr">
-            <a:noAutofit/>
-          </a:bodyPr>
-          <a:p>
-            <a:pPr algn="ctr">
-              <a:buNone/>
-            </a:pPr>
-            <a:endParaRPr b="0" lang="en-IE" sz="4400" spc="-1" strike="noStrike">
-              <a:latin typeface="Arial"/>
-            </a:endParaRPr>
-          </a:p>
-        </p:txBody>
-      </p:sp>
-      <p:sp>
-        <p:nvSpPr>
-          <p:cNvPr id="183" name="PlaceHolder 2"/>
-          <p:cNvSpPr>
-            <a:spLocks noGrp="1"/>
-          </p:cNvSpPr>
-          <p:nvPr>
-            <p:ph/>
-          </p:nvPr>
-        </p:nvSpPr>
-        <p:spPr>
-          <a:xfrm>
-            <a:off x="609480" y="1604520"/>
-            <a:ext cx="5354280" cy="3977280"/>
-          </a:xfrm>
-          <a:prstGeom prst="rect">
-            <a:avLst/>
-          </a:prstGeom>
-          <a:noFill/>
-          <a:ln w="0">
-            <a:noFill/>
-          </a:ln>
-        </p:spPr>
-        <p:txBody>
-          <a:bodyPr lIns="0" rIns="0" tIns="0" bIns="0" anchor="t">
-            <a:normAutofit/>
-          </a:bodyPr>
-          <a:p>
-            <a:endParaRPr b="0" lang="en-IE" sz="3200" spc="-1" strike="noStrike">
-              <a:latin typeface="Arial"/>
-            </a:endParaRPr>
-          </a:p>
-        </p:txBody>
-      </p:sp>
-      <p:sp>
-        <p:nvSpPr>
-          <p:cNvPr id="184" name="PlaceHolder 3"/>
-          <p:cNvSpPr>
-            <a:spLocks noGrp="1"/>
-          </p:cNvSpPr>
-          <p:nvPr>
-            <p:ph/>
-          </p:nvPr>
-        </p:nvSpPr>
-        <p:spPr>
-          <a:xfrm>
-            <a:off x="6231960" y="1604520"/>
-            <a:ext cx="5354280" cy="1896840"/>
-          </a:xfrm>
-          <a:prstGeom prst="rect">
-            <a:avLst/>
-          </a:prstGeom>
-          <a:noFill/>
-          <a:ln w="0">
-            <a:noFill/>
-          </a:ln>
-        </p:spPr>
-        <p:txBody>
-          <a:bodyPr lIns="0" rIns="0" tIns="0" bIns="0" anchor="t">
-            <a:normAutofit/>
-          </a:bodyPr>
-          <a:p>
-            <a:endParaRPr b="0" lang="en-IE" sz="3200" spc="-1" strike="noStrike">
-              <a:latin typeface="Arial"/>
-            </a:endParaRPr>
-          </a:p>
-        </p:txBody>
-      </p:sp>
-      <p:sp>
-        <p:nvSpPr>
-          <p:cNvPr id="185" name="PlaceHolder 4"/>
-          <p:cNvSpPr>
-            <a:spLocks noGrp="1"/>
-          </p:cNvSpPr>
-          <p:nvPr>
-            <p:ph/>
-          </p:nvPr>
-        </p:nvSpPr>
-        <p:spPr>
-          <a:xfrm>
-            <a:off x="6231960" y="3682080"/>
-            <a:ext cx="5354280" cy="1896840"/>
-          </a:xfrm>
-          <a:prstGeom prst="rect">
-            <a:avLst/>
-          </a:prstGeom>
-          <a:noFill/>
-          <a:ln w="0">
-            <a:noFill/>
-          </a:ln>
-        </p:spPr>
-        <p:txBody>
-          <a:bodyPr lIns="0" rIns="0" tIns="0" bIns="0" anchor="t">
-            <a:normAutofit/>
-          </a:bodyPr>
-          <a:p>
-            <a:endParaRPr b="0" lang="en-IE" sz="3200" spc="-1" strike="noStrike">
-              <a:latin typeface="Arial"/>
-            </a:endParaRPr>
-          </a:p>
-        </p:txBody>
-      </p:sp>
-      <p:sp>
-        <p:nvSpPr>
-          <p:cNvPr id="6" name="PlaceHolder 5"/>
-          <p:cNvSpPr>
-            <a:spLocks noGrp="1"/>
-          </p:cNvSpPr>
-          <p:nvPr>
-            <p:ph type="ftr" idx="13"/>
-          </p:nvPr>
-        </p:nvSpPr>
-        <p:spPr/>
-        <p:txBody>
-          <a:bodyPr/>
-          <a:p>
-            <a:r>
-              <a:t>Footer</a:t>
-            </a:r>
-          </a:p>
-        </p:txBody>
-      </p:sp>
-      <p:sp>
-        <p:nvSpPr>
-          <p:cNvPr id="7" name="PlaceHolder 6"/>
-          <p:cNvSpPr>
-            <a:spLocks noGrp="1"/>
-          </p:cNvSpPr>
-          <p:nvPr>
-            <p:ph type="sldNum" idx="14"/>
-          </p:nvPr>
-        </p:nvSpPr>
-        <p:spPr/>
-        <p:txBody>
-          <a:bodyPr/>
-          <a:p>
-            <a:fld id="{7274A465-A95D-494F-BA1F-30E1C28B2DEC}" type="slidenum">
-              <a:t>&lt;#&gt;</a:t>
-            </a:fld>
-          </a:p>
-        </p:txBody>
-      </p:sp>
-      <p:sp>
-        <p:nvSpPr>
-          <p:cNvPr id="8" name="PlaceHolder 7"/>
-          <p:cNvSpPr>
-            <a:spLocks noGrp="1"/>
-          </p:cNvSpPr>
-          <p:nvPr>
-            <p:ph type="dt" idx="15"/>
-          </p:nvPr>
-        </p:nvSpPr>
-        <p:spPr/>
-        <p:txBody>
-          <a:bodyPr/>
-          <a:p>
-            <a:r>
-              <a:rPr lang="en-IE"/>
-              <a:t/>
-            </a:r>
-          </a:p>
-        </p:txBody>
-      </p:sp>
-    </p:spTree>
-  </p:cSld>
-</p:sldLayout>
-</file>
-
-<file path=ppt/slideLayouts/slideLayout57.xml><?xml version="1.0" encoding="utf-8"?>
-<p:sldLayout xmlns:a="http://schemas.openxmlformats.org/drawingml/2006/main" xmlns:p="http://schemas.openxmlformats.org/presentationml/2006/main" xmlns:r="http://schemas.openxmlformats.org/officeDocument/2006/relationships" xmlns:p14="http://schemas.microsoft.com/office/powerpoint/2010/main" xmlns:p15="http://schemas.microsoft.com/office/powerpoint/2012/main" xmlns:mc="http://schemas.openxmlformats.org/markup-compatibility/2006" type="twoObjOverTx" preserve="1">
-  <p:cSld name="Title, 2 Content over Content">
-    <p:spTree>
-      <p:nvGrpSpPr>
-        <p:cNvPr id="1" name=""/>
-        <p:cNvGrpSpPr/>
-        <p:nvPr/>
-      </p:nvGrpSpPr>
-      <p:grpSpPr>
-        <a:xfrm>
-          <a:off x="0" y="0"/>
-          <a:ext cx="0" cy="0"/>
-          <a:chOff x="0" y="0"/>
-          <a:chExt cx="0" cy="0"/>
-        </a:xfrm>
-      </p:grpSpPr>
-      <p:sp>
-        <p:nvSpPr>
-          <p:cNvPr id="186" name="PlaceHolder 1"/>
-          <p:cNvSpPr>
-            <a:spLocks noGrp="1"/>
-          </p:cNvSpPr>
-          <p:nvPr>
-            <p:ph type="title"/>
-          </p:nvPr>
-        </p:nvSpPr>
-        <p:spPr>
-          <a:xfrm>
-            <a:off x="609480" y="273600"/>
-            <a:ext cx="10972440" cy="1144800"/>
-          </a:xfrm>
-          <a:prstGeom prst="rect">
-            <a:avLst/>
-          </a:prstGeom>
-          <a:noFill/>
-          <a:ln w="0">
-            <a:noFill/>
-          </a:ln>
-        </p:spPr>
-        <p:txBody>
-          <a:bodyPr lIns="0" rIns="0" tIns="0" bIns="0" anchor="ctr">
-            <a:noAutofit/>
-          </a:bodyPr>
-          <a:p>
-            <a:pPr algn="ctr">
-              <a:buNone/>
-            </a:pPr>
-            <a:endParaRPr b="0" lang="en-IE" sz="4400" spc="-1" strike="noStrike">
-              <a:latin typeface="Arial"/>
-            </a:endParaRPr>
-          </a:p>
-        </p:txBody>
-      </p:sp>
-      <p:sp>
-        <p:nvSpPr>
-          <p:cNvPr id="187" name="PlaceHolder 2"/>
-          <p:cNvSpPr>
-            <a:spLocks noGrp="1"/>
-          </p:cNvSpPr>
-          <p:nvPr>
-            <p:ph/>
-          </p:nvPr>
-        </p:nvSpPr>
-        <p:spPr>
-          <a:xfrm>
-            <a:off x="609480" y="1604520"/>
-            <a:ext cx="5354280" cy="1896840"/>
-          </a:xfrm>
-          <a:prstGeom prst="rect">
-            <a:avLst/>
-          </a:prstGeom>
-          <a:noFill/>
-          <a:ln w="0">
-            <a:noFill/>
-          </a:ln>
-        </p:spPr>
-        <p:txBody>
-          <a:bodyPr lIns="0" rIns="0" tIns="0" bIns="0" anchor="t">
-            <a:normAutofit/>
-          </a:bodyPr>
-          <a:p>
-            <a:endParaRPr b="0" lang="en-IE" sz="3200" spc="-1" strike="noStrike">
-              <a:latin typeface="Arial"/>
-            </a:endParaRPr>
-          </a:p>
-        </p:txBody>
-      </p:sp>
-      <p:sp>
-        <p:nvSpPr>
-          <p:cNvPr id="188" name="PlaceHolder 3"/>
-          <p:cNvSpPr>
-            <a:spLocks noGrp="1"/>
-          </p:cNvSpPr>
-          <p:nvPr>
-            <p:ph/>
-          </p:nvPr>
-        </p:nvSpPr>
-        <p:spPr>
-          <a:xfrm>
-            <a:off x="6231960" y="1604520"/>
-            <a:ext cx="5354280" cy="1896840"/>
-          </a:xfrm>
-          <a:prstGeom prst="rect">
-            <a:avLst/>
-          </a:prstGeom>
-          <a:noFill/>
-          <a:ln w="0">
-            <a:noFill/>
-          </a:ln>
-        </p:spPr>
-        <p:txBody>
-          <a:bodyPr lIns="0" rIns="0" tIns="0" bIns="0" anchor="t">
-            <a:normAutofit/>
-          </a:bodyPr>
-          <a:p>
-            <a:endParaRPr b="0" lang="en-IE" sz="3200" spc="-1" strike="noStrike">
-              <a:latin typeface="Arial"/>
-            </a:endParaRPr>
-          </a:p>
-        </p:txBody>
-      </p:sp>
-      <p:sp>
-        <p:nvSpPr>
-          <p:cNvPr id="189" name="PlaceHolder 4"/>
-          <p:cNvSpPr>
-            <a:spLocks noGrp="1"/>
-          </p:cNvSpPr>
-          <p:nvPr>
-            <p:ph/>
-          </p:nvPr>
-        </p:nvSpPr>
-        <p:spPr>
-          <a:xfrm>
-            <a:off x="609480" y="3682080"/>
-            <a:ext cx="10972440" cy="1896840"/>
-          </a:xfrm>
-          <a:prstGeom prst="rect">
-            <a:avLst/>
-          </a:prstGeom>
-          <a:noFill/>
-          <a:ln w="0">
-            <a:noFill/>
-          </a:ln>
-        </p:spPr>
-        <p:txBody>
-          <a:bodyPr lIns="0" rIns="0" tIns="0" bIns="0" anchor="t">
-            <a:normAutofit/>
-          </a:bodyPr>
-          <a:p>
-            <a:endParaRPr b="0" lang="en-IE" sz="3200" spc="-1" strike="noStrike">
-              <a:latin typeface="Arial"/>
-            </a:endParaRPr>
-          </a:p>
-        </p:txBody>
-      </p:sp>
-      <p:sp>
-        <p:nvSpPr>
-          <p:cNvPr id="6" name="PlaceHolder 5"/>
-          <p:cNvSpPr>
-            <a:spLocks noGrp="1"/>
-          </p:cNvSpPr>
-          <p:nvPr>
-            <p:ph type="ftr" idx="13"/>
-          </p:nvPr>
-        </p:nvSpPr>
-        <p:spPr/>
-        <p:txBody>
-          <a:bodyPr/>
-          <a:p>
-            <a:r>
-              <a:t>Footer</a:t>
-            </a:r>
-          </a:p>
-        </p:txBody>
-      </p:sp>
-      <p:sp>
-        <p:nvSpPr>
-          <p:cNvPr id="7" name="PlaceHolder 6"/>
-          <p:cNvSpPr>
-            <a:spLocks noGrp="1"/>
-          </p:cNvSpPr>
-          <p:nvPr>
-            <p:ph type="sldNum" idx="14"/>
-          </p:nvPr>
-        </p:nvSpPr>
-        <p:spPr/>
-        <p:txBody>
-          <a:bodyPr/>
-          <a:p>
-            <a:fld id="{1F4A3F36-F126-4C78-AFB5-FA7CBCDF3459}" type="slidenum">
-              <a:t>&lt;#&gt;</a:t>
-            </a:fld>
-          </a:p>
-        </p:txBody>
-      </p:sp>
-      <p:sp>
-        <p:nvSpPr>
-          <p:cNvPr id="8" name="PlaceHolder 7"/>
-          <p:cNvSpPr>
-            <a:spLocks noGrp="1"/>
-          </p:cNvSpPr>
-          <p:nvPr>
-            <p:ph type="dt" idx="15"/>
-          </p:nvPr>
-        </p:nvSpPr>
-        <p:spPr/>
-        <p:txBody>
-          <a:bodyPr/>
-          <a:p>
-            <a:r>
-              <a:rPr lang="en-IE"/>
-              <a:t/>
-            </a:r>
-          </a:p>
-        </p:txBody>
-      </p:sp>
-    </p:spTree>
-  </p:cSld>
-</p:sldLayout>
-</file>
-
-<file path=ppt/slideLayouts/slideLayout58.xml><?xml version="1.0" encoding="utf-8"?>
-<p:sldLayout xmlns:a="http://schemas.openxmlformats.org/drawingml/2006/main" xmlns:p="http://schemas.openxmlformats.org/presentationml/2006/main" xmlns:r="http://schemas.openxmlformats.org/officeDocument/2006/relationships" xmlns:p14="http://schemas.microsoft.com/office/powerpoint/2010/main" xmlns:p15="http://schemas.microsoft.com/office/powerpoint/2012/main" xmlns:mc="http://schemas.openxmlformats.org/markup-compatibility/2006" type="objOverTx" preserve="1">
-  <p:cSld name="Title, Content over Content">
-    <p:spTree>
-      <p:nvGrpSpPr>
-        <p:cNvPr id="1" name=""/>
-        <p:cNvGrpSpPr/>
-        <p:nvPr/>
-      </p:nvGrpSpPr>
-      <p:grpSpPr>
-        <a:xfrm>
-          <a:off x="0" y="0"/>
-          <a:ext cx="0" cy="0"/>
-          <a:chOff x="0" y="0"/>
-          <a:chExt cx="0" cy="0"/>
-        </a:xfrm>
-      </p:grpSpPr>
-      <p:sp>
-        <p:nvSpPr>
-          <p:cNvPr id="190" name="PlaceHolder 1"/>
-          <p:cNvSpPr>
-            <a:spLocks noGrp="1"/>
-          </p:cNvSpPr>
-          <p:nvPr>
-            <p:ph type="title"/>
-          </p:nvPr>
-        </p:nvSpPr>
-        <p:spPr>
-          <a:xfrm>
-            <a:off x="609480" y="273600"/>
-            <a:ext cx="10972440" cy="1144800"/>
-          </a:xfrm>
-          <a:prstGeom prst="rect">
-            <a:avLst/>
-          </a:prstGeom>
-          <a:noFill/>
-          <a:ln w="0">
-            <a:noFill/>
-          </a:ln>
-        </p:spPr>
-        <p:txBody>
-          <a:bodyPr lIns="0" rIns="0" tIns="0" bIns="0" anchor="ctr">
-            <a:noAutofit/>
-          </a:bodyPr>
-          <a:p>
-            <a:pPr algn="ctr">
-              <a:buNone/>
-            </a:pPr>
-            <a:endParaRPr b="0" lang="en-IE" sz="4400" spc="-1" strike="noStrike">
-              <a:latin typeface="Arial"/>
-            </a:endParaRPr>
-          </a:p>
-        </p:txBody>
-      </p:sp>
-      <p:sp>
-        <p:nvSpPr>
-          <p:cNvPr id="191" name="PlaceHolder 2"/>
-          <p:cNvSpPr>
-            <a:spLocks noGrp="1"/>
-          </p:cNvSpPr>
-          <p:nvPr>
-            <p:ph/>
-          </p:nvPr>
-        </p:nvSpPr>
-        <p:spPr>
-          <a:xfrm>
-            <a:off x="609480" y="1604520"/>
-            <a:ext cx="10972440" cy="1896840"/>
-          </a:xfrm>
-          <a:prstGeom prst="rect">
-            <a:avLst/>
-          </a:prstGeom>
-          <a:noFill/>
-          <a:ln w="0">
-            <a:noFill/>
-          </a:ln>
-        </p:spPr>
-        <p:txBody>
-          <a:bodyPr lIns="0" rIns="0" tIns="0" bIns="0" anchor="t">
-            <a:normAutofit/>
-          </a:bodyPr>
-          <a:p>
-            <a:endParaRPr b="0" lang="en-IE" sz="3200" spc="-1" strike="noStrike">
-              <a:latin typeface="Arial"/>
-            </a:endParaRPr>
-          </a:p>
-        </p:txBody>
-      </p:sp>
-      <p:sp>
-        <p:nvSpPr>
-          <p:cNvPr id="192" name="PlaceHolder 3"/>
-          <p:cNvSpPr>
-            <a:spLocks noGrp="1"/>
-          </p:cNvSpPr>
-          <p:nvPr>
-            <p:ph/>
-          </p:nvPr>
-        </p:nvSpPr>
-        <p:spPr>
-          <a:xfrm>
-            <a:off x="609480" y="3682080"/>
-            <a:ext cx="10972440" cy="1896840"/>
-          </a:xfrm>
-          <a:prstGeom prst="rect">
-            <a:avLst/>
-          </a:prstGeom>
-          <a:noFill/>
-          <a:ln w="0">
-            <a:noFill/>
-          </a:ln>
-        </p:spPr>
-        <p:txBody>
-          <a:bodyPr lIns="0" rIns="0" tIns="0" bIns="0" anchor="t">
-            <a:normAutofit/>
-          </a:bodyPr>
-          <a:p>
-            <a:endParaRPr b="0" lang="en-IE" sz="3200" spc="-1" strike="noStrike">
-              <a:latin typeface="Arial"/>
-            </a:endParaRPr>
-          </a:p>
-        </p:txBody>
-      </p:sp>
-      <p:sp>
-        <p:nvSpPr>
-          <p:cNvPr id="5" name="PlaceHolder 4"/>
-          <p:cNvSpPr>
-            <a:spLocks noGrp="1"/>
-          </p:cNvSpPr>
-          <p:nvPr>
-            <p:ph type="ftr" idx="13"/>
-          </p:nvPr>
-        </p:nvSpPr>
-        <p:spPr/>
-        <p:txBody>
-          <a:bodyPr/>
-          <a:p>
-            <a:r>
-              <a:t>Footer</a:t>
-            </a:r>
-          </a:p>
-        </p:txBody>
-      </p:sp>
-      <p:sp>
-        <p:nvSpPr>
-          <p:cNvPr id="6" name="PlaceHolder 5"/>
-          <p:cNvSpPr>
-            <a:spLocks noGrp="1"/>
-          </p:cNvSpPr>
-          <p:nvPr>
-            <p:ph type="sldNum" idx="14"/>
-          </p:nvPr>
-        </p:nvSpPr>
-        <p:spPr/>
-        <p:txBody>
-          <a:bodyPr/>
-          <a:p>
-            <a:fld id="{C88E2673-EFA6-415C-95DE-C0FC68D689CA}" type="slidenum">
-              <a:t>&lt;#&gt;</a:t>
-            </a:fld>
-          </a:p>
-        </p:txBody>
-      </p:sp>
-      <p:sp>
-        <p:nvSpPr>
-          <p:cNvPr id="7" name="PlaceHolder 6"/>
-          <p:cNvSpPr>
-            <a:spLocks noGrp="1"/>
-          </p:cNvSpPr>
-          <p:nvPr>
-            <p:ph type="dt" idx="15"/>
-          </p:nvPr>
-        </p:nvSpPr>
-        <p:spPr/>
-        <p:txBody>
-          <a:bodyPr/>
-          <a:p>
-            <a:r>
-              <a:rPr lang="en-IE"/>
-              <a:t/>
-            </a:r>
-          </a:p>
-        </p:txBody>
-      </p:sp>
-    </p:spTree>
-  </p:cSld>
-</p:sldLayout>
-</file>
-
-<file path=ppt/slideLayouts/slideLayout59.xml><?xml version="1.0" encoding="utf-8"?>
-<p:sldLayout xmlns:a="http://schemas.openxmlformats.org/drawingml/2006/main" xmlns:p="http://schemas.openxmlformats.org/presentationml/2006/main" xmlns:r="http://schemas.openxmlformats.org/officeDocument/2006/relationships" xmlns:p14="http://schemas.microsoft.com/office/powerpoint/2010/main" xmlns:p15="http://schemas.microsoft.com/office/powerpoint/2012/main" xmlns:mc="http://schemas.openxmlformats.org/markup-compatibility/2006" type="fourObj" preserve="1">
-  <p:cSld name="Title, 4 Content">
-    <p:spTree>
-      <p:nvGrpSpPr>
-        <p:cNvPr id="1" name=""/>
-        <p:cNvGrpSpPr/>
-        <p:nvPr/>
-      </p:nvGrpSpPr>
-      <p:grpSpPr>
-        <a:xfrm>
-          <a:off x="0" y="0"/>
-          <a:ext cx="0" cy="0"/>
-          <a:chOff x="0" y="0"/>
-          <a:chExt cx="0" cy="0"/>
-        </a:xfrm>
-      </p:grpSpPr>
-      <p:sp>
-        <p:nvSpPr>
-          <p:cNvPr id="193" name="PlaceHolder 1"/>
-          <p:cNvSpPr>
-            <a:spLocks noGrp="1"/>
-          </p:cNvSpPr>
-          <p:nvPr>
-            <p:ph type="title"/>
-          </p:nvPr>
-        </p:nvSpPr>
-        <p:spPr>
-          <a:xfrm>
-            <a:off x="609480" y="273600"/>
-            <a:ext cx="10972440" cy="1144800"/>
-          </a:xfrm>
-          <a:prstGeom prst="rect">
-            <a:avLst/>
-          </a:prstGeom>
-          <a:noFill/>
-          <a:ln w="0">
-            <a:noFill/>
-          </a:ln>
-        </p:spPr>
-        <p:txBody>
-          <a:bodyPr lIns="0" rIns="0" tIns="0" bIns="0" anchor="ctr">
-            <a:noAutofit/>
-          </a:bodyPr>
-          <a:p>
-            <a:pPr algn="ctr">
-              <a:buNone/>
-            </a:pPr>
-            <a:endParaRPr b="0" lang="en-IE" sz="4400" spc="-1" strike="noStrike">
-              <a:latin typeface="Arial"/>
-            </a:endParaRPr>
-          </a:p>
-        </p:txBody>
-      </p:sp>
-      <p:sp>
-        <p:nvSpPr>
-          <p:cNvPr id="194" name="PlaceHolder 2"/>
-          <p:cNvSpPr>
-            <a:spLocks noGrp="1"/>
-          </p:cNvSpPr>
-          <p:nvPr>
-            <p:ph/>
-          </p:nvPr>
-        </p:nvSpPr>
-        <p:spPr>
-          <a:xfrm>
-            <a:off x="609480" y="1604520"/>
-            <a:ext cx="5354280" cy="1896840"/>
-          </a:xfrm>
-          <a:prstGeom prst="rect">
-            <a:avLst/>
-          </a:prstGeom>
-          <a:noFill/>
-          <a:ln w="0">
-            <a:noFill/>
-          </a:ln>
-        </p:spPr>
-        <p:txBody>
-          <a:bodyPr lIns="0" rIns="0" tIns="0" bIns="0" anchor="t">
-            <a:normAutofit/>
-          </a:bodyPr>
-          <a:p>
-            <a:endParaRPr b="0" lang="en-IE" sz="3200" spc="-1" strike="noStrike">
-              <a:latin typeface="Arial"/>
-            </a:endParaRPr>
-          </a:p>
-        </p:txBody>
-      </p:sp>
-      <p:sp>
-        <p:nvSpPr>
-          <p:cNvPr id="195" name="PlaceHolder 3"/>
-          <p:cNvSpPr>
-            <a:spLocks noGrp="1"/>
-          </p:cNvSpPr>
-          <p:nvPr>
-            <p:ph/>
-          </p:nvPr>
-        </p:nvSpPr>
-        <p:spPr>
-          <a:xfrm>
-            <a:off x="6231960" y="1604520"/>
-            <a:ext cx="5354280" cy="1896840"/>
-          </a:xfrm>
-          <a:prstGeom prst="rect">
-            <a:avLst/>
-          </a:prstGeom>
-          <a:noFill/>
-          <a:ln w="0">
-            <a:noFill/>
-          </a:ln>
-        </p:spPr>
-        <p:txBody>
-          <a:bodyPr lIns="0" rIns="0" tIns="0" bIns="0" anchor="t">
-            <a:normAutofit/>
-          </a:bodyPr>
-          <a:p>
-            <a:endParaRPr b="0" lang="en-IE" sz="3200" spc="-1" strike="noStrike">
-              <a:latin typeface="Arial"/>
-            </a:endParaRPr>
-          </a:p>
-        </p:txBody>
-      </p:sp>
-      <p:sp>
-        <p:nvSpPr>
-          <p:cNvPr id="196" name="PlaceHolder 4"/>
-          <p:cNvSpPr>
-            <a:spLocks noGrp="1"/>
-          </p:cNvSpPr>
-          <p:nvPr>
-            <p:ph/>
-          </p:nvPr>
-        </p:nvSpPr>
-        <p:spPr>
-          <a:xfrm>
-            <a:off x="609480" y="3682080"/>
-            <a:ext cx="5354280" cy="1896840"/>
-          </a:xfrm>
-          <a:prstGeom prst="rect">
-            <a:avLst/>
-          </a:prstGeom>
-          <a:noFill/>
-          <a:ln w="0">
-            <a:noFill/>
-          </a:ln>
-        </p:spPr>
-        <p:txBody>
-          <a:bodyPr lIns="0" rIns="0" tIns="0" bIns="0" anchor="t">
-            <a:normAutofit/>
-          </a:bodyPr>
-          <a:p>
-            <a:endParaRPr b="0" lang="en-IE" sz="3200" spc="-1" strike="noStrike">
-              <a:latin typeface="Arial"/>
-            </a:endParaRPr>
-          </a:p>
-        </p:txBody>
-      </p:sp>
-      <p:sp>
-        <p:nvSpPr>
-          <p:cNvPr id="197" name="PlaceHolder 5"/>
-          <p:cNvSpPr>
-            <a:spLocks noGrp="1"/>
-          </p:cNvSpPr>
-          <p:nvPr>
-            <p:ph/>
-          </p:nvPr>
-        </p:nvSpPr>
-        <p:spPr>
-          <a:xfrm>
-            <a:off x="6231960" y="3682080"/>
-            <a:ext cx="5354280" cy="1896840"/>
-          </a:xfrm>
-          <a:prstGeom prst="rect">
-            <a:avLst/>
-          </a:prstGeom>
-          <a:noFill/>
-          <a:ln w="0">
-            <a:noFill/>
-          </a:ln>
-        </p:spPr>
-        <p:txBody>
-          <a:bodyPr lIns="0" rIns="0" tIns="0" bIns="0" anchor="t">
-            <a:normAutofit/>
-          </a:bodyPr>
-          <a:p>
-            <a:endParaRPr b="0" lang="en-IE" sz="3200" spc="-1" strike="noStrike">
-              <a:latin typeface="Arial"/>
-            </a:endParaRPr>
-          </a:p>
-        </p:txBody>
-      </p:sp>
-      <p:sp>
-        <p:nvSpPr>
-          <p:cNvPr id="7" name="PlaceHolder 6"/>
-          <p:cNvSpPr>
-            <a:spLocks noGrp="1"/>
-          </p:cNvSpPr>
-          <p:nvPr>
-            <p:ph type="ftr" idx="13"/>
-          </p:nvPr>
-        </p:nvSpPr>
-        <p:spPr/>
-        <p:txBody>
-          <a:bodyPr/>
-          <a:p>
-            <a:r>
-              <a:t>Footer</a:t>
-            </a:r>
-          </a:p>
-        </p:txBody>
-      </p:sp>
-      <p:sp>
-        <p:nvSpPr>
-          <p:cNvPr id="8" name="PlaceHolder 7"/>
-          <p:cNvSpPr>
-            <a:spLocks noGrp="1"/>
-          </p:cNvSpPr>
-          <p:nvPr>
-            <p:ph type="sldNum" idx="14"/>
-          </p:nvPr>
-        </p:nvSpPr>
-        <p:spPr/>
-        <p:txBody>
-          <a:bodyPr/>
-          <a:p>
-            <a:fld id="{C34C92CC-1E4F-4D58-84D1-67F377318FAF}" type="slidenum">
-              <a:t>&lt;#&gt;</a:t>
-            </a:fld>
-          </a:p>
-        </p:txBody>
-      </p:sp>
-      <p:sp>
-        <p:nvSpPr>
-          <p:cNvPr id="9" name="PlaceHolder 8"/>
-          <p:cNvSpPr>
-            <a:spLocks noGrp="1"/>
-          </p:cNvSpPr>
-          <p:nvPr>
-            <p:ph type="dt" idx="15"/>
           </p:nvPr>
         </p:nvSpPr>
         <p:spPr/>
@@ -10279,7 +8346,7 @@
         <p:txBody>
           <a:bodyPr/>
           <a:p>
-            <a:fld id="{D0CA6B73-6C5F-47CA-85AF-AA6C4D39345E}" type="slidenum">
+            <a:fld id="{0FAB427B-AE51-4D39-9CB6-E47BD6103499}" type="slidenum">
               <a:t>&lt;#&gt;</a:t>
             </a:fld>
           </a:p>
@@ -10293,330 +8360,6 @@
           </p:cNvSpPr>
           <p:nvPr>
             <p:ph type="dt" idx="3"/>
-          </p:nvPr>
-        </p:nvSpPr>
-        <p:spPr/>
-        <p:txBody>
-          <a:bodyPr/>
-          <a:p>
-            <a:r>
-              <a:rPr lang="en-IE"/>
-              <a:t/>
-            </a:r>
-          </a:p>
-        </p:txBody>
-      </p:sp>
-    </p:spTree>
-  </p:cSld>
-</p:sldLayout>
-</file>
-
-<file path=ppt/slideLayouts/slideLayout60.xml><?xml version="1.0" encoding="utf-8"?>
-<p:sldLayout xmlns:a="http://schemas.openxmlformats.org/drawingml/2006/main" xmlns:p="http://schemas.openxmlformats.org/presentationml/2006/main" xmlns:r="http://schemas.openxmlformats.org/officeDocument/2006/relationships" xmlns:p14="http://schemas.microsoft.com/office/powerpoint/2010/main" xmlns:p15="http://schemas.microsoft.com/office/powerpoint/2012/main" xmlns:mc="http://schemas.openxmlformats.org/markup-compatibility/2006" type="blank" preserve="1">
-  <p:cSld name="Title, 6 Content">
-    <p:spTree>
-      <p:nvGrpSpPr>
-        <p:cNvPr id="1" name=""/>
-        <p:cNvGrpSpPr/>
-        <p:nvPr/>
-      </p:nvGrpSpPr>
-      <p:grpSpPr>
-        <a:xfrm>
-          <a:off x="0" y="0"/>
-          <a:ext cx="0" cy="0"/>
-          <a:chOff x="0" y="0"/>
-          <a:chExt cx="0" cy="0"/>
-        </a:xfrm>
-      </p:grpSpPr>
-      <p:sp>
-        <p:nvSpPr>
-          <p:cNvPr id="198" name="PlaceHolder 1"/>
-          <p:cNvSpPr>
-            <a:spLocks noGrp="1"/>
-          </p:cNvSpPr>
-          <p:nvPr>
-            <p:ph type="title"/>
-          </p:nvPr>
-        </p:nvSpPr>
-        <p:spPr>
-          <a:xfrm>
-            <a:off x="609480" y="273600"/>
-            <a:ext cx="10972440" cy="1144800"/>
-          </a:xfrm>
-          <a:prstGeom prst="rect">
-            <a:avLst/>
-          </a:prstGeom>
-          <a:noFill/>
-          <a:ln w="0">
-            <a:noFill/>
-          </a:ln>
-        </p:spPr>
-        <p:txBody>
-          <a:bodyPr lIns="0" rIns="0" tIns="0" bIns="0" anchor="ctr">
-            <a:noAutofit/>
-          </a:bodyPr>
-          <a:p>
-            <a:pPr algn="ctr">
-              <a:buNone/>
-            </a:pPr>
-            <a:endParaRPr b="0" lang="en-IE" sz="4400" spc="-1" strike="noStrike">
-              <a:latin typeface="Arial"/>
-            </a:endParaRPr>
-          </a:p>
-        </p:txBody>
-      </p:sp>
-      <p:sp>
-        <p:nvSpPr>
-          <p:cNvPr id="199" name="PlaceHolder 2"/>
-          <p:cNvSpPr>
-            <a:spLocks noGrp="1"/>
-          </p:cNvSpPr>
-          <p:nvPr>
-            <p:ph/>
-          </p:nvPr>
-        </p:nvSpPr>
-        <p:spPr>
-          <a:xfrm>
-            <a:off x="609480" y="1604520"/>
-            <a:ext cx="3533040" cy="1896840"/>
-          </a:xfrm>
-          <a:prstGeom prst="rect">
-            <a:avLst/>
-          </a:prstGeom>
-          <a:noFill/>
-          <a:ln w="0">
-            <a:noFill/>
-          </a:ln>
-        </p:spPr>
-        <p:txBody>
-          <a:bodyPr lIns="0" rIns="0" tIns="0" bIns="0" anchor="t">
-            <a:normAutofit/>
-          </a:bodyPr>
-          <a:p>
-            <a:endParaRPr b="0" lang="en-IE" sz="3200" spc="-1" strike="noStrike">
-              <a:latin typeface="Arial"/>
-            </a:endParaRPr>
-          </a:p>
-        </p:txBody>
-      </p:sp>
-      <p:sp>
-        <p:nvSpPr>
-          <p:cNvPr id="200" name="PlaceHolder 3"/>
-          <p:cNvSpPr>
-            <a:spLocks noGrp="1"/>
-          </p:cNvSpPr>
-          <p:nvPr>
-            <p:ph/>
-          </p:nvPr>
-        </p:nvSpPr>
-        <p:spPr>
-          <a:xfrm>
-            <a:off x="4319640" y="1604520"/>
-            <a:ext cx="3533040" cy="1896840"/>
-          </a:xfrm>
-          <a:prstGeom prst="rect">
-            <a:avLst/>
-          </a:prstGeom>
-          <a:noFill/>
-          <a:ln w="0">
-            <a:noFill/>
-          </a:ln>
-        </p:spPr>
-        <p:txBody>
-          <a:bodyPr lIns="0" rIns="0" tIns="0" bIns="0" anchor="t">
-            <a:normAutofit/>
-          </a:bodyPr>
-          <a:p>
-            <a:endParaRPr b="0" lang="en-IE" sz="3200" spc="-1" strike="noStrike">
-              <a:latin typeface="Arial"/>
-            </a:endParaRPr>
-          </a:p>
-        </p:txBody>
-      </p:sp>
-      <p:sp>
-        <p:nvSpPr>
-          <p:cNvPr id="201" name="PlaceHolder 4"/>
-          <p:cNvSpPr>
-            <a:spLocks noGrp="1"/>
-          </p:cNvSpPr>
-          <p:nvPr>
-            <p:ph/>
-          </p:nvPr>
-        </p:nvSpPr>
-        <p:spPr>
-          <a:xfrm>
-            <a:off x="8029800" y="1604520"/>
-            <a:ext cx="3533040" cy="1896840"/>
-          </a:xfrm>
-          <a:prstGeom prst="rect">
-            <a:avLst/>
-          </a:prstGeom>
-          <a:noFill/>
-          <a:ln w="0">
-            <a:noFill/>
-          </a:ln>
-        </p:spPr>
-        <p:txBody>
-          <a:bodyPr lIns="0" rIns="0" tIns="0" bIns="0" anchor="t">
-            <a:normAutofit/>
-          </a:bodyPr>
-          <a:p>
-            <a:endParaRPr b="0" lang="en-IE" sz="3200" spc="-1" strike="noStrike">
-              <a:latin typeface="Arial"/>
-            </a:endParaRPr>
-          </a:p>
-        </p:txBody>
-      </p:sp>
-      <p:sp>
-        <p:nvSpPr>
-          <p:cNvPr id="202" name="PlaceHolder 5"/>
-          <p:cNvSpPr>
-            <a:spLocks noGrp="1"/>
-          </p:cNvSpPr>
-          <p:nvPr>
-            <p:ph/>
-          </p:nvPr>
-        </p:nvSpPr>
-        <p:spPr>
-          <a:xfrm>
-            <a:off x="609480" y="3682080"/>
-            <a:ext cx="3533040" cy="1896840"/>
-          </a:xfrm>
-          <a:prstGeom prst="rect">
-            <a:avLst/>
-          </a:prstGeom>
-          <a:noFill/>
-          <a:ln w="0">
-            <a:noFill/>
-          </a:ln>
-        </p:spPr>
-        <p:txBody>
-          <a:bodyPr lIns="0" rIns="0" tIns="0" bIns="0" anchor="t">
-            <a:normAutofit/>
-          </a:bodyPr>
-          <a:p>
-            <a:endParaRPr b="0" lang="en-IE" sz="3200" spc="-1" strike="noStrike">
-              <a:latin typeface="Arial"/>
-            </a:endParaRPr>
-          </a:p>
-        </p:txBody>
-      </p:sp>
-      <p:sp>
-        <p:nvSpPr>
-          <p:cNvPr id="203" name="PlaceHolder 6"/>
-          <p:cNvSpPr>
-            <a:spLocks noGrp="1"/>
-          </p:cNvSpPr>
-          <p:nvPr>
-            <p:ph/>
-          </p:nvPr>
-        </p:nvSpPr>
-        <p:spPr>
-          <a:xfrm>
-            <a:off x="4319640" y="3682080"/>
-            <a:ext cx="3533040" cy="1896840"/>
-          </a:xfrm>
-          <a:prstGeom prst="rect">
-            <a:avLst/>
-          </a:prstGeom>
-          <a:noFill/>
-          <a:ln w="0">
-            <a:noFill/>
-          </a:ln>
-        </p:spPr>
-        <p:txBody>
-          <a:bodyPr lIns="0" rIns="0" tIns="0" bIns="0" anchor="t">
-            <a:normAutofit/>
-          </a:bodyPr>
-          <a:p>
-            <a:endParaRPr b="0" lang="en-IE" sz="3200" spc="-1" strike="noStrike">
-              <a:latin typeface="Arial"/>
-            </a:endParaRPr>
-          </a:p>
-        </p:txBody>
-      </p:sp>
-      <p:sp>
-        <p:nvSpPr>
-          <p:cNvPr id="204" name="PlaceHolder 7"/>
-          <p:cNvSpPr>
-            <a:spLocks noGrp="1"/>
-          </p:cNvSpPr>
-          <p:nvPr>
-            <p:ph/>
-          </p:nvPr>
-        </p:nvSpPr>
-        <p:spPr>
-          <a:xfrm>
-            <a:off x="8029800" y="3682080"/>
-            <a:ext cx="3533040" cy="1896840"/>
-          </a:xfrm>
-          <a:prstGeom prst="rect">
-            <a:avLst/>
-          </a:prstGeom>
-          <a:noFill/>
-          <a:ln w="0">
-            <a:noFill/>
-          </a:ln>
-        </p:spPr>
-        <p:txBody>
-          <a:bodyPr lIns="0" rIns="0" tIns="0" bIns="0" anchor="t">
-            <a:normAutofit/>
-          </a:bodyPr>
-          <a:p>
-            <a:endParaRPr b="0" lang="en-IE" sz="3200" spc="-1" strike="noStrike">
-              <a:latin typeface="Arial"/>
-            </a:endParaRPr>
-          </a:p>
-        </p:txBody>
-      </p:sp>
-      <p:sp>
-        <p:nvSpPr>
-          <p:cNvPr id="9" name="PlaceHolder 8"/>
-          <p:cNvSpPr>
-            <a:spLocks noGrp="1"/>
-          </p:cNvSpPr>
-          <p:nvPr>
-            <p:ph type="ftr" idx="13"/>
-          </p:nvPr>
-        </p:nvSpPr>
-        <p:spPr/>
-        <p:txBody>
-          <a:bodyPr/>
-          <a:p>
-            <a:r>
-              <a:t>Footer</a:t>
-            </a:r>
-          </a:p>
-        </p:txBody>
-      </p:sp>
-      <p:sp>
-        <p:nvSpPr>
-          <p:cNvPr id="10" name="PlaceHolder 9"/>
-          <p:cNvSpPr>
-            <a:spLocks noGrp="1"/>
-          </p:cNvSpPr>
-          <p:nvPr>
-            <p:ph type="sldNum" idx="14"/>
-          </p:nvPr>
-        </p:nvSpPr>
-        <p:spPr/>
-        <p:txBody>
-          <a:bodyPr/>
-          <a:p>
-            <a:fld id="{E61C6A06-8AED-489E-91DA-D53BCFB0A5F1}" type="slidenum">
-              <a:t>&lt;#&gt;</a:t>
-            </a:fld>
-          </a:p>
-        </p:txBody>
-      </p:sp>
-      <p:sp>
-        <p:nvSpPr>
-          <p:cNvPr id="11" name="PlaceHolder 10"/>
-          <p:cNvSpPr>
-            <a:spLocks noGrp="1"/>
-          </p:cNvSpPr>
-          <p:nvPr>
-            <p:ph type="dt" idx="15"/>
           </p:nvPr>
         </p:nvSpPr>
         <p:spPr/>
@@ -10825,7 +8568,7 @@
         <p:txBody>
           <a:bodyPr/>
           <a:p>
-            <a:fld id="{2F3E736C-E8EE-49DA-B159-25024FB25FFD}" type="slidenum">
+            <a:fld id="{9A3675F0-3D16-46D7-A3C1-C83153E19859}" type="slidenum">
               <a:t>&lt;#&gt;</a:t>
             </a:fld>
           </a:p>
@@ -11047,7 +8790,7 @@
         <p:txBody>
           <a:bodyPr/>
           <a:p>
-            <a:fld id="{E9D97498-929C-4411-9A44-416E181BB6D2}" type="slidenum">
+            <a:fld id="{581C8534-E153-4608-865D-CC5E6D584B15}" type="slidenum">
               <a:t>&lt;#&gt;</a:t>
             </a:fld>
           </a:p>
@@ -11269,7 +9012,7 @@
         <p:txBody>
           <a:bodyPr/>
           <a:p>
-            <a:fld id="{9FB3282C-0612-4A41-A620-B1A82FC5072E}" type="slidenum">
+            <a:fld id="{F9DF7220-2938-4F62-A68E-4B415DBB4FF0}" type="slidenum">
               <a:t>&lt;#&gt;</a:t>
             </a:fld>
           </a:p>
@@ -11338,7 +9081,7 @@
         <p:spPr>
           <a:xfrm>
             <a:off x="4038480" y="6356520"/>
-            <a:ext cx="4110840" cy="361080"/>
+            <a:ext cx="4110480" cy="360720"/>
           </a:xfrm>
           <a:prstGeom prst="rect">
             <a:avLst/>
@@ -11395,7 +9138,7 @@
         <p:spPr>
           <a:xfrm>
             <a:off x="8610480" y="6356520"/>
-            <a:ext cx="2739240" cy="361080"/>
+            <a:ext cx="2738880" cy="360720"/>
           </a:xfrm>
           <a:prstGeom prst="rect">
             <a:avLst/>
@@ -11430,7 +9173,7 @@
               </a:lnSpc>
               <a:buNone/>
             </a:pPr>
-            <a:fld id="{DB06E6C7-076F-4859-A2FA-6B18D17F1328}" type="slidenum">
+            <a:fld id="{5BD46CC7-8406-4758-9064-62A447BB409B}" type="slidenum">
               <a:rPr b="0" lang="en-GB" sz="1200" spc="-1" strike="noStrike">
                 <a:solidFill>
                   <a:srgbClr val="8b8b8b"/>
@@ -11458,7 +9201,7 @@
         <p:spPr>
           <a:xfrm>
             <a:off x="838080" y="6356520"/>
-            <a:ext cx="2739240" cy="361080"/>
+            <a:ext cx="2738880" cy="360720"/>
           </a:xfrm>
           <a:prstGeom prst="rect">
             <a:avLst/>
@@ -11769,13 +9512,236 @@
             <a:spLocks noGrp="1"/>
           </p:cNvSpPr>
           <p:nvPr>
+            <p:ph type="title"/>
+          </p:nvPr>
+        </p:nvSpPr>
+        <p:spPr>
+          <a:xfrm>
+            <a:off x="609480" y="273600"/>
+            <a:ext cx="10972080" cy="1144440"/>
+          </a:xfrm>
+          <a:prstGeom prst="rect">
+            <a:avLst/>
+          </a:prstGeom>
+          <a:noFill/>
+          <a:ln w="0">
+            <a:noFill/>
+          </a:ln>
+        </p:spPr>
+        <p:txBody>
+          <a:bodyPr lIns="0" rIns="0" tIns="0" bIns="0" anchor="ctr">
+            <a:noAutofit/>
+          </a:bodyPr>
+          <a:p>
+            <a:r>
+              <a:rPr b="0" lang="en-IE" sz="1800" spc="-1" strike="noStrike">
+                <a:latin typeface="Arial"/>
+              </a:rPr>
+              <a:t>Click to edit the title text format</a:t>
+            </a:r>
+            <a:endParaRPr b="0" lang="en-IE" sz="1800" spc="-1" strike="noStrike">
+              <a:latin typeface="Arial"/>
+            </a:endParaRPr>
+          </a:p>
+        </p:txBody>
+      </p:sp>
+      <p:sp>
+        <p:nvSpPr>
+          <p:cNvPr id="42" name="PlaceHolder 2"/>
+          <p:cNvSpPr>
+            <a:spLocks noGrp="1"/>
+          </p:cNvSpPr>
+          <p:nvPr>
+            <p:ph type="body"/>
+          </p:nvPr>
+        </p:nvSpPr>
+        <p:spPr>
+          <a:xfrm>
+            <a:off x="609480" y="1604520"/>
+            <a:ext cx="10972080" cy="3976920"/>
+          </a:xfrm>
+          <a:prstGeom prst="rect">
+            <a:avLst/>
+          </a:prstGeom>
+          <a:noFill/>
+          <a:ln w="0">
+            <a:noFill/>
+          </a:ln>
+        </p:spPr>
+        <p:txBody>
+          <a:bodyPr lIns="0" rIns="0" tIns="0" bIns="0" anchor="t">
+            <a:normAutofit/>
+          </a:bodyPr>
+          <a:p>
+            <a:pPr marL="432000" indent="-324000">
+              <a:spcBef>
+                <a:spcPts val="1417"/>
+              </a:spcBef>
+              <a:buClr>
+                <a:srgbClr val="000000"/>
+              </a:buClr>
+              <a:buSzPct val="45000"/>
+              <a:buFont typeface="Wingdings" charset="2"/>
+              <a:buChar char=""/>
+            </a:pPr>
+            <a:r>
+              <a:rPr b="0" lang="en-IE" sz="1800" spc="-1" strike="noStrike">
+                <a:latin typeface="Arial"/>
+              </a:rPr>
+              <a:t>Click to edit the outline text format</a:t>
+            </a:r>
+            <a:endParaRPr b="0" lang="en-IE" sz="1800" spc="-1" strike="noStrike">
+              <a:latin typeface="Arial"/>
+            </a:endParaRPr>
+          </a:p>
+          <a:p>
+            <a:pPr lvl="1" marL="864000" indent="-324000">
+              <a:spcBef>
+                <a:spcPts val="1134"/>
+              </a:spcBef>
+              <a:buClr>
+                <a:srgbClr val="000000"/>
+              </a:buClr>
+              <a:buSzPct val="75000"/>
+              <a:buFont typeface="Symbol" charset="2"/>
+              <a:buChar char=""/>
+            </a:pPr>
+            <a:r>
+              <a:rPr b="0" lang="en-IE" sz="1800" spc="-1" strike="noStrike">
+                <a:latin typeface="Arial"/>
+              </a:rPr>
+              <a:t>Second Outline Level</a:t>
+            </a:r>
+            <a:endParaRPr b="0" lang="en-IE" sz="1800" spc="-1" strike="noStrike">
+              <a:latin typeface="Arial"/>
+            </a:endParaRPr>
+          </a:p>
+          <a:p>
+            <a:pPr lvl="2" marL="1296000" indent="-288000">
+              <a:spcBef>
+                <a:spcPts val="850"/>
+              </a:spcBef>
+              <a:buClr>
+                <a:srgbClr val="000000"/>
+              </a:buClr>
+              <a:buSzPct val="45000"/>
+              <a:buFont typeface="Wingdings" charset="2"/>
+              <a:buChar char=""/>
+            </a:pPr>
+            <a:r>
+              <a:rPr b="0" lang="en-IE" sz="1800" spc="-1" strike="noStrike">
+                <a:latin typeface="Arial"/>
+              </a:rPr>
+              <a:t>Third Outline Level</a:t>
+            </a:r>
+            <a:endParaRPr b="0" lang="en-IE" sz="1800" spc="-1" strike="noStrike">
+              <a:latin typeface="Arial"/>
+            </a:endParaRPr>
+          </a:p>
+          <a:p>
+            <a:pPr lvl="3" marL="1728000" indent="-216000">
+              <a:spcBef>
+                <a:spcPts val="567"/>
+              </a:spcBef>
+              <a:buClr>
+                <a:srgbClr val="000000"/>
+              </a:buClr>
+              <a:buSzPct val="75000"/>
+              <a:buFont typeface="Symbol" charset="2"/>
+              <a:buChar char=""/>
+            </a:pPr>
+            <a:r>
+              <a:rPr b="0" lang="en-IE" sz="1800" spc="-1" strike="noStrike">
+                <a:latin typeface="Arial"/>
+              </a:rPr>
+              <a:t>Fourth Outline Level</a:t>
+            </a:r>
+            <a:endParaRPr b="0" lang="en-IE" sz="1800" spc="-1" strike="noStrike">
+              <a:latin typeface="Arial"/>
+            </a:endParaRPr>
+          </a:p>
+          <a:p>
+            <a:pPr lvl="4" marL="2160000" indent="-216000">
+              <a:spcBef>
+                <a:spcPts val="283"/>
+              </a:spcBef>
+              <a:buClr>
+                <a:srgbClr val="000000"/>
+              </a:buClr>
+              <a:buSzPct val="45000"/>
+              <a:buFont typeface="Wingdings" charset="2"/>
+              <a:buChar char=""/>
+            </a:pPr>
+            <a:r>
+              <a:rPr b="0" lang="en-IE" sz="1800" spc="-1" strike="noStrike">
+                <a:latin typeface="Arial"/>
+              </a:rPr>
+              <a:t>Fifth Outline Level</a:t>
+            </a:r>
+            <a:endParaRPr b="0" lang="en-IE" sz="1800" spc="-1" strike="noStrike">
+              <a:latin typeface="Arial"/>
+            </a:endParaRPr>
+          </a:p>
+          <a:p>
+            <a:pPr lvl="5" marL="2592000" indent="-216000">
+              <a:spcBef>
+                <a:spcPts val="283"/>
+              </a:spcBef>
+              <a:buClr>
+                <a:srgbClr val="000000"/>
+              </a:buClr>
+              <a:buSzPct val="45000"/>
+              <a:buFont typeface="Wingdings" charset="2"/>
+              <a:buChar char=""/>
+            </a:pPr>
+            <a:r>
+              <a:rPr b="0" lang="en-IE" sz="1800" spc="-1" strike="noStrike">
+                <a:latin typeface="Arial"/>
+              </a:rPr>
+              <a:t>Sixth Outline Level</a:t>
+            </a:r>
+            <a:endParaRPr b="0" lang="en-IE" sz="1800" spc="-1" strike="noStrike">
+              <a:latin typeface="Arial"/>
+            </a:endParaRPr>
+          </a:p>
+          <a:p>
+            <a:pPr lvl="6" marL="3024000" indent="-216000">
+              <a:spcBef>
+                <a:spcPts val="283"/>
+              </a:spcBef>
+              <a:buClr>
+                <a:srgbClr val="000000"/>
+              </a:buClr>
+              <a:buSzPct val="45000"/>
+              <a:buFont typeface="Wingdings" charset="2"/>
+              <a:buChar char=""/>
+            </a:pPr>
+            <a:r>
+              <a:rPr b="0" lang="en-IE" sz="1800" spc="-1" strike="noStrike">
+                <a:latin typeface="Arial"/>
+              </a:rPr>
+              <a:t>Seventh Outline Level</a:t>
+            </a:r>
+            <a:endParaRPr b="0" lang="en-IE" sz="1800" spc="-1" strike="noStrike">
+              <a:latin typeface="Arial"/>
+            </a:endParaRPr>
+          </a:p>
+        </p:txBody>
+      </p:sp>
+      <p:sp>
+        <p:nvSpPr>
+          <p:cNvPr id="43" name="PlaceHolder 3"/>
+          <p:cNvSpPr>
+            <a:spLocks noGrp="1"/>
+          </p:cNvSpPr>
+          <p:nvPr>
             <p:ph type="ftr" idx="4"/>
           </p:nvPr>
         </p:nvSpPr>
         <p:spPr>
           <a:xfrm>
             <a:off x="4038480" y="6356520"/>
-            <a:ext cx="4110840" cy="361080"/>
+            <a:ext cx="4110480" cy="360720"/>
           </a:xfrm>
           <a:prstGeom prst="rect">
             <a:avLst/>
@@ -11821,7 +9787,7 @@
       </p:sp>
       <p:sp>
         <p:nvSpPr>
-          <p:cNvPr id="42" name="PlaceHolder 2"/>
+          <p:cNvPr id="44" name="PlaceHolder 4"/>
           <p:cNvSpPr>
             <a:spLocks noGrp="1"/>
           </p:cNvSpPr>
@@ -11832,7 +9798,7 @@
         <p:spPr>
           <a:xfrm>
             <a:off x="8610480" y="6356520"/>
-            <a:ext cx="2739240" cy="361080"/>
+            <a:ext cx="2738880" cy="360720"/>
           </a:xfrm>
           <a:prstGeom prst="rect">
             <a:avLst/>
@@ -11867,7 +9833,7 @@
               </a:lnSpc>
               <a:buNone/>
             </a:pPr>
-            <a:fld id="{BD80684D-B86A-4790-9AA9-B597EE6CB3BF}" type="slidenum">
+            <a:fld id="{69C75E07-D1A0-4C2F-B169-B2D67C54B97C}" type="slidenum">
               <a:rPr b="0" lang="en-GB" sz="1200" spc="-1" strike="noStrike">
                 <a:solidFill>
                   <a:srgbClr val="8b8b8b"/>
@@ -11884,7 +9850,7 @@
       </p:sp>
       <p:sp>
         <p:nvSpPr>
-          <p:cNvPr id="43" name="PlaceHolder 3"/>
+          <p:cNvPr id="45" name="PlaceHolder 5"/>
           <p:cNvSpPr>
             <a:spLocks noGrp="1"/>
           </p:cNvSpPr>
@@ -11895,7 +9861,7 @@
         <p:spPr>
           <a:xfrm>
             <a:off x="838080" y="6356520"/>
-            <a:ext cx="2739240" cy="361080"/>
+            <a:ext cx="2738880" cy="360720"/>
           </a:xfrm>
           <a:prstGeom prst="rect">
             <a:avLst/>
@@ -11925,232 +9891,6 @@
             </a:r>
             <a:endParaRPr b="0" lang="en-IE" sz="1400" spc="-1" strike="noStrike">
               <a:latin typeface="Times New Roman"/>
-            </a:endParaRPr>
-          </a:p>
-        </p:txBody>
-      </p:sp>
-      <p:sp>
-        <p:nvSpPr>
-          <p:cNvPr id="44" name="PlaceHolder 4"/>
-          <p:cNvSpPr>
-            <a:spLocks noGrp="1"/>
-          </p:cNvSpPr>
-          <p:nvPr>
-            <p:ph type="title"/>
-          </p:nvPr>
-        </p:nvSpPr>
-        <p:spPr>
-          <a:xfrm>
-            <a:off x="609480" y="273600"/>
-            <a:ext cx="10972440" cy="1144800"/>
-          </a:xfrm>
-          <a:prstGeom prst="rect">
-            <a:avLst/>
-          </a:prstGeom>
-          <a:noFill/>
-          <a:ln w="0">
-            <a:noFill/>
-          </a:ln>
-        </p:spPr>
-        <p:txBody>
-          <a:bodyPr lIns="0" rIns="0" tIns="0" bIns="0" anchor="ctr">
-            <a:noAutofit/>
-          </a:bodyPr>
-          <a:p>
-            <a:pPr algn="ctr">
-              <a:buNone/>
-            </a:pPr>
-            <a:r>
-              <a:rPr b="0" lang="en-IE" sz="4400" spc="-1" strike="noStrike">
-                <a:latin typeface="Arial"/>
-              </a:rPr>
-              <a:t>Click to edit the title text format</a:t>
-            </a:r>
-            <a:endParaRPr b="0" lang="en-IE" sz="4400" spc="-1" strike="noStrike">
-              <a:latin typeface="Arial"/>
-            </a:endParaRPr>
-          </a:p>
-        </p:txBody>
-      </p:sp>
-      <p:sp>
-        <p:nvSpPr>
-          <p:cNvPr id="45" name="PlaceHolder 5"/>
-          <p:cNvSpPr>
-            <a:spLocks noGrp="1"/>
-          </p:cNvSpPr>
-          <p:nvPr>
-            <p:ph type="body"/>
-          </p:nvPr>
-        </p:nvSpPr>
-        <p:spPr>
-          <a:xfrm>
-            <a:off x="609480" y="1604520"/>
-            <a:ext cx="10972440" cy="3977280"/>
-          </a:xfrm>
-          <a:prstGeom prst="rect">
-            <a:avLst/>
-          </a:prstGeom>
-          <a:noFill/>
-          <a:ln w="0">
-            <a:noFill/>
-          </a:ln>
-        </p:spPr>
-        <p:txBody>
-          <a:bodyPr lIns="0" rIns="0" tIns="0" bIns="0" anchor="t">
-            <a:normAutofit/>
-          </a:bodyPr>
-          <a:p>
-            <a:pPr marL="432000" indent="-324000">
-              <a:spcBef>
-                <a:spcPts val="1417"/>
-              </a:spcBef>
-              <a:buClr>
-                <a:srgbClr val="000000"/>
-              </a:buClr>
-              <a:buSzPct val="45000"/>
-              <a:buFont typeface="Wingdings" charset="2"/>
-              <a:buChar char=""/>
-            </a:pPr>
-            <a:r>
-              <a:rPr b="0" lang="en-IE" sz="3200" spc="-1" strike="noStrike">
-                <a:latin typeface="Arial"/>
-              </a:rPr>
-              <a:t>Click to edit the outline text format</a:t>
-            </a:r>
-            <a:endParaRPr b="0" lang="en-IE" sz="3200" spc="-1" strike="noStrike">
-              <a:latin typeface="Arial"/>
-            </a:endParaRPr>
-          </a:p>
-          <a:p>
-            <a:pPr lvl="1" marL="864000" indent="-324000">
-              <a:spcBef>
-                <a:spcPts val="1134"/>
-              </a:spcBef>
-              <a:buClr>
-                <a:srgbClr val="000000"/>
-              </a:buClr>
-              <a:buSzPct val="75000"/>
-              <a:buFont typeface="Symbol" charset="2"/>
-              <a:buChar char=""/>
-            </a:pPr>
-            <a:r>
-              <a:rPr b="0" lang="en-IE" sz="2800" spc="-1" strike="noStrike">
-                <a:latin typeface="Arial"/>
-              </a:rPr>
-              <a:t>Second Outline Level</a:t>
-            </a:r>
-            <a:endParaRPr b="0" lang="en-IE" sz="2800" spc="-1" strike="noStrike">
-              <a:latin typeface="Arial"/>
-            </a:endParaRPr>
-          </a:p>
-          <a:p>
-            <a:pPr lvl="2" marL="1296000" indent="-288000">
-              <a:spcBef>
-                <a:spcPts val="850"/>
-              </a:spcBef>
-              <a:buClr>
-                <a:srgbClr val="000000"/>
-              </a:buClr>
-              <a:buSzPct val="45000"/>
-              <a:buFont typeface="Wingdings" charset="2"/>
-              <a:buChar char=""/>
-            </a:pPr>
-            <a:r>
-              <a:rPr b="0" lang="en-IE" sz="2400" spc="-1" strike="noStrike">
-                <a:latin typeface="Arial"/>
-              </a:rPr>
-              <a:t>Third Outline Level</a:t>
-            </a:r>
-            <a:endParaRPr b="0" lang="en-IE" sz="2400" spc="-1" strike="noStrike">
-              <a:latin typeface="Arial"/>
-            </a:endParaRPr>
-          </a:p>
-          <a:p>
-            <a:pPr lvl="3" marL="1728000" indent="-216000">
-              <a:spcBef>
-                <a:spcPts val="567"/>
-              </a:spcBef>
-              <a:buClr>
-                <a:srgbClr val="000000"/>
-              </a:buClr>
-              <a:buSzPct val="75000"/>
-              <a:buFont typeface="Symbol" charset="2"/>
-              <a:buChar char=""/>
-            </a:pPr>
-            <a:r>
-              <a:rPr b="0" lang="en-IE" sz="2000" spc="-1" strike="noStrike">
-                <a:latin typeface="Arial"/>
-              </a:rPr>
-              <a:t>Fourth Outline Level</a:t>
-            </a:r>
-            <a:endParaRPr b="0" lang="en-IE" sz="2000" spc="-1" strike="noStrike">
-              <a:latin typeface="Arial"/>
-            </a:endParaRPr>
-          </a:p>
-          <a:p>
-            <a:pPr lvl="4" marL="2160000" indent="-216000">
-              <a:spcBef>
-                <a:spcPts val="283"/>
-              </a:spcBef>
-              <a:buClr>
-                <a:srgbClr val="000000"/>
-              </a:buClr>
-              <a:buSzPct val="45000"/>
-              <a:buFont typeface="Wingdings" charset="2"/>
-              <a:buChar char=""/>
-            </a:pPr>
-            <a:r>
-              <a:rPr b="0" lang="en-IE" sz="2000" spc="-1" strike="noStrike">
-                <a:latin typeface="Arial"/>
-              </a:rPr>
-              <a:t>Fifth Outline Level</a:t>
-            </a:r>
-            <a:endParaRPr b="0" lang="en-IE" sz="2000" spc="-1" strike="noStrike">
-              <a:latin typeface="Arial"/>
-            </a:endParaRPr>
-          </a:p>
-          <a:p>
-            <a:pPr lvl="5" marL="2592000" indent="-216000">
-              <a:spcBef>
-                <a:spcPts val="283"/>
-              </a:spcBef>
-              <a:buClr>
-                <a:srgbClr val="000000"/>
-              </a:buClr>
-              <a:buSzPct val="45000"/>
-              <a:buFont typeface="Wingdings" charset="2"/>
-              <a:buChar char=""/>
-            </a:pPr>
-            <a:r>
-              <a:rPr b="0" lang="en-IE" sz="2000" spc="-1" strike="noStrike">
-                <a:latin typeface="Arial"/>
-              </a:rPr>
-              <a:t>Sixth Outline Level</a:t>
-            </a:r>
-            <a:endParaRPr b="0" lang="en-IE" sz="2000" spc="-1" strike="noStrike">
-              <a:latin typeface="Arial"/>
-            </a:endParaRPr>
-          </a:p>
-          <a:p>
-            <a:pPr lvl="6" marL="3024000" indent="-216000">
-              <a:spcBef>
-                <a:spcPts val="283"/>
-              </a:spcBef>
-              <a:buClr>
-                <a:srgbClr val="000000"/>
-              </a:buClr>
-              <a:buSzPct val="45000"/>
-              <a:buFont typeface="Wingdings" charset="2"/>
-              <a:buChar char=""/>
-            </a:pPr>
-            <a:r>
-              <a:rPr b="0" lang="en-IE" sz="2000" spc="-1" strike="noStrike">
-                <a:latin typeface="Arial"/>
-              </a:rPr>
-              <a:t>Seventh Outline Level</a:t>
-            </a:r>
-            <a:endParaRPr b="0" lang="en-IE" sz="2000" spc="-1" strike="noStrike">
-              <a:latin typeface="Arial"/>
             </a:endParaRPr>
           </a:p>
         </p:txBody>
@@ -12206,53 +9946,13 @@
             <a:spLocks noGrp="1"/>
           </p:cNvSpPr>
           <p:nvPr>
-            <p:ph type="title"/>
-          </p:nvPr>
-        </p:nvSpPr>
-        <p:spPr>
-          <a:xfrm>
-            <a:off x="609480" y="273600"/>
-            <a:ext cx="10972080" cy="1144440"/>
-          </a:xfrm>
-          <a:prstGeom prst="rect">
-            <a:avLst/>
-          </a:prstGeom>
-          <a:noFill/>
-          <a:ln w="0">
-            <a:noFill/>
-          </a:ln>
-        </p:spPr>
-        <p:txBody>
-          <a:bodyPr lIns="0" rIns="0" tIns="0" bIns="0" anchor="ctr">
-            <a:noAutofit/>
-          </a:bodyPr>
-          <a:p>
-            <a:r>
-              <a:rPr b="0" lang="en-IE" sz="1800" spc="-1" strike="noStrike">
-                <a:latin typeface="Arial"/>
-              </a:rPr>
-              <a:t>Click to edit the title text format</a:t>
-            </a:r>
-            <a:endParaRPr b="0" lang="en-IE" sz="1800" spc="-1" strike="noStrike">
-              <a:latin typeface="Arial"/>
-            </a:endParaRPr>
-          </a:p>
-        </p:txBody>
-      </p:sp>
-      <p:sp>
-        <p:nvSpPr>
-          <p:cNvPr id="83" name="PlaceHolder 2"/>
-          <p:cNvSpPr>
-            <a:spLocks noGrp="1"/>
-          </p:cNvSpPr>
-          <p:nvPr>
             <p:ph type="ftr" idx="7"/>
           </p:nvPr>
         </p:nvSpPr>
         <p:spPr>
           <a:xfrm>
             <a:off x="4038480" y="6356520"/>
-            <a:ext cx="4110840" cy="361080"/>
+            <a:ext cx="4110480" cy="360720"/>
           </a:xfrm>
           <a:prstGeom prst="rect">
             <a:avLst/>
@@ -12298,7 +9998,7 @@
       </p:sp>
       <p:sp>
         <p:nvSpPr>
-          <p:cNvPr id="84" name="PlaceHolder 3"/>
+          <p:cNvPr id="83" name="PlaceHolder 2"/>
           <p:cNvSpPr>
             <a:spLocks noGrp="1"/>
           </p:cNvSpPr>
@@ -12309,7 +10009,7 @@
         <p:spPr>
           <a:xfrm>
             <a:off x="8610480" y="6356520"/>
-            <a:ext cx="2739240" cy="361080"/>
+            <a:ext cx="2738880" cy="360720"/>
           </a:xfrm>
           <a:prstGeom prst="rect">
             <a:avLst/>
@@ -12344,7 +10044,7 @@
               </a:lnSpc>
               <a:buNone/>
             </a:pPr>
-            <a:fld id="{8F9F6823-4AFE-437F-9AB6-3543B75A6767}" type="slidenum">
+            <a:fld id="{FACB1FF9-9133-4519-811A-71DF6F17366A}" type="slidenum">
               <a:rPr b="0" lang="en-GB" sz="1200" spc="-1" strike="noStrike">
                 <a:solidFill>
                   <a:srgbClr val="8b8b8b"/>
@@ -12361,7 +10061,7 @@
       </p:sp>
       <p:sp>
         <p:nvSpPr>
-          <p:cNvPr id="85" name="PlaceHolder 4"/>
+          <p:cNvPr id="84" name="PlaceHolder 3"/>
           <p:cNvSpPr>
             <a:spLocks noGrp="1"/>
           </p:cNvSpPr>
@@ -12372,7 +10072,7 @@
         <p:spPr>
           <a:xfrm>
             <a:off x="838080" y="6356520"/>
-            <a:ext cx="2739240" cy="361080"/>
+            <a:ext cx="2738880" cy="360720"/>
           </a:xfrm>
           <a:prstGeom prst="rect">
             <a:avLst/>
@@ -12402,6 +10102,49 @@
             </a:r>
             <a:endParaRPr b="0" lang="en-IE" sz="1400" spc="-1" strike="noStrike">
               <a:latin typeface="Times New Roman"/>
+            </a:endParaRPr>
+          </a:p>
+        </p:txBody>
+      </p:sp>
+      <p:sp>
+        <p:nvSpPr>
+          <p:cNvPr id="85" name="PlaceHolder 4"/>
+          <p:cNvSpPr>
+            <a:spLocks noGrp="1"/>
+          </p:cNvSpPr>
+          <p:nvPr>
+            <p:ph type="title"/>
+          </p:nvPr>
+        </p:nvSpPr>
+        <p:spPr>
+          <a:xfrm>
+            <a:off x="609480" y="273600"/>
+            <a:ext cx="10972440" cy="1144800"/>
+          </a:xfrm>
+          <a:prstGeom prst="rect">
+            <a:avLst/>
+          </a:prstGeom>
+          <a:noFill/>
+          <a:ln w="0">
+            <a:noFill/>
+          </a:ln>
+        </p:spPr>
+        <p:txBody>
+          <a:bodyPr lIns="0" rIns="0" tIns="0" bIns="0" anchor="ctr">
+            <a:noAutofit/>
+          </a:bodyPr>
+          <a:p>
+            <a:pPr algn="ctr">
+              <a:buNone/>
+            </a:pPr>
+            <a:r>
+              <a:rPr b="0" lang="en-IE" sz="4400" spc="-1" strike="noStrike">
+                <a:latin typeface="Arial"/>
+              </a:rPr>
+              <a:t>Click to edit the title text format</a:t>
+            </a:r>
+            <a:endParaRPr b="0" lang="en-IE" sz="4400" spc="-1" strike="noStrike">
+              <a:latin typeface="Arial"/>
             </a:endParaRPr>
           </a:p>
         </p:txBody>
@@ -12646,7 +10389,7 @@
         <p:spPr>
           <a:xfrm>
             <a:off x="4038480" y="6356520"/>
-            <a:ext cx="4110840" cy="361080"/>
+            <a:ext cx="4110480" cy="360720"/>
           </a:xfrm>
           <a:prstGeom prst="rect">
             <a:avLst/>
@@ -12703,7 +10446,7 @@
         <p:spPr>
           <a:xfrm>
             <a:off x="8610480" y="6356520"/>
-            <a:ext cx="2739240" cy="361080"/>
+            <a:ext cx="2738880" cy="360720"/>
           </a:xfrm>
           <a:prstGeom prst="rect">
             <a:avLst/>
@@ -12738,7 +10481,7 @@
               </a:lnSpc>
               <a:buNone/>
             </a:pPr>
-            <a:fld id="{B537DB10-5353-4A4A-A0D3-30E891116B41}" type="slidenum">
+            <a:fld id="{CEC00EF7-7999-4B10-B4C6-A48B34A3E931}" type="slidenum">
               <a:rPr b="0" lang="en-GB" sz="1200" spc="-1" strike="noStrike">
                 <a:solidFill>
                   <a:srgbClr val="8b8b8b"/>
@@ -12766,7 +10509,7 @@
         <p:spPr>
           <a:xfrm>
             <a:off x="838080" y="6356520"/>
-            <a:ext cx="2739240" cy="361080"/>
+            <a:ext cx="2738880" cy="360720"/>
           </a:xfrm>
           <a:prstGeom prst="rect">
             <a:avLst/>
@@ -13042,443 +10785,6 @@
     <p:sldLayoutId id="2147483697" r:id="rId11"/>
     <p:sldLayoutId id="2147483698" r:id="rId12"/>
     <p:sldLayoutId id="2147483699" r:id="rId13"/>
-  </p:sldLayoutIdLst>
-</p:sldMaster>
-</file>
-
-<file path=ppt/slideMasters/slideMaster5.xml><?xml version="1.0" encoding="utf-8"?>
-<p:sldMaster xmlns:a="http://schemas.openxmlformats.org/drawingml/2006/main" xmlns:p="http://schemas.openxmlformats.org/presentationml/2006/main" xmlns:r="http://schemas.openxmlformats.org/officeDocument/2006/relationships" xmlns:p14="http://schemas.microsoft.com/office/powerpoint/2010/main" xmlns:p15="http://schemas.microsoft.com/office/powerpoint/2012/main" xmlns:mc="http://schemas.openxmlformats.org/markup-compatibility/2006">
-  <p:cSld>
-    <p:bg>
-      <p:bgPr>
-        <a:solidFill>
-          <a:srgbClr val="ffffff"/>
-        </a:solidFill>
-      </p:bgPr>
-    </p:bg>
-    <p:spTree>
-      <p:nvGrpSpPr>
-        <p:cNvPr id="1" name=""/>
-        <p:cNvGrpSpPr/>
-        <p:nvPr/>
-      </p:nvGrpSpPr>
-      <p:grpSpPr>
-        <a:xfrm>
-          <a:off x="0" y="0"/>
-          <a:ext cx="0" cy="0"/>
-          <a:chOff x="0" y="0"/>
-          <a:chExt cx="0" cy="0"/>
-        </a:xfrm>
-      </p:grpSpPr>
-      <p:sp>
-        <p:nvSpPr>
-          <p:cNvPr id="164" name="PlaceHolder 1"/>
-          <p:cNvSpPr>
-            <a:spLocks noGrp="1"/>
-          </p:cNvSpPr>
-          <p:nvPr>
-            <p:ph type="ftr" idx="13"/>
-          </p:nvPr>
-        </p:nvSpPr>
-        <p:spPr>
-          <a:xfrm>
-            <a:off x="4038480" y="6356520"/>
-            <a:ext cx="4110840" cy="361080"/>
-          </a:xfrm>
-          <a:prstGeom prst="rect">
-            <a:avLst/>
-          </a:prstGeom>
-          <a:noFill/>
-          <a:ln w="0">
-            <a:noFill/>
-          </a:ln>
-        </p:spPr>
-        <p:txBody>
-          <a:bodyPr lIns="90000" rIns="90000" tIns="45000" bIns="45000" anchor="ctr">
-            <a:noAutofit/>
-          </a:bodyPr>
-          <a:lstStyle>
-            <a:lvl1pPr algn="ctr">
-              <a:lnSpc>
-                <a:spcPct val="100000"/>
-              </a:lnSpc>
-              <a:buNone/>
-              <a:defRPr b="0" lang="en-IE" sz="1400" spc="-1" strike="noStrike">
-                <a:latin typeface="Times New Roman"/>
-              </a:defRPr>
-            </a:lvl1pPr>
-          </a:lstStyle>
-          <a:p>
-            <a:pPr algn="ctr">
-              <a:lnSpc>
-                <a:spcPct val="100000"/>
-              </a:lnSpc>
-              <a:buNone/>
-            </a:pPr>
-            <a:r>
-              <a:rPr b="0" lang="en-IE" sz="1400" spc="-1" strike="noStrike">
-                <a:latin typeface="Times New Roman"/>
-              </a:rPr>
-              <a:t>&lt;footer&gt;</a:t>
-            </a:r>
-            <a:endParaRPr b="0" lang="en-IE" sz="1400" spc="-1" strike="noStrike">
-              <a:latin typeface="Times New Roman"/>
-            </a:endParaRPr>
-          </a:p>
-        </p:txBody>
-      </p:sp>
-      <p:sp>
-        <p:nvSpPr>
-          <p:cNvPr id="165" name="PlaceHolder 2"/>
-          <p:cNvSpPr>
-            <a:spLocks noGrp="1"/>
-          </p:cNvSpPr>
-          <p:nvPr>
-            <p:ph type="sldNum" idx="14"/>
-          </p:nvPr>
-        </p:nvSpPr>
-        <p:spPr>
-          <a:xfrm>
-            <a:off x="8610480" y="6356520"/>
-            <a:ext cx="2739240" cy="361080"/>
-          </a:xfrm>
-          <a:prstGeom prst="rect">
-            <a:avLst/>
-          </a:prstGeom>
-          <a:noFill/>
-          <a:ln w="0">
-            <a:noFill/>
-          </a:ln>
-        </p:spPr>
-        <p:txBody>
-          <a:bodyPr lIns="90000" rIns="90000" tIns="45000" bIns="45000" anchor="ctr">
-            <a:noAutofit/>
-          </a:bodyPr>
-          <a:lstStyle>
-            <a:lvl1pPr algn="r">
-              <a:lnSpc>
-                <a:spcPct val="100000"/>
-              </a:lnSpc>
-              <a:buNone/>
-              <a:defRPr b="0" lang="en-GB" sz="1200" spc="-1" strike="noStrike">
-                <a:solidFill>
-                  <a:srgbClr val="8b8b8b"/>
-                </a:solidFill>
-                <a:latin typeface="Calibri"/>
-              </a:defRPr>
-            </a:lvl1pPr>
-          </a:lstStyle>
-          <a:p>
-            <a:pPr algn="r">
-              <a:lnSpc>
-                <a:spcPct val="100000"/>
-              </a:lnSpc>
-              <a:buNone/>
-            </a:pPr>
-            <a:fld id="{083108B5-02E1-4FA6-88A2-675E155AE8D8}" type="slidenum">
-              <a:rPr b="0" lang="en-GB" sz="1200" spc="-1" strike="noStrike">
-                <a:solidFill>
-                  <a:srgbClr val="8b8b8b"/>
-                </a:solidFill>
-                <a:latin typeface="Calibri"/>
-              </a:rPr>
-              <a:t>&lt;number&gt;</a:t>
-            </a:fld>
-            <a:endParaRPr b="0" lang="en-IE" sz="1200" spc="-1" strike="noStrike">
-              <a:latin typeface="Times New Roman"/>
-            </a:endParaRPr>
-          </a:p>
-        </p:txBody>
-      </p:sp>
-      <p:sp>
-        <p:nvSpPr>
-          <p:cNvPr id="166" name="PlaceHolder 3"/>
-          <p:cNvSpPr>
-            <a:spLocks noGrp="1"/>
-          </p:cNvSpPr>
-          <p:nvPr>
-            <p:ph type="dt" idx="15"/>
-          </p:nvPr>
-        </p:nvSpPr>
-        <p:spPr>
-          <a:xfrm>
-            <a:off x="838080" y="6356520"/>
-            <a:ext cx="2739240" cy="361080"/>
-          </a:xfrm>
-          <a:prstGeom prst="rect">
-            <a:avLst/>
-          </a:prstGeom>
-          <a:noFill/>
-          <a:ln w="0">
-            <a:noFill/>
-          </a:ln>
-        </p:spPr>
-        <p:txBody>
-          <a:bodyPr lIns="90000" rIns="90000" tIns="45000" bIns="45000" anchor="ctr">
-            <a:noAutofit/>
-          </a:bodyPr>
-          <a:lstStyle>
-            <a:lvl1pPr>
-              <a:defRPr b="0" lang="en-IE" sz="1400" spc="-1" strike="noStrike">
-                <a:latin typeface="Times New Roman"/>
-              </a:defRPr>
-            </a:lvl1pPr>
-          </a:lstStyle>
-          <a:p>
-            <a:r>
-              <a:rPr b="0" lang="en-IE" sz="1400" spc="-1" strike="noStrike">
-                <a:latin typeface="Times New Roman"/>
-              </a:rPr>
-              <a:t>&lt;date/time&gt;</a:t>
-            </a:r>
-            <a:endParaRPr b="0" lang="en-IE" sz="1400" spc="-1" strike="noStrike">
-              <a:latin typeface="Times New Roman"/>
-            </a:endParaRPr>
-          </a:p>
-        </p:txBody>
-      </p:sp>
-      <p:sp>
-        <p:nvSpPr>
-          <p:cNvPr id="167" name="PlaceHolder 4"/>
-          <p:cNvSpPr>
-            <a:spLocks noGrp="1"/>
-          </p:cNvSpPr>
-          <p:nvPr>
-            <p:ph type="title"/>
-          </p:nvPr>
-        </p:nvSpPr>
-        <p:spPr>
-          <a:xfrm>
-            <a:off x="609480" y="273600"/>
-            <a:ext cx="10972440" cy="1144800"/>
-          </a:xfrm>
-          <a:prstGeom prst="rect">
-            <a:avLst/>
-          </a:prstGeom>
-          <a:noFill/>
-          <a:ln w="0">
-            <a:noFill/>
-          </a:ln>
-        </p:spPr>
-        <p:txBody>
-          <a:bodyPr lIns="0" rIns="0" tIns="0" bIns="0" anchor="ctr">
-            <a:noAutofit/>
-          </a:bodyPr>
-          <a:p>
-            <a:pPr algn="ctr">
-              <a:buNone/>
-            </a:pPr>
-            <a:r>
-              <a:rPr b="0" lang="en-IE" sz="4400" spc="-1" strike="noStrike">
-                <a:latin typeface="Arial"/>
-              </a:rPr>
-              <a:t>Click to edit the title text format</a:t>
-            </a:r>
-            <a:endParaRPr b="0" lang="en-IE" sz="4400" spc="-1" strike="noStrike">
-              <a:latin typeface="Arial"/>
-            </a:endParaRPr>
-          </a:p>
-        </p:txBody>
-      </p:sp>
-      <p:sp>
-        <p:nvSpPr>
-          <p:cNvPr id="168" name="PlaceHolder 5"/>
-          <p:cNvSpPr>
-            <a:spLocks noGrp="1"/>
-          </p:cNvSpPr>
-          <p:nvPr>
-            <p:ph type="body"/>
-          </p:nvPr>
-        </p:nvSpPr>
-        <p:spPr>
-          <a:xfrm>
-            <a:off x="609480" y="1604520"/>
-            <a:ext cx="10972440" cy="3977280"/>
-          </a:xfrm>
-          <a:prstGeom prst="rect">
-            <a:avLst/>
-          </a:prstGeom>
-          <a:noFill/>
-          <a:ln w="0">
-            <a:noFill/>
-          </a:ln>
-        </p:spPr>
-        <p:txBody>
-          <a:bodyPr lIns="0" rIns="0" tIns="0" bIns="0" anchor="t">
-            <a:normAutofit/>
-          </a:bodyPr>
-          <a:p>
-            <a:pPr marL="432000" indent="-324000">
-              <a:spcBef>
-                <a:spcPts val="1417"/>
-              </a:spcBef>
-              <a:buClr>
-                <a:srgbClr val="000000"/>
-              </a:buClr>
-              <a:buSzPct val="45000"/>
-              <a:buFont typeface="Wingdings" charset="2"/>
-              <a:buChar char=""/>
-            </a:pPr>
-            <a:r>
-              <a:rPr b="0" lang="en-IE" sz="3200" spc="-1" strike="noStrike">
-                <a:latin typeface="Arial"/>
-              </a:rPr>
-              <a:t>Click to edit the outline text format</a:t>
-            </a:r>
-            <a:endParaRPr b="0" lang="en-IE" sz="3200" spc="-1" strike="noStrike">
-              <a:latin typeface="Arial"/>
-            </a:endParaRPr>
-          </a:p>
-          <a:p>
-            <a:pPr lvl="1" marL="864000" indent="-324000">
-              <a:spcBef>
-                <a:spcPts val="1134"/>
-              </a:spcBef>
-              <a:buClr>
-                <a:srgbClr val="000000"/>
-              </a:buClr>
-              <a:buSzPct val="75000"/>
-              <a:buFont typeface="Symbol" charset="2"/>
-              <a:buChar char=""/>
-            </a:pPr>
-            <a:r>
-              <a:rPr b="0" lang="en-IE" sz="2800" spc="-1" strike="noStrike">
-                <a:latin typeface="Arial"/>
-              </a:rPr>
-              <a:t>Second Outline Level</a:t>
-            </a:r>
-            <a:endParaRPr b="0" lang="en-IE" sz="2800" spc="-1" strike="noStrike">
-              <a:latin typeface="Arial"/>
-            </a:endParaRPr>
-          </a:p>
-          <a:p>
-            <a:pPr lvl="2" marL="1296000" indent="-288000">
-              <a:spcBef>
-                <a:spcPts val="850"/>
-              </a:spcBef>
-              <a:buClr>
-                <a:srgbClr val="000000"/>
-              </a:buClr>
-              <a:buSzPct val="45000"/>
-              <a:buFont typeface="Wingdings" charset="2"/>
-              <a:buChar char=""/>
-            </a:pPr>
-            <a:r>
-              <a:rPr b="0" lang="en-IE" sz="2400" spc="-1" strike="noStrike">
-                <a:latin typeface="Arial"/>
-              </a:rPr>
-              <a:t>Third Outline Level</a:t>
-            </a:r>
-            <a:endParaRPr b="0" lang="en-IE" sz="2400" spc="-1" strike="noStrike">
-              <a:latin typeface="Arial"/>
-            </a:endParaRPr>
-          </a:p>
-          <a:p>
-            <a:pPr lvl="3" marL="1728000" indent="-216000">
-              <a:spcBef>
-                <a:spcPts val="567"/>
-              </a:spcBef>
-              <a:buClr>
-                <a:srgbClr val="000000"/>
-              </a:buClr>
-              <a:buSzPct val="75000"/>
-              <a:buFont typeface="Symbol" charset="2"/>
-              <a:buChar char=""/>
-            </a:pPr>
-            <a:r>
-              <a:rPr b="0" lang="en-IE" sz="2000" spc="-1" strike="noStrike">
-                <a:latin typeface="Arial"/>
-              </a:rPr>
-              <a:t>Fourth Outline Level</a:t>
-            </a:r>
-            <a:endParaRPr b="0" lang="en-IE" sz="2000" spc="-1" strike="noStrike">
-              <a:latin typeface="Arial"/>
-            </a:endParaRPr>
-          </a:p>
-          <a:p>
-            <a:pPr lvl="4" marL="2160000" indent="-216000">
-              <a:spcBef>
-                <a:spcPts val="283"/>
-              </a:spcBef>
-              <a:buClr>
-                <a:srgbClr val="000000"/>
-              </a:buClr>
-              <a:buSzPct val="45000"/>
-              <a:buFont typeface="Wingdings" charset="2"/>
-              <a:buChar char=""/>
-            </a:pPr>
-            <a:r>
-              <a:rPr b="0" lang="en-IE" sz="2000" spc="-1" strike="noStrike">
-                <a:latin typeface="Arial"/>
-              </a:rPr>
-              <a:t>Fifth Outline Level</a:t>
-            </a:r>
-            <a:endParaRPr b="0" lang="en-IE" sz="2000" spc="-1" strike="noStrike">
-              <a:latin typeface="Arial"/>
-            </a:endParaRPr>
-          </a:p>
-          <a:p>
-            <a:pPr lvl="5" marL="2592000" indent="-216000">
-              <a:spcBef>
-                <a:spcPts val="283"/>
-              </a:spcBef>
-              <a:buClr>
-                <a:srgbClr val="000000"/>
-              </a:buClr>
-              <a:buSzPct val="45000"/>
-              <a:buFont typeface="Wingdings" charset="2"/>
-              <a:buChar char=""/>
-            </a:pPr>
-            <a:r>
-              <a:rPr b="0" lang="en-IE" sz="2000" spc="-1" strike="noStrike">
-                <a:latin typeface="Arial"/>
-              </a:rPr>
-              <a:t>Sixth Outline Level</a:t>
-            </a:r>
-            <a:endParaRPr b="0" lang="en-IE" sz="2000" spc="-1" strike="noStrike">
-              <a:latin typeface="Arial"/>
-            </a:endParaRPr>
-          </a:p>
-          <a:p>
-            <a:pPr lvl="6" marL="3024000" indent="-216000">
-              <a:spcBef>
-                <a:spcPts val="283"/>
-              </a:spcBef>
-              <a:buClr>
-                <a:srgbClr val="000000"/>
-              </a:buClr>
-              <a:buSzPct val="45000"/>
-              <a:buFont typeface="Wingdings" charset="2"/>
-              <a:buChar char=""/>
-            </a:pPr>
-            <a:r>
-              <a:rPr b="0" lang="en-IE" sz="2000" spc="-1" strike="noStrike">
-                <a:latin typeface="Arial"/>
-              </a:rPr>
-              <a:t>Seventh Outline Level</a:t>
-            </a:r>
-            <a:endParaRPr b="0" lang="en-IE" sz="2000" spc="-1" strike="noStrike">
-              <a:latin typeface="Arial"/>
-            </a:endParaRPr>
-          </a:p>
-        </p:txBody>
-      </p:sp>
-    </p:spTree>
-  </p:cSld>
-  <p:clrMap bg1="lt1" bg2="lt2" tx1="dk1" tx2="dk2" accent1="accent1" accent2="accent2" accent3="accent3" accent4="accent4" accent5="accent5" accent6="accent6" hlink="hlink" folHlink="folHlink"/>
-  <p:sldLayoutIdLst>
-    <p:sldLayoutId id="2147483701" r:id="rId2"/>
-    <p:sldLayoutId id="2147483702" r:id="rId3"/>
-    <p:sldLayoutId id="2147483703" r:id="rId4"/>
-    <p:sldLayoutId id="2147483704" r:id="rId5"/>
-    <p:sldLayoutId id="2147483705" r:id="rId6"/>
-    <p:sldLayoutId id="2147483706" r:id="rId7"/>
-    <p:sldLayoutId id="2147483707" r:id="rId8"/>
-    <p:sldLayoutId id="2147483708" r:id="rId9"/>
-    <p:sldLayoutId id="2147483709" r:id="rId10"/>
-    <p:sldLayoutId id="2147483710" r:id="rId11"/>
-    <p:sldLayoutId id="2147483711" r:id="rId12"/>
-    <p:sldLayoutId id="2147483712" r:id="rId13"/>
   </p:sldLayoutIdLst>
 </p:sldMaster>
 </file>
@@ -13502,7 +10808,7 @@
       </p:grpSpPr>
       <p:sp>
         <p:nvSpPr>
-          <p:cNvPr id="205" name="PlaceHolder 1"/>
+          <p:cNvPr id="164" name="PlaceHolder 1"/>
           <p:cNvSpPr>
             <a:spLocks noGrp="1"/>
           </p:cNvSpPr>
@@ -13513,7 +10819,7 @@
         <p:spPr>
           <a:xfrm>
             <a:off x="609480" y="273600"/>
-            <a:ext cx="10969200" cy="1141560"/>
+            <a:ext cx="10968840" cy="1141200"/>
           </a:xfrm>
           <a:prstGeom prst="rect">
             <a:avLst/>
@@ -13548,14 +10854,14 @@
       </p:sp>
       <p:sp>
         <p:nvSpPr>
-          <p:cNvPr id="206" name=""/>
+          <p:cNvPr id="165" name=""/>
           <p:cNvSpPr/>
           <p:nvPr/>
         </p:nvSpPr>
         <p:spPr>
           <a:xfrm>
             <a:off x="1080000" y="1800000"/>
-            <a:ext cx="10256760" cy="4136760"/>
+            <a:ext cx="10256400" cy="4136400"/>
           </a:xfrm>
           <a:prstGeom prst="rect">
             <a:avLst/>
@@ -13641,7 +10947,7 @@
       </p:grpSpPr>
       <p:sp>
         <p:nvSpPr>
-          <p:cNvPr id="207" name="PlaceHolder 1"/>
+          <p:cNvPr id="166" name="PlaceHolder 1"/>
           <p:cNvSpPr>
             <a:spLocks noGrp="1"/>
           </p:cNvSpPr>
@@ -13652,7 +10958,7 @@
         <p:spPr>
           <a:xfrm>
             <a:off x="609480" y="273600"/>
-            <a:ext cx="10972080" cy="1144440"/>
+            <a:ext cx="10971720" cy="1144080"/>
           </a:xfrm>
           <a:prstGeom prst="rect">
             <a:avLst/>
@@ -13687,7 +10993,7 @@
       </p:sp>
       <p:pic>
         <p:nvPicPr>
-          <p:cNvPr id="208" name="" descr=""/>
+          <p:cNvPr id="167" name="" descr=""/>
           <p:cNvPicPr/>
           <p:nvPr/>
         </p:nvPicPr>
@@ -13698,7 +11004,7 @@
         <p:spPr>
           <a:xfrm>
             <a:off x="810720" y="1260000"/>
-            <a:ext cx="1528920" cy="5247000"/>
+            <a:ext cx="1528560" cy="5246640"/>
           </a:xfrm>
           <a:prstGeom prst="rect">
             <a:avLst/>
@@ -13710,14 +11016,14 @@
       </p:pic>
       <p:sp>
         <p:nvSpPr>
-          <p:cNvPr id="209" name=""/>
+          <p:cNvPr id="168" name=""/>
           <p:cNvSpPr/>
           <p:nvPr/>
         </p:nvSpPr>
         <p:spPr>
           <a:xfrm>
             <a:off x="2520000" y="1620000"/>
-            <a:ext cx="1979640" cy="601920"/>
+            <a:ext cx="1979280" cy="601560"/>
           </a:xfrm>
           <a:prstGeom prst="rect">
             <a:avLst/>
@@ -13746,7 +11052,11 @@
             </a:pPr>
             <a:r>
               <a:rPr b="0" lang="en-IE" sz="1800" spc="-1" strike="noStrike">
+                <a:solidFill>
+                  <a:srgbClr val="000000"/>
+                </a:solidFill>
                 <a:latin typeface="Arial"/>
+                <a:ea typeface="DejaVu Sans"/>
               </a:rPr>
               <a:t>User Entry on server</a:t>
             </a:r>
@@ -13758,7 +11068,7 @@
       </p:sp>
       <p:pic>
         <p:nvPicPr>
-          <p:cNvPr id="210" name="" descr=""/>
+          <p:cNvPr id="169" name="" descr=""/>
           <p:cNvPicPr/>
           <p:nvPr/>
         </p:nvPicPr>
@@ -13769,7 +11079,7 @@
         <p:spPr>
           <a:xfrm>
             <a:off x="5462280" y="1598040"/>
-            <a:ext cx="2637360" cy="2551320"/>
+            <a:ext cx="2637000" cy="2550960"/>
           </a:xfrm>
           <a:prstGeom prst="rect">
             <a:avLst/>
@@ -13781,14 +11091,14 @@
       </p:pic>
       <p:sp>
         <p:nvSpPr>
-          <p:cNvPr id="211" name=""/>
+          <p:cNvPr id="170" name=""/>
           <p:cNvSpPr/>
           <p:nvPr/>
         </p:nvSpPr>
         <p:spPr>
           <a:xfrm>
             <a:off x="8280000" y="1800000"/>
-            <a:ext cx="2159640" cy="601920"/>
+            <a:ext cx="2159280" cy="601560"/>
           </a:xfrm>
           <a:prstGeom prst="rect">
             <a:avLst/>
@@ -13817,7 +11127,11 @@
             </a:pPr>
             <a:r>
               <a:rPr b="0" lang="en-IE" sz="1800" spc="-1" strike="noStrike">
+                <a:solidFill>
+                  <a:srgbClr val="000000"/>
+                </a:solidFill>
                 <a:latin typeface="Arial"/>
+                <a:ea typeface="DejaVu Sans"/>
               </a:rPr>
               <a:t>Schedule stored on Rasberry Pi</a:t>
             </a:r>
@@ -13859,7 +11173,7 @@
       </p:grpSpPr>
       <p:sp>
         <p:nvSpPr>
-          <p:cNvPr id="212" name="PlaceHolder 1"/>
+          <p:cNvPr id="171" name="PlaceHolder 1"/>
           <p:cNvSpPr>
             <a:spLocks noGrp="1"/>
           </p:cNvSpPr>
@@ -13870,7 +11184,7 @@
         <p:spPr>
           <a:xfrm>
             <a:off x="609480" y="273600"/>
-            <a:ext cx="10969200" cy="1141560"/>
+            <a:ext cx="10968840" cy="1141200"/>
           </a:xfrm>
           <a:prstGeom prst="rect">
             <a:avLst/>
@@ -13905,14 +11219,14 @@
       </p:sp>
       <p:sp>
         <p:nvSpPr>
-          <p:cNvPr id="213" name=""/>
+          <p:cNvPr id="172" name=""/>
           <p:cNvSpPr/>
           <p:nvPr/>
         </p:nvSpPr>
         <p:spPr>
           <a:xfrm>
             <a:off x="900000" y="1800000"/>
-            <a:ext cx="10796760" cy="2646720"/>
+            <a:ext cx="10796400" cy="2646360"/>
           </a:xfrm>
           <a:prstGeom prst="rect">
             <a:avLst/>
@@ -14176,7 +11490,7 @@
                 <a:latin typeface="Arial"/>
                 <a:ea typeface="DejaVu Sans"/>
               </a:rPr>
-              <a:t>- 0v across an open switch</a:t>
+              <a:t>- 0v across a switch when the circuit is not completed</a:t>
             </a:r>
             <a:endParaRPr b="0" lang="en-IE" sz="1800" spc="-1" strike="noStrike">
               <a:latin typeface="Arial"/>
@@ -14207,7 +11521,7 @@
                 <a:latin typeface="Arial"/>
                 <a:ea typeface="DejaVu Sans"/>
               </a:rPr>
-              <a:t>- 5v across a closed switch</a:t>
+              <a:t>- 5v across a switch when the circuit is completed.</a:t>
             </a:r>
             <a:endParaRPr b="0" lang="en-IE" sz="1800" spc="-1" strike="noStrike">
               <a:latin typeface="Arial"/>
@@ -14248,7 +11562,7 @@
       </p:sp>
       <p:pic>
         <p:nvPicPr>
-          <p:cNvPr id="214" name="" descr=""/>
+          <p:cNvPr id="173" name="" descr=""/>
           <p:cNvPicPr/>
           <p:nvPr/>
         </p:nvPicPr>
@@ -14259,7 +11573,7 @@
         <p:spPr>
           <a:xfrm>
             <a:off x="7560000" y="1416240"/>
-            <a:ext cx="4020840" cy="2857320"/>
+            <a:ext cx="4020480" cy="2856960"/>
           </a:xfrm>
           <a:prstGeom prst="rect">
             <a:avLst/>
@@ -14301,7 +11615,7 @@
       </p:grpSpPr>
       <p:sp>
         <p:nvSpPr>
-          <p:cNvPr id="215" name="PlaceHolder 1"/>
+          <p:cNvPr id="174" name="PlaceHolder 1"/>
           <p:cNvSpPr>
             <a:spLocks noGrp="1"/>
           </p:cNvSpPr>
@@ -14312,7 +11626,7 @@
         <p:spPr>
           <a:xfrm>
             <a:off x="609480" y="273600"/>
-            <a:ext cx="10969200" cy="1141560"/>
+            <a:ext cx="10968840" cy="1141200"/>
           </a:xfrm>
           <a:prstGeom prst="rect">
             <a:avLst/>
@@ -14347,14 +11661,14 @@
       </p:sp>
       <p:sp>
         <p:nvSpPr>
-          <p:cNvPr id="216" name=""/>
+          <p:cNvPr id="175" name=""/>
           <p:cNvSpPr/>
           <p:nvPr/>
         </p:nvSpPr>
         <p:spPr>
           <a:xfrm>
             <a:off x="540000" y="1620000"/>
-            <a:ext cx="11157120" cy="1879200"/>
+            <a:ext cx="11156760" cy="1878840"/>
           </a:xfrm>
           <a:prstGeom prst="rect">
             <a:avLst/>
@@ -14741,7 +12055,7 @@
       </p:grpSpPr>
       <p:sp>
         <p:nvSpPr>
-          <p:cNvPr id="217" name="PlaceHolder 1"/>
+          <p:cNvPr id="176" name="PlaceHolder 1"/>
           <p:cNvSpPr>
             <a:spLocks noGrp="1"/>
           </p:cNvSpPr>
@@ -14752,7 +12066,7 @@
         <p:spPr>
           <a:xfrm>
             <a:off x="609480" y="273600"/>
-            <a:ext cx="10969920" cy="1142280"/>
+            <a:ext cx="10969560" cy="1141920"/>
           </a:xfrm>
           <a:prstGeom prst="rect">
             <a:avLst/>
@@ -14787,14 +12101,14 @@
       </p:sp>
       <p:sp>
         <p:nvSpPr>
-          <p:cNvPr id="218" name=""/>
+          <p:cNvPr id="177" name=""/>
           <p:cNvSpPr/>
           <p:nvPr/>
         </p:nvSpPr>
         <p:spPr>
           <a:xfrm>
             <a:off x="720000" y="1620000"/>
-            <a:ext cx="11157480" cy="855720"/>
+            <a:ext cx="11157120" cy="855360"/>
           </a:xfrm>
           <a:prstGeom prst="rect">
             <a:avLst/>
@@ -15007,7 +12321,7 @@
       </p:grpSpPr>
       <p:sp>
         <p:nvSpPr>
-          <p:cNvPr id="219" name="PlaceHolder 1"/>
+          <p:cNvPr id="178" name="PlaceHolder 1"/>
           <p:cNvSpPr>
             <a:spLocks noGrp="1"/>
           </p:cNvSpPr>
@@ -15018,7 +12332,7 @@
         <p:spPr>
           <a:xfrm>
             <a:off x="609480" y="273600"/>
-            <a:ext cx="10970640" cy="1143000"/>
+            <a:ext cx="10970280" cy="1142640"/>
           </a:xfrm>
           <a:prstGeom prst="rect">
             <a:avLst/>
@@ -15053,14 +12367,14 @@
       </p:sp>
       <p:sp>
         <p:nvSpPr>
-          <p:cNvPr id="220" name=""/>
+          <p:cNvPr id="179" name=""/>
           <p:cNvSpPr/>
           <p:nvPr/>
         </p:nvSpPr>
         <p:spPr>
           <a:xfrm>
             <a:off x="360000" y="1440000"/>
-            <a:ext cx="11518200" cy="3959280"/>
+            <a:ext cx="11517840" cy="3958920"/>
           </a:xfrm>
           <a:prstGeom prst="rect">
             <a:avLst/>
@@ -16176,230 +13490,4 @@
     </a:fmtScheme>
   </a:themeElements>
 </a:theme>
-</file>
-
-<file path=ppt/theme/theme5.xml><?xml version="1.0" encoding="utf-8"?>
-<a:theme xmlns:a="http://schemas.openxmlformats.org/drawingml/2006/main" name="Office Theme">
-  <a:themeElements>
-    <a:clrScheme name="Office">
-      <a:dk1>
-        <a:sysClr val="windowText" lastClr="000000"/>
-      </a:dk1>
-      <a:lt1>
-        <a:sysClr val="window" lastClr="FFFFFF"/>
-      </a:lt1>
-      <a:dk2>
-        <a:srgbClr val="44546a"/>
-      </a:dk2>
-      <a:lt2>
-        <a:srgbClr val="e7e6e6"/>
-      </a:lt2>
-      <a:accent1>
-        <a:srgbClr val="4472c4"/>
-      </a:accent1>
-      <a:accent2>
-        <a:srgbClr val="ed7d31"/>
-      </a:accent2>
-      <a:accent3>
-        <a:srgbClr val="a5a5a5"/>
-      </a:accent3>
-      <a:accent4>
-        <a:srgbClr val="ffc000"/>
-      </a:accent4>
-      <a:accent5>
-        <a:srgbClr val="5b9bd5"/>
-      </a:accent5>
-      <a:accent6>
-        <a:srgbClr val="70ad47"/>
-      </a:accent6>
-      <a:hlink>
-        <a:srgbClr val="0563c1"/>
-      </a:hlink>
-      <a:folHlink>
-        <a:srgbClr val="954f72"/>
-      </a:folHlink>
-    </a:clrScheme>
-    <a:fontScheme name="Office">
-      <a:majorFont>
-        <a:latin typeface="Arial"/>
-        <a:ea typeface="DejaVu Sans"/>
-        <a:cs typeface="DejaVu Sans"/>
-      </a:majorFont>
-      <a:minorFont>
-        <a:latin typeface="Arial"/>
-        <a:ea typeface="DejaVu Sans"/>
-        <a:cs typeface="DejaVu Sans"/>
-      </a:minorFont>
-    </a:fontScheme>
-    <a:fmtScheme name="Office">
-      <a:fillStyleLst>
-        <a:solidFill>
-          <a:schemeClr val="phClr"/>
-        </a:solidFill>
-        <a:gradFill rotWithShape="1">
-          <a:gsLst>
-            <a:gs pos="0">
-              <a:schemeClr val="phClr">
-                <a:tint val="50000"/>
-                <a:satMod val="300000"/>
-              </a:schemeClr>
-            </a:gs>
-            <a:gs pos="35000">
-              <a:schemeClr val="phClr">
-                <a:tint val="37000"/>
-                <a:satMod val="300000"/>
-              </a:schemeClr>
-            </a:gs>
-            <a:gs pos="100000">
-              <a:schemeClr val="phClr">
-                <a:tint val="15000"/>
-                <a:satMod val="350000"/>
-              </a:schemeClr>
-            </a:gs>
-          </a:gsLst>
-          <a:lin ang="16200000" scaled="1"/>
-        </a:gradFill>
-        <a:gradFill rotWithShape="1">
-          <a:gsLst>
-            <a:gs pos="0">
-              <a:schemeClr val="phClr">
-                <a:shade val="51000"/>
-                <a:satMod val="130000"/>
-              </a:schemeClr>
-            </a:gs>
-            <a:gs pos="80000">
-              <a:schemeClr val="phClr">
-                <a:shade val="93000"/>
-                <a:satMod val="130000"/>
-              </a:schemeClr>
-            </a:gs>
-            <a:gs pos="100000">
-              <a:schemeClr val="phClr">
-                <a:shade val="94000"/>
-                <a:satMod val="135000"/>
-              </a:schemeClr>
-            </a:gs>
-          </a:gsLst>
-          <a:lin ang="16200000" scaled="0"/>
-        </a:gradFill>
-      </a:fillStyleLst>
-      <a:lnStyleLst>
-        <a:ln w="9525" cap="flat" cmpd="sng" algn="ctr">
-          <a:solidFill>
-            <a:schemeClr val="phClr">
-              <a:shade val="95000"/>
-              <a:satMod val="105000"/>
-            </a:schemeClr>
-          </a:solidFill>
-          <a:prstDash val="solid"/>
-          <a:miter/>
-        </a:ln>
-        <a:ln w="25400" cap="flat" cmpd="sng" algn="ctr">
-          <a:solidFill>
-            <a:schemeClr val="phClr"/>
-          </a:solidFill>
-          <a:prstDash val="solid"/>
-          <a:miter/>
-        </a:ln>
-        <a:ln w="38100" cap="flat" cmpd="sng" algn="ctr">
-          <a:solidFill>
-            <a:schemeClr val="phClr"/>
-          </a:solidFill>
-          <a:prstDash val="solid"/>
-          <a:miter/>
-        </a:ln>
-      </a:lnStyleLst>
-      <a:effectStyleLst>
-        <a:effectStyle>
-          <a:effectLst>
-            <a:outerShdw blurRad="40000" dist="20000" dir="5400000" rotWithShape="0">
-              <a:srgbClr val="000000">
-                <a:alpha val="38000"/>
-              </a:srgbClr>
-            </a:outerShdw>
-          </a:effectLst>
-        </a:effectStyle>
-        <a:effectStyle>
-          <a:effectLst>
-            <a:outerShdw blurRad="40000" dist="23000" dir="5400000" rotWithShape="0">
-              <a:srgbClr val="000000">
-                <a:alpha val="35000"/>
-              </a:srgbClr>
-            </a:outerShdw>
-          </a:effectLst>
-        </a:effectStyle>
-        <a:effectStyle>
-          <a:effectLst>
-            <a:outerShdw blurRad="40000" dist="23000" dir="5400000" rotWithShape="0">
-              <a:srgbClr val="000000">
-                <a:alpha val="35000"/>
-              </a:srgbClr>
-            </a:outerShdw>
-          </a:effectLst>
-          <a:scene3d>
-            <a:camera prst="orthographicFront">
-              <a:rot lat="0" lon="0" rev="0"/>
-            </a:camera>
-            <a:lightRig rig="threePt" dir="t">
-              <a:rot lat="0" lon="0" rev="1200000"/>
-            </a:lightRig>
-          </a:scene3d>
-          <a:sp3d>
-            <a:bevelT w="63500" h="25400"/>
-          </a:sp3d>
-        </a:effectStyle>
-      </a:effectStyleLst>
-      <a:bgFillStyleLst>
-        <a:solidFill>
-          <a:schemeClr val="phClr"/>
-        </a:solidFill>
-        <a:gradFill rotWithShape="1">
-          <a:gsLst>
-            <a:gs pos="0">
-              <a:schemeClr val="phClr">
-                <a:tint val="40000"/>
-                <a:satMod val="350000"/>
-              </a:schemeClr>
-            </a:gs>
-            <a:gs pos="40000">
-              <a:schemeClr val="phClr">
-                <a:tint val="45000"/>
-                <a:shade val="99000"/>
-                <a:satMod val="350000"/>
-              </a:schemeClr>
-            </a:gs>
-            <a:gs pos="100000">
-              <a:schemeClr val="phClr">
-                <a:shade val="20000"/>
-                <a:satMod val="255000"/>
-              </a:schemeClr>
-            </a:gs>
-          </a:gsLst>
-          <a:path path="circle">
-            <a:fillToRect l="50000" t="-80000" r="50000" b="180000"/>
-          </a:path>
-        </a:gradFill>
-        <a:gradFill rotWithShape="1">
-          <a:gsLst>
-            <a:gs pos="0">
-              <a:schemeClr val="phClr">
-                <a:tint val="80000"/>
-                <a:satMod val="300000"/>
-              </a:schemeClr>
-            </a:gs>
-            <a:gs pos="100000">
-              <a:schemeClr val="phClr">
-                <a:shade val="30000"/>
-                <a:satMod val="200000"/>
-              </a:schemeClr>
-            </a:gs>
-          </a:gsLst>
-          <a:path path="circle">
-            <a:fillToRect l="50000" t="50000" r="50000" b="50000"/>
-          </a:path>
-        </a:gradFill>
-      </a:bgFillStyleLst>
-    </a:fmtScheme>
-  </a:themeElements>
-</a:theme>
 </file>
</xml_diff>